<commit_message>
Big commit, number of mutations and report work
</commit_message>
<xml_diff>
--- a/Plots and Figures/Real plots and figures/Completed figures with captions.pptx
+++ b/Plots and Figures/Real plots and figures/Completed figures with captions.pptx
@@ -6,6 +6,7 @@
   </p:sldMasterIdLst>
   <p:sldIdLst>
     <p:sldId id="256" r:id="rId2"/>
+    <p:sldId id="257" r:id="rId3"/>
   </p:sldIdLst>
   <p:sldSz cx="12192000" cy="6858000"/>
   <p:notesSz cx="6858000" cy="9144000"/>
@@ -104,15 +105,28 @@
       </a:defRPr>
     </a:lvl9pPr>
   </p:defaultTextStyle>
+  <p:extLst>
+    <p:ext uri="{EFAFB233-063F-42B5-8137-9DF3F51BA10A}">
+      <p15:sldGuideLst xmlns:p15="http://schemas.microsoft.com/office/powerpoint/2012/main"/>
+    </p:ext>
+  </p:extLst>
 </p:presentation>
+</file>
+
+<file path=ppt/revisionInfo.xml><?xml version="1.0" encoding="utf-8"?>
+<p1510:revInfo xmlns:a="http://schemas.openxmlformats.org/drawingml/2006/main" xmlns:r="http://schemas.openxmlformats.org/officeDocument/2006/relationships" xmlns:p1510="http://schemas.microsoft.com/office/powerpoint/2015/10/main">
+  <p1510:revLst>
+    <p1510:client id="{7273B22C-C245-4F33-9671-B4FF89330F8E}" v="3" dt="2025-03-09T15:00:21.633"/>
+  </p1510:revLst>
+</p1510:revInfo>
 </file>
 
 <file path=ppt/changesInfos/changesInfo1.xml><?xml version="1.0" encoding="utf-8"?>
 <pc:chgInfo xmlns:a="http://schemas.openxmlformats.org/drawingml/2006/main" xmlns:r="http://schemas.openxmlformats.org/officeDocument/2006/relationships" xmlns:ac="http://schemas.microsoft.com/office/drawing/2013/main/command" xmlns:pc="http://schemas.microsoft.com/office/powerpoint/2013/main/command">
   <pc:docChgLst>
     <pc:chgData name="Samuel Aldous" userId="0ff3eb4db5f3e0fd" providerId="LiveId" clId="{7273B22C-C245-4F33-9671-B4FF89330F8E}"/>
-    <pc:docChg chg="modSld">
-      <pc:chgData name="Samuel Aldous" userId="0ff3eb4db5f3e0fd" providerId="LiveId" clId="{7273B22C-C245-4F33-9671-B4FF89330F8E}" dt="2025-03-04T14:38:14.319" v="5" actId="14100"/>
+    <pc:docChg chg="custSel addSld modSld">
+      <pc:chgData name="Samuel Aldous" userId="0ff3eb4db5f3e0fd" providerId="LiveId" clId="{7273B22C-C245-4F33-9671-B4FF89330F8E}" dt="2025-03-09T18:17:38.507" v="1256" actId="20577"/>
       <pc:docMkLst>
         <pc:docMk/>
       </pc:docMkLst>
@@ -130,6 +144,37 @@
             <ac:spMk id="6" creationId="{7077D6E7-985E-13D7-E961-55106741562A}"/>
           </ac:spMkLst>
         </pc:spChg>
+      </pc:sldChg>
+      <pc:sldChg chg="addSp delSp modSp new mod">
+        <pc:chgData name="Samuel Aldous" userId="0ff3eb4db5f3e0fd" providerId="LiveId" clId="{7273B22C-C245-4F33-9671-B4FF89330F8E}" dt="2025-03-09T18:17:38.507" v="1256" actId="20577"/>
+        <pc:sldMkLst>
+          <pc:docMk/>
+          <pc:sldMk cId="2377589347" sldId="257"/>
+        </pc:sldMkLst>
+        <pc:spChg chg="add del mod">
+          <ac:chgData name="Samuel Aldous" userId="0ff3eb4db5f3e0fd" providerId="LiveId" clId="{7273B22C-C245-4F33-9671-B4FF89330F8E}" dt="2025-03-09T15:00:07.518" v="19"/>
+          <ac:spMkLst>
+            <pc:docMk/>
+            <pc:sldMk cId="2377589347" sldId="257"/>
+            <ac:spMk id="4" creationId="{457D009B-ACCF-84FE-B3D3-B614A9DEBD69}"/>
+          </ac:spMkLst>
+        </pc:spChg>
+        <pc:spChg chg="add mod">
+          <ac:chgData name="Samuel Aldous" userId="0ff3eb4db5f3e0fd" providerId="LiveId" clId="{7273B22C-C245-4F33-9671-B4FF89330F8E}" dt="2025-03-09T18:17:38.507" v="1256" actId="20577"/>
+          <ac:spMkLst>
+            <pc:docMk/>
+            <pc:sldMk cId="2377589347" sldId="257"/>
+            <ac:spMk id="5" creationId="{B6363686-1F29-900F-C786-F41F94FA357E}"/>
+          </ac:spMkLst>
+        </pc:spChg>
+        <pc:picChg chg="add mod">
+          <ac:chgData name="Samuel Aldous" userId="0ff3eb4db5f3e0fd" providerId="LiveId" clId="{7273B22C-C245-4F33-9671-B4FF89330F8E}" dt="2025-03-09T14:59:34.013" v="13" actId="1076"/>
+          <ac:picMkLst>
+            <pc:docMk/>
+            <pc:sldMk cId="2377589347" sldId="257"/>
+            <ac:picMk id="3" creationId="{A8B8E5C5-D2FD-545F-8731-7C44A6730BCA}"/>
+          </ac:picMkLst>
+        </pc:picChg>
       </pc:sldChg>
     </pc:docChg>
   </pc:docChgLst>
@@ -285,7 +330,7 @@
           <a:p>
             <a:fld id="{7B17242C-12C5-4BCA-8614-627256A12318}" type="datetimeFigureOut">
               <a:rPr lang="en-GB" smtClean="0"/>
-              <a:t>04/03/2025</a:t>
+              <a:t>09/03/2025</a:t>
             </a:fld>
             <a:endParaRPr lang="en-GB"/>
           </a:p>
@@ -485,7 +530,7 @@
           <a:p>
             <a:fld id="{7B17242C-12C5-4BCA-8614-627256A12318}" type="datetimeFigureOut">
               <a:rPr lang="en-GB" smtClean="0"/>
-              <a:t>04/03/2025</a:t>
+              <a:t>09/03/2025</a:t>
             </a:fld>
             <a:endParaRPr lang="en-GB"/>
           </a:p>
@@ -695,7 +740,7 @@
           <a:p>
             <a:fld id="{7B17242C-12C5-4BCA-8614-627256A12318}" type="datetimeFigureOut">
               <a:rPr lang="en-GB" smtClean="0"/>
-              <a:t>04/03/2025</a:t>
+              <a:t>09/03/2025</a:t>
             </a:fld>
             <a:endParaRPr lang="en-GB"/>
           </a:p>
@@ -895,7 +940,7 @@
           <a:p>
             <a:fld id="{7B17242C-12C5-4BCA-8614-627256A12318}" type="datetimeFigureOut">
               <a:rPr lang="en-GB" smtClean="0"/>
-              <a:t>04/03/2025</a:t>
+              <a:t>09/03/2025</a:t>
             </a:fld>
             <a:endParaRPr lang="en-GB"/>
           </a:p>
@@ -1171,7 +1216,7 @@
           <a:p>
             <a:fld id="{7B17242C-12C5-4BCA-8614-627256A12318}" type="datetimeFigureOut">
               <a:rPr lang="en-GB" smtClean="0"/>
-              <a:t>04/03/2025</a:t>
+              <a:t>09/03/2025</a:t>
             </a:fld>
             <a:endParaRPr lang="en-GB"/>
           </a:p>
@@ -1439,7 +1484,7 @@
           <a:p>
             <a:fld id="{7B17242C-12C5-4BCA-8614-627256A12318}" type="datetimeFigureOut">
               <a:rPr lang="en-GB" smtClean="0"/>
-              <a:t>04/03/2025</a:t>
+              <a:t>09/03/2025</a:t>
             </a:fld>
             <a:endParaRPr lang="en-GB"/>
           </a:p>
@@ -1854,7 +1899,7 @@
           <a:p>
             <a:fld id="{7B17242C-12C5-4BCA-8614-627256A12318}" type="datetimeFigureOut">
               <a:rPr lang="en-GB" smtClean="0"/>
-              <a:t>04/03/2025</a:t>
+              <a:t>09/03/2025</a:t>
             </a:fld>
             <a:endParaRPr lang="en-GB"/>
           </a:p>
@@ -1996,7 +2041,7 @@
           <a:p>
             <a:fld id="{7B17242C-12C5-4BCA-8614-627256A12318}" type="datetimeFigureOut">
               <a:rPr lang="en-GB" smtClean="0"/>
-              <a:t>04/03/2025</a:t>
+              <a:t>09/03/2025</a:t>
             </a:fld>
             <a:endParaRPr lang="en-GB"/>
           </a:p>
@@ -2109,7 +2154,7 @@
           <a:p>
             <a:fld id="{7B17242C-12C5-4BCA-8614-627256A12318}" type="datetimeFigureOut">
               <a:rPr lang="en-GB" smtClean="0"/>
-              <a:t>04/03/2025</a:t>
+              <a:t>09/03/2025</a:t>
             </a:fld>
             <a:endParaRPr lang="en-GB"/>
           </a:p>
@@ -2422,7 +2467,7 @@
           <a:p>
             <a:fld id="{7B17242C-12C5-4BCA-8614-627256A12318}" type="datetimeFigureOut">
               <a:rPr lang="en-GB" smtClean="0"/>
-              <a:t>04/03/2025</a:t>
+              <a:t>09/03/2025</a:t>
             </a:fld>
             <a:endParaRPr lang="en-GB"/>
           </a:p>
@@ -2711,7 +2756,7 @@
           <a:p>
             <a:fld id="{7B17242C-12C5-4BCA-8614-627256A12318}" type="datetimeFigureOut">
               <a:rPr lang="en-GB" smtClean="0"/>
-              <a:t>04/03/2025</a:t>
+              <a:t>09/03/2025</a:t>
             </a:fld>
             <a:endParaRPr lang="en-GB"/>
           </a:p>
@@ -2954,7 +2999,7 @@
           <a:p>
             <a:fld id="{7B17242C-12C5-4BCA-8614-627256A12318}" type="datetimeFigureOut">
               <a:rPr lang="en-GB" smtClean="0"/>
-              <a:t>04/03/2025</a:t>
+              <a:t>09/03/2025</a:t>
             </a:fld>
             <a:endParaRPr lang="en-GB"/>
           </a:p>
@@ -3609,6 +3654,156 @@
 </p:sld>
 </file>
 
+<file path=ppt/slides/slide2.xml><?xml version="1.0" encoding="utf-8"?>
+<p:sld xmlns:a="http://schemas.openxmlformats.org/drawingml/2006/main" xmlns:r="http://schemas.openxmlformats.org/officeDocument/2006/relationships" xmlns:p="http://schemas.openxmlformats.org/presentationml/2006/main">
+  <p:cSld>
+    <p:spTree>
+      <p:nvGrpSpPr>
+        <p:cNvPr id="1" name=""/>
+        <p:cNvGrpSpPr/>
+        <p:nvPr/>
+      </p:nvGrpSpPr>
+      <p:grpSpPr>
+        <a:xfrm>
+          <a:off x="0" y="0"/>
+          <a:ext cx="0" cy="0"/>
+          <a:chOff x="0" y="0"/>
+          <a:chExt cx="0" cy="0"/>
+        </a:xfrm>
+      </p:grpSpPr>
+      <p:pic>
+        <p:nvPicPr>
+          <p:cNvPr id="3" name="Picture 2" descr="A line graph with different colored lines&#10;&#10;AI-generated content may be incorrect.">
+            <a:extLst>
+              <a:ext uri="{FF2B5EF4-FFF2-40B4-BE49-F238E27FC236}">
+                <a16:creationId xmlns:a16="http://schemas.microsoft.com/office/drawing/2014/main" id="{A8B8E5C5-D2FD-545F-8731-7C44A6730BCA}"/>
+              </a:ext>
+            </a:extLst>
+          </p:cNvPr>
+          <p:cNvPicPr>
+            <a:picLocks noChangeAspect="1"/>
+          </p:cNvPicPr>
+          <p:nvPr/>
+        </p:nvPicPr>
+        <p:blipFill>
+          <a:blip r:embed="rId2">
+            <a:extLst>
+              <a:ext uri="{28A0092B-C50C-407E-A947-70E740481C1C}">
+                <a14:useLocalDpi xmlns:a14="http://schemas.microsoft.com/office/drawing/2010/main" val="0"/>
+              </a:ext>
+            </a:extLst>
+          </a:blip>
+          <a:stretch>
+            <a:fillRect/>
+          </a:stretch>
+        </p:blipFill>
+        <p:spPr>
+          <a:xfrm>
+            <a:off x="1752903" y="142240"/>
+            <a:ext cx="8183577" cy="5030272"/>
+          </a:xfrm>
+          <a:prstGeom prst="rect">
+            <a:avLst/>
+          </a:prstGeom>
+        </p:spPr>
+      </p:pic>
+      <p:sp>
+        <p:nvSpPr>
+          <p:cNvPr id="5" name="TextBox 4">
+            <a:extLst>
+              <a:ext uri="{FF2B5EF4-FFF2-40B4-BE49-F238E27FC236}">
+                <a16:creationId xmlns:a16="http://schemas.microsoft.com/office/drawing/2014/main" id="{B6363686-1F29-900F-C786-F41F94FA357E}"/>
+              </a:ext>
+            </a:extLst>
+          </p:cNvPr>
+          <p:cNvSpPr txBox="1"/>
+          <p:nvPr/>
+        </p:nvSpPr>
+        <p:spPr>
+          <a:xfrm>
+            <a:off x="1239520" y="5181600"/>
+            <a:ext cx="9458960" cy="1384995"/>
+          </a:xfrm>
+          <a:prstGeom prst="rect">
+            <a:avLst/>
+          </a:prstGeom>
+          <a:noFill/>
+        </p:spPr>
+        <p:txBody>
+          <a:bodyPr wrap="square" rtlCol="0">
+            <a:spAutoFit/>
+          </a:bodyPr>
+          <a:lstStyle/>
+          <a:p>
+            <a:r>
+              <a:rPr lang="en-GB" sz="1400" b="1" dirty="0">
+                <a:latin typeface="Arial" panose="020B0604020202020204" pitchFamily="34" charset="0"/>
+                <a:cs typeface="Arial" panose="020B0604020202020204" pitchFamily="34" charset="0"/>
+              </a:rPr>
+              <a:t>Figure 2. </a:t>
+            </a:r>
+            <a:r>
+              <a:rPr lang="en-GB" sz="1400" dirty="0">
+                <a:latin typeface="Arial" panose="020B0604020202020204" pitchFamily="34" charset="0"/>
+                <a:cs typeface="Arial" panose="020B0604020202020204" pitchFamily="34" charset="0"/>
+              </a:rPr>
+              <a:t>A violin plot, showing the number of mutations per sequence over time. The sequences have been grouped by year. The thicker black line across each distribution represents the median number of mutations per sequence for that year. Median values: 2020 = 3, 2021 = 12, 2022 = 36, 2023 = 44, 2024 = 65. Variance levels: 2020 = 10.7, 2021 = 4.61, 2022 = 12.0, 2023 = 16.7, 2024 = 25.4. There was a significant effect of the year the sequence was taken and the number of mutations per sequence (Kruskal-Wallis: </a:t>
+            </a:r>
+            <a:r>
+              <a:rPr lang="el-GR" sz="1400" dirty="0">
+                <a:latin typeface="Arial" panose="020B0604020202020204" pitchFamily="34" charset="0"/>
+                <a:cs typeface="Arial" panose="020B0604020202020204" pitchFamily="34" charset="0"/>
+              </a:rPr>
+              <a:t>χ2 = 1558575, </a:t>
+            </a:r>
+            <a:r>
+              <a:rPr lang="en-GB" sz="1400" dirty="0" err="1">
+                <a:latin typeface="Arial" panose="020B0604020202020204" pitchFamily="34" charset="0"/>
+                <a:cs typeface="Arial" panose="020B0604020202020204" pitchFamily="34" charset="0"/>
+              </a:rPr>
+              <a:t>d.f.</a:t>
+            </a:r>
+            <a:r>
+              <a:rPr lang="en-GB" sz="1400" dirty="0">
+                <a:latin typeface="Arial" panose="020B0604020202020204" pitchFamily="34" charset="0"/>
+                <a:cs typeface="Arial" panose="020B0604020202020204" pitchFamily="34" charset="0"/>
+              </a:rPr>
+              <a:t> = 4, p = 2.2e-16). Post-hoc comparison showed that there were significant differences between all the years. </a:t>
+            </a:r>
+            <a:r>
+              <a:rPr lang="en-GB" sz="1400">
+                <a:latin typeface="Arial" panose="020B0604020202020204" pitchFamily="34" charset="0"/>
+                <a:cs typeface="Arial" panose="020B0604020202020204" pitchFamily="34" charset="0"/>
+              </a:rPr>
+              <a:t>A significance level </a:t>
+            </a:r>
+            <a:r>
+              <a:rPr lang="en-GB" sz="1400" dirty="0">
+                <a:latin typeface="Arial" panose="020B0604020202020204" pitchFamily="34" charset="0"/>
+                <a:cs typeface="Arial" panose="020B0604020202020204" pitchFamily="34" charset="0"/>
+              </a:rPr>
+              <a:t>of 0.05 was used.</a:t>
+            </a:r>
+            <a:endParaRPr lang="en-GB" sz="1400" b="1" dirty="0">
+              <a:latin typeface="Arial" panose="020B0604020202020204" pitchFamily="34" charset="0"/>
+              <a:cs typeface="Arial" panose="020B0604020202020204" pitchFamily="34" charset="0"/>
+            </a:endParaRPr>
+          </a:p>
+        </p:txBody>
+      </p:sp>
+    </p:spTree>
+    <p:extLst>
+      <p:ext uri="{BB962C8B-B14F-4D97-AF65-F5344CB8AC3E}">
+        <p14:creationId xmlns:p14="http://schemas.microsoft.com/office/powerpoint/2010/main" val="2377589347"/>
+      </p:ext>
+    </p:extLst>
+  </p:cSld>
+  <p:clrMapOvr>
+    <a:masterClrMapping/>
+  </p:clrMapOvr>
+</p:sld>
+</file>
+
 <file path=ppt/theme/theme1.xml><?xml version="1.0" encoding="utf-8"?>
 <a:theme xmlns:a="http://schemas.openxmlformats.org/drawingml/2006/main" name="Office Theme">
   <a:themeElements>

</xml_diff>

<commit_message>
Figure 2 and Figure 3 work
</commit_message>
<xml_diff>
--- a/Plots and Figures/Real plots and figures/Completed figures with captions.pptx
+++ b/Plots and Figures/Real plots and figures/Completed figures with captions.pptx
@@ -130,7 +130,7 @@
   <pc:docChgLst>
     <pc:chgData name="Samuel Aldous" userId="0ff3eb4db5f3e0fd" providerId="LiveId" clId="{7273B22C-C245-4F33-9671-B4FF89330F8E}"/>
     <pc:docChg chg="custSel addSld modSld">
-      <pc:chgData name="Samuel Aldous" userId="0ff3eb4db5f3e0fd" providerId="LiveId" clId="{7273B22C-C245-4F33-9671-B4FF89330F8E}" dt="2025-03-19T15:44:30.852" v="3118" actId="14100"/>
+      <pc:chgData name="Samuel Aldous" userId="0ff3eb4db5f3e0fd" providerId="LiveId" clId="{7273B22C-C245-4F33-9671-B4FF89330F8E}" dt="2025-03-19T15:58:50.140" v="3143" actId="1038"/>
       <pc:docMkLst>
         <pc:docMk/>
       </pc:docMkLst>
@@ -189,13 +189,13 @@
         </pc:picChg>
       </pc:sldChg>
       <pc:sldChg chg="addSp delSp modSp new mod">
-        <pc:chgData name="Samuel Aldous" userId="0ff3eb4db5f3e0fd" providerId="LiveId" clId="{7273B22C-C245-4F33-9671-B4FF89330F8E}" dt="2025-03-14T21:51:24.790" v="2343" actId="20577"/>
+        <pc:chgData name="Samuel Aldous" userId="0ff3eb4db5f3e0fd" providerId="LiveId" clId="{7273B22C-C245-4F33-9671-B4FF89330F8E}" dt="2025-03-19T15:58:50.140" v="3143" actId="1038"/>
         <pc:sldMkLst>
           <pc:docMk/>
           <pc:sldMk cId="2660082026" sldId="258"/>
         </pc:sldMkLst>
         <pc:spChg chg="add mod">
-          <ac:chgData name="Samuel Aldous" userId="0ff3eb4db5f3e0fd" providerId="LiveId" clId="{7273B22C-C245-4F33-9671-B4FF89330F8E}" dt="2025-03-14T21:51:24.790" v="2343" actId="20577"/>
+          <ac:chgData name="Samuel Aldous" userId="0ff3eb4db5f3e0fd" providerId="LiveId" clId="{7273B22C-C245-4F33-9671-B4FF89330F8E}" dt="2025-03-19T15:58:50.140" v="3143" actId="1038"/>
           <ac:spMkLst>
             <pc:docMk/>
             <pc:sldMk cId="2660082026" sldId="258"/>
@@ -203,7 +203,15 @@
           </ac:spMkLst>
         </pc:spChg>
         <pc:picChg chg="add mod">
-          <ac:chgData name="Samuel Aldous" userId="0ff3eb4db5f3e0fd" providerId="LiveId" clId="{7273B22C-C245-4F33-9671-B4FF89330F8E}" dt="2025-03-14T21:34:32.730" v="2342" actId="1076"/>
+          <ac:chgData name="Samuel Aldous" userId="0ff3eb4db5f3e0fd" providerId="LiveId" clId="{7273B22C-C245-4F33-9671-B4FF89330F8E}" dt="2025-03-19T15:58:43.865" v="3127" actId="14100"/>
+          <ac:picMkLst>
+            <pc:docMk/>
+            <pc:sldMk cId="2660082026" sldId="258"/>
+            <ac:picMk id="3" creationId="{127DF550-AFCB-4D02-132E-05D0B4993E0B}"/>
+          </ac:picMkLst>
+        </pc:picChg>
+        <pc:picChg chg="add del mod">
+          <ac:chgData name="Samuel Aldous" userId="0ff3eb4db5f3e0fd" providerId="LiveId" clId="{7273B22C-C245-4F33-9671-B4FF89330F8E}" dt="2025-03-19T15:58:24.955" v="3119" actId="478"/>
           <ac:picMkLst>
             <pc:docMk/>
             <pc:sldMk cId="2660082026" sldId="258"/>
@@ -4298,7 +4306,7 @@
         </p:nvSpPr>
         <p:spPr>
           <a:xfrm>
-            <a:off x="792480" y="5181600"/>
+            <a:off x="914400" y="5222240"/>
             <a:ext cx="9763760" cy="1169551"/>
           </a:xfrm>
           <a:prstGeom prst="rect">
@@ -4349,10 +4357,10 @@
       </p:sp>
       <p:pic>
         <p:nvPicPr>
-          <p:cNvPr id="7" name="Picture 6" descr="A graph of different colored squares&#10;&#10;AI-generated content may be incorrect.">
-            <a:extLst>
-              <a:ext uri="{FF2B5EF4-FFF2-40B4-BE49-F238E27FC236}">
-                <a16:creationId xmlns:a16="http://schemas.microsoft.com/office/drawing/2014/main" id="{0467CEDC-E43D-0D43-1FD5-F9547328E112}"/>
+          <p:cNvPr id="3" name="Picture 2">
+            <a:extLst>
+              <a:ext uri="{FF2B5EF4-FFF2-40B4-BE49-F238E27FC236}">
+                <a16:creationId xmlns:a16="http://schemas.microsoft.com/office/drawing/2014/main" id="{127DF550-AFCB-4D02-132E-05D0B4993E0B}"/>
               </a:ext>
             </a:extLst>
           </p:cNvPr>
@@ -4362,21 +4370,15 @@
           <p:nvPr/>
         </p:nvPicPr>
         <p:blipFill>
-          <a:blip r:embed="rId3">
-            <a:extLst>
-              <a:ext uri="{28A0092B-C50C-407E-A947-70E740481C1C}">
-                <a14:useLocalDpi xmlns:a14="http://schemas.microsoft.com/office/drawing/2010/main" val="0"/>
-              </a:ext>
-            </a:extLst>
-          </a:blip>
+          <a:blip r:embed="rId3"/>
           <a:stretch>
             <a:fillRect/>
           </a:stretch>
         </p:blipFill>
         <p:spPr>
           <a:xfrm>
-            <a:off x="1325880" y="162559"/>
-            <a:ext cx="8122919" cy="4975819"/>
+            <a:off x="1006768" y="63451"/>
+            <a:ext cx="9010992" cy="5229909"/>
           </a:xfrm>
           <a:prstGeom prst="rect">
             <a:avLst/>

</xml_diff>

<commit_message>
Figures 2 and 3, report work
</commit_message>
<xml_diff>
--- a/Plots and Figures/Real plots and figures/Completed figures with captions.pptx
+++ b/Plots and Figures/Real plots and figures/Completed figures with captions.pptx
@@ -129,8 +129,8 @@
 <pc:chgInfo xmlns:a="http://schemas.openxmlformats.org/drawingml/2006/main" xmlns:r="http://schemas.openxmlformats.org/officeDocument/2006/relationships" xmlns:ac="http://schemas.microsoft.com/office/drawing/2013/main/command" xmlns:pc="http://schemas.microsoft.com/office/powerpoint/2013/main/command">
   <pc:docChgLst>
     <pc:chgData name="Samuel Aldous" userId="0ff3eb4db5f3e0fd" providerId="LiveId" clId="{7273B22C-C245-4F33-9671-B4FF89330F8E}"/>
-    <pc:docChg chg="custSel addSld modSld">
-      <pc:chgData name="Samuel Aldous" userId="0ff3eb4db5f3e0fd" providerId="LiveId" clId="{7273B22C-C245-4F33-9671-B4FF89330F8E}" dt="2025-03-19T15:58:50.140" v="3143" actId="1038"/>
+    <pc:docChg chg="undo custSel addSld modSld">
+      <pc:chgData name="Samuel Aldous" userId="0ff3eb4db5f3e0fd" providerId="LiveId" clId="{7273B22C-C245-4F33-9671-B4FF89330F8E}" dt="2025-03-28T19:32:22.057" v="3168" actId="403"/>
       <pc:docMkLst>
         <pc:docMk/>
       </pc:docMkLst>
@@ -150,72 +150,48 @@
         </pc:spChg>
       </pc:sldChg>
       <pc:sldChg chg="addSp delSp modSp new mod">
-        <pc:chgData name="Samuel Aldous" userId="0ff3eb4db5f3e0fd" providerId="LiveId" clId="{7273B22C-C245-4F33-9671-B4FF89330F8E}" dt="2025-03-19T15:44:30.852" v="3118" actId="14100"/>
+        <pc:chgData name="Samuel Aldous" userId="0ff3eb4db5f3e0fd" providerId="LiveId" clId="{7273B22C-C245-4F33-9671-B4FF89330F8E}" dt="2025-03-28T19:32:22.057" v="3168" actId="403"/>
         <pc:sldMkLst>
           <pc:docMk/>
           <pc:sldMk cId="2377589347" sldId="257"/>
         </pc:sldMkLst>
         <pc:spChg chg="add mod">
-          <ac:chgData name="Samuel Aldous" userId="0ff3eb4db5f3e0fd" providerId="LiveId" clId="{7273B22C-C245-4F33-9671-B4FF89330F8E}" dt="2025-03-19T15:41:15.695" v="3111" actId="20577"/>
+          <ac:chgData name="Samuel Aldous" userId="0ff3eb4db5f3e0fd" providerId="LiveId" clId="{7273B22C-C245-4F33-9671-B4FF89330F8E}" dt="2025-03-28T19:32:22.057" v="3168" actId="403"/>
           <ac:spMkLst>
             <pc:docMk/>
             <pc:sldMk cId="2377589347" sldId="257"/>
             <ac:spMk id="5" creationId="{B6363686-1F29-900F-C786-F41F94FA357E}"/>
           </ac:spMkLst>
         </pc:spChg>
-        <pc:picChg chg="add del mod">
-          <ac:chgData name="Samuel Aldous" userId="0ff3eb4db5f3e0fd" providerId="LiveId" clId="{7273B22C-C245-4F33-9671-B4FF89330F8E}" dt="2025-03-19T15:00:29.580" v="2373" actId="478"/>
+        <pc:picChg chg="mod">
+          <ac:chgData name="Samuel Aldous" userId="0ff3eb4db5f3e0fd" providerId="LiveId" clId="{7273B22C-C245-4F33-9671-B4FF89330F8E}" dt="2025-03-28T19:31:32.527" v="3153" actId="14100"/>
           <ac:picMkLst>
             <pc:docMk/>
             <pc:sldMk cId="2377589347" sldId="257"/>
-            <ac:picMk id="3" creationId="{A8B8E5C5-D2FD-545F-8731-7C44A6730BCA}"/>
-          </ac:picMkLst>
-        </pc:picChg>
-        <pc:picChg chg="add del mod modCrop">
-          <ac:chgData name="Samuel Aldous" userId="0ff3eb4db5f3e0fd" providerId="LiveId" clId="{7273B22C-C245-4F33-9671-B4FF89330F8E}" dt="2025-03-19T15:44:17.506" v="3112" actId="478"/>
-          <ac:picMkLst>
-            <pc:docMk/>
-            <pc:sldMk cId="2377589347" sldId="257"/>
-            <ac:picMk id="4" creationId="{89008713-3794-25D1-C5AC-AD7231B700D2}"/>
-          </ac:picMkLst>
-        </pc:picChg>
-        <pc:picChg chg="add mod">
-          <ac:chgData name="Samuel Aldous" userId="0ff3eb4db5f3e0fd" providerId="LiveId" clId="{7273B22C-C245-4F33-9671-B4FF89330F8E}" dt="2025-03-19T15:44:30.852" v="3118" actId="14100"/>
-          <ac:picMkLst>
-            <pc:docMk/>
-            <pc:sldMk cId="2377589347" sldId="257"/>
-            <ac:picMk id="7" creationId="{24E2B2CD-F003-CF26-A634-11F3AB990EC0}"/>
+            <ac:picMk id="2" creationId="{0C6A1559-6B97-4EEC-A9DD-EBB650E21979}"/>
           </ac:picMkLst>
         </pc:picChg>
       </pc:sldChg>
       <pc:sldChg chg="addSp delSp modSp new mod">
-        <pc:chgData name="Samuel Aldous" userId="0ff3eb4db5f3e0fd" providerId="LiveId" clId="{7273B22C-C245-4F33-9671-B4FF89330F8E}" dt="2025-03-19T15:58:50.140" v="3143" actId="1038"/>
+        <pc:chgData name="Samuel Aldous" userId="0ff3eb4db5f3e0fd" providerId="LiveId" clId="{7273B22C-C245-4F33-9671-B4FF89330F8E}" dt="2025-03-28T19:32:13.409" v="3167" actId="1035"/>
         <pc:sldMkLst>
           <pc:docMk/>
           <pc:sldMk cId="2660082026" sldId="258"/>
         </pc:sldMkLst>
         <pc:spChg chg="add mod">
-          <ac:chgData name="Samuel Aldous" userId="0ff3eb4db5f3e0fd" providerId="LiveId" clId="{7273B22C-C245-4F33-9671-B4FF89330F8E}" dt="2025-03-19T15:58:50.140" v="3143" actId="1038"/>
+          <ac:chgData name="Samuel Aldous" userId="0ff3eb4db5f3e0fd" providerId="LiveId" clId="{7273B22C-C245-4F33-9671-B4FF89330F8E}" dt="2025-03-28T19:32:13.409" v="3167" actId="1035"/>
           <ac:spMkLst>
             <pc:docMk/>
             <pc:sldMk cId="2660082026" sldId="258"/>
             <ac:spMk id="5" creationId="{DF6F1468-5F50-38E0-467A-7F174CFE8F43}"/>
           </ac:spMkLst>
         </pc:spChg>
-        <pc:picChg chg="add mod">
-          <ac:chgData name="Samuel Aldous" userId="0ff3eb4db5f3e0fd" providerId="LiveId" clId="{7273B22C-C245-4F33-9671-B4FF89330F8E}" dt="2025-03-19T15:58:43.865" v="3127" actId="14100"/>
+        <pc:picChg chg="mod">
+          <ac:chgData name="Samuel Aldous" userId="0ff3eb4db5f3e0fd" providerId="LiveId" clId="{7273B22C-C245-4F33-9671-B4FF89330F8E}" dt="2025-03-28T19:32:04.006" v="3155" actId="552"/>
           <ac:picMkLst>
             <pc:docMk/>
             <pc:sldMk cId="2660082026" sldId="258"/>
-            <ac:picMk id="3" creationId="{127DF550-AFCB-4D02-132E-05D0B4993E0B}"/>
-          </ac:picMkLst>
-        </pc:picChg>
-        <pc:picChg chg="add del mod">
-          <ac:chgData name="Samuel Aldous" userId="0ff3eb4db5f3e0fd" providerId="LiveId" clId="{7273B22C-C245-4F33-9671-B4FF89330F8E}" dt="2025-03-19T15:58:24.955" v="3119" actId="478"/>
-          <ac:picMkLst>
-            <pc:docMk/>
-            <pc:sldMk cId="2660082026" sldId="258"/>
-            <ac:picMk id="7" creationId="{0467CEDC-E43D-0D43-1FD5-F9547328E112}"/>
+            <ac:picMk id="4" creationId="{B76652E6-CED2-41D1-8DEE-59F278B2351E}"/>
           </ac:picMkLst>
         </pc:picChg>
       </pc:sldChg>
@@ -4162,8 +4138,8 @@
         </p:nvSpPr>
         <p:spPr>
           <a:xfrm>
-            <a:off x="456362" y="3837540"/>
-            <a:ext cx="10273607" cy="1384995"/>
+            <a:off x="0" y="3837540"/>
+            <a:ext cx="12192000" cy="1600438"/>
           </a:xfrm>
           <a:prstGeom prst="rect">
             <a:avLst/>
@@ -4177,55 +4153,55 @@
           <a:lstStyle/>
           <a:p>
             <a:r>
-              <a:rPr lang="en-GB" sz="1200" b="1" dirty="0">
+              <a:rPr lang="en-GB" sz="1400" b="1" dirty="0">
                 <a:latin typeface="Arial" panose="020B0604020202020204" pitchFamily="34" charset="0"/>
                 <a:cs typeface="Arial" panose="020B0604020202020204" pitchFamily="34" charset="0"/>
               </a:rPr>
               <a:t>Figure 2. A </a:t>
             </a:r>
             <a:r>
-              <a:rPr lang="en-GB" sz="1200" dirty="0">
+              <a:rPr lang="en-GB" sz="1400" dirty="0">
                 <a:latin typeface="Arial" panose="020B0604020202020204" pitchFamily="34" charset="0"/>
                 <a:cs typeface="Arial" panose="020B0604020202020204" pitchFamily="34" charset="0"/>
               </a:rPr>
               <a:t>Violin plot, showing the number of mutations per sequence over time. The sequences have been grouped by year. The thicker black line across each distribution represents the median number of mutations per sequence for that year. Median values are as follows: 2020 = 3, 2021 = 12, 2022 = 36, 2023 = 44, 2024 = 65. Variance levels: 2020 = 10.7, 2021 = 4.61, 2022 = 12.0, 2023 = 16.7, 2024 = 25.4. There was a significant effect of the year the sequence was taken and the number of mutations per sequence (Kruskal-Wallis: </a:t>
             </a:r>
             <a:r>
-              <a:rPr lang="el-GR" sz="1200" dirty="0">
+              <a:rPr lang="el-GR" sz="1400" dirty="0">
                 <a:latin typeface="Arial" panose="020B0604020202020204" pitchFamily="34" charset="0"/>
                 <a:cs typeface="Arial" panose="020B0604020202020204" pitchFamily="34" charset="0"/>
               </a:rPr>
               <a:t>χ2 = 1558575, </a:t>
             </a:r>
             <a:r>
-              <a:rPr lang="en-GB" sz="1200" dirty="0" err="1">
+              <a:rPr lang="en-GB" sz="1400" dirty="0" err="1">
                 <a:latin typeface="Arial" panose="020B0604020202020204" pitchFamily="34" charset="0"/>
                 <a:cs typeface="Arial" panose="020B0604020202020204" pitchFamily="34" charset="0"/>
               </a:rPr>
               <a:t>d.f.</a:t>
             </a:r>
             <a:r>
-              <a:rPr lang="en-GB" sz="1200" dirty="0">
+              <a:rPr lang="en-GB" sz="1400" dirty="0">
                 <a:latin typeface="Arial" panose="020B0604020202020204" pitchFamily="34" charset="0"/>
                 <a:cs typeface="Arial" panose="020B0604020202020204" pitchFamily="34" charset="0"/>
               </a:rPr>
               <a:t> = 4, p &gt; 2.2e-16). Post-hoc comparison showed that there were significant differences between all the years. A significance level of 0.05 was used</a:t>
             </a:r>
             <a:r>
-              <a:rPr lang="en-GB" sz="1200" b="1" dirty="0">
+              <a:rPr lang="en-GB" sz="1400" b="1" dirty="0">
                 <a:latin typeface="Arial" panose="020B0604020202020204" pitchFamily="34" charset="0"/>
                 <a:cs typeface="Arial" panose="020B0604020202020204" pitchFamily="34" charset="0"/>
               </a:rPr>
               <a:t>. B</a:t>
             </a:r>
             <a:r>
-              <a:rPr lang="en-GB" sz="1200" dirty="0">
+              <a:rPr lang="en-GB" sz="1400" dirty="0">
                 <a:latin typeface="Arial" panose="020B0604020202020204" pitchFamily="34" charset="0"/>
                 <a:cs typeface="Arial" panose="020B0604020202020204" pitchFamily="34" charset="0"/>
               </a:rPr>
               <a:t> Scatter plot showing the median number of mutations per sequence over time (2020–2024). A strong positive correlation was observed between year and the median number of mutations per sequence (Spearman’s ρ = 0.895). The linear regression line suggests a consistent increase in median mutations over time.</a:t>
             </a:r>
-            <a:endParaRPr lang="en-GB" sz="1200" b="1" dirty="0">
+            <a:endParaRPr lang="en-GB" sz="1400" b="1" dirty="0">
               <a:latin typeface="Arial" panose="020B0604020202020204" pitchFamily="34" charset="0"/>
               <a:cs typeface="Arial" panose="020B0604020202020204" pitchFamily="34" charset="0"/>
             </a:endParaRPr>
@@ -4305,8 +4281,8 @@
         </p:nvSpPr>
         <p:spPr>
           <a:xfrm>
-            <a:off x="976544" y="4565292"/>
-            <a:ext cx="9763760" cy="1169551"/>
+            <a:off x="-2" y="4450991"/>
+            <a:ext cx="12192001" cy="954107"/>
           </a:xfrm>
           <a:prstGeom prst="rect">
             <a:avLst/>

</xml_diff>

<commit_message>
Figures 2 and 3 changed, more dimensionality reduction report work
</commit_message>
<xml_diff>
--- a/Plots and Figures/Real plots and figures/Completed figures with captions.pptx
+++ b/Plots and Figures/Real plots and figures/Completed figures with captions.pptx
@@ -131,7 +131,7 @@
   <pc:docChgLst>
     <pc:chgData name="Samuel Aldous" userId="0ff3eb4db5f3e0fd" providerId="LiveId" clId="{7273B22C-C245-4F33-9671-B4FF89330F8E}"/>
     <pc:docChg chg="undo custSel addSld modSld">
-      <pc:chgData name="Samuel Aldous" userId="0ff3eb4db5f3e0fd" providerId="LiveId" clId="{7273B22C-C245-4F33-9671-B4FF89330F8E}" dt="2025-03-29T17:16:27.633" v="3892" actId="113"/>
+      <pc:chgData name="Samuel Aldous" userId="0ff3eb4db5f3e0fd" providerId="LiveId" clId="{7273B22C-C245-4F33-9671-B4FF89330F8E}" dt="2025-03-30T10:12:13.698" v="4152" actId="20577"/>
       <pc:docMkLst>
         <pc:docMk/>
       </pc:docMkLst>
@@ -151,48 +151,72 @@
         </pc:spChg>
       </pc:sldChg>
       <pc:sldChg chg="addSp delSp modSp new mod">
-        <pc:chgData name="Samuel Aldous" userId="0ff3eb4db5f3e0fd" providerId="LiveId" clId="{7273B22C-C245-4F33-9671-B4FF89330F8E}" dt="2025-03-28T19:32:22.057" v="3168" actId="403"/>
+        <pc:chgData name="Samuel Aldous" userId="0ff3eb4db5f3e0fd" providerId="LiveId" clId="{7273B22C-C245-4F33-9671-B4FF89330F8E}" dt="2025-03-30T09:59:45.317" v="4030" actId="14100"/>
         <pc:sldMkLst>
           <pc:docMk/>
           <pc:sldMk cId="2377589347" sldId="257"/>
         </pc:sldMkLst>
         <pc:spChg chg="add mod">
-          <ac:chgData name="Samuel Aldous" userId="0ff3eb4db5f3e0fd" providerId="LiveId" clId="{7273B22C-C245-4F33-9671-B4FF89330F8E}" dt="2025-03-28T19:32:22.057" v="3168" actId="403"/>
+          <ac:chgData name="Samuel Aldous" userId="0ff3eb4db5f3e0fd" providerId="LiveId" clId="{7273B22C-C245-4F33-9671-B4FF89330F8E}" dt="2025-03-30T09:59:12.156" v="4027" actId="1035"/>
           <ac:spMkLst>
             <pc:docMk/>
             <pc:sldMk cId="2377589347" sldId="257"/>
             <ac:spMk id="5" creationId="{B6363686-1F29-900F-C786-F41F94FA357E}"/>
           </ac:spMkLst>
         </pc:spChg>
-        <pc:picChg chg="mod">
-          <ac:chgData name="Samuel Aldous" userId="0ff3eb4db5f3e0fd" providerId="LiveId" clId="{7273B22C-C245-4F33-9671-B4FF89330F8E}" dt="2025-03-28T19:31:32.527" v="3153" actId="14100"/>
+        <pc:picChg chg="del mod">
+          <ac:chgData name="Samuel Aldous" userId="0ff3eb4db5f3e0fd" providerId="LiveId" clId="{7273B22C-C245-4F33-9671-B4FF89330F8E}" dt="2025-03-30T09:47:46.531" v="3893" actId="478"/>
           <ac:picMkLst>
             <pc:docMk/>
             <pc:sldMk cId="2377589347" sldId="257"/>
             <ac:picMk id="2" creationId="{0C6A1559-6B97-4EEC-A9DD-EBB650E21979}"/>
           </ac:picMkLst>
         </pc:picChg>
+        <pc:picChg chg="add mod">
+          <ac:chgData name="Samuel Aldous" userId="0ff3eb4db5f3e0fd" providerId="LiveId" clId="{7273B22C-C245-4F33-9671-B4FF89330F8E}" dt="2025-03-30T09:59:45.317" v="4030" actId="14100"/>
+          <ac:picMkLst>
+            <pc:docMk/>
+            <pc:sldMk cId="2377589347" sldId="257"/>
+            <ac:picMk id="4" creationId="{48B2FCF7-B52A-1EEE-5EE3-F7B390A435D8}"/>
+          </ac:picMkLst>
+        </pc:picChg>
       </pc:sldChg>
       <pc:sldChg chg="addSp delSp modSp new mod">
-        <pc:chgData name="Samuel Aldous" userId="0ff3eb4db5f3e0fd" providerId="LiveId" clId="{7273B22C-C245-4F33-9671-B4FF89330F8E}" dt="2025-03-28T19:32:13.409" v="3167" actId="1035"/>
+        <pc:chgData name="Samuel Aldous" userId="0ff3eb4db5f3e0fd" providerId="LiveId" clId="{7273B22C-C245-4F33-9671-B4FF89330F8E}" dt="2025-03-30T10:12:13.698" v="4152" actId="20577"/>
         <pc:sldMkLst>
           <pc:docMk/>
           <pc:sldMk cId="2660082026" sldId="258"/>
         </pc:sldMkLst>
         <pc:spChg chg="add mod">
-          <ac:chgData name="Samuel Aldous" userId="0ff3eb4db5f3e0fd" providerId="LiveId" clId="{7273B22C-C245-4F33-9671-B4FF89330F8E}" dt="2025-03-28T19:32:13.409" v="3167" actId="1035"/>
+          <ac:chgData name="Samuel Aldous" userId="0ff3eb4db5f3e0fd" providerId="LiveId" clId="{7273B22C-C245-4F33-9671-B4FF89330F8E}" dt="2025-03-30T10:12:13.698" v="4152" actId="20577"/>
           <ac:spMkLst>
             <pc:docMk/>
             <pc:sldMk cId="2660082026" sldId="258"/>
             <ac:spMk id="5" creationId="{DF6F1468-5F50-38E0-467A-7F174CFE8F43}"/>
           </ac:spMkLst>
         </pc:spChg>
-        <pc:picChg chg="mod">
-          <ac:chgData name="Samuel Aldous" userId="0ff3eb4db5f3e0fd" providerId="LiveId" clId="{7273B22C-C245-4F33-9671-B4FF89330F8E}" dt="2025-03-28T19:32:04.006" v="3155" actId="552"/>
+        <pc:picChg chg="add del mod">
+          <ac:chgData name="Samuel Aldous" userId="0ff3eb4db5f3e0fd" providerId="LiveId" clId="{7273B22C-C245-4F33-9671-B4FF89330F8E}" dt="2025-03-30T10:07:11.476" v="4077" actId="478"/>
+          <ac:picMkLst>
+            <pc:docMk/>
+            <pc:sldMk cId="2660082026" sldId="258"/>
+            <ac:picMk id="3" creationId="{98F6940B-0659-36C1-98CA-A0254E38CE15}"/>
+          </ac:picMkLst>
+        </pc:picChg>
+        <pc:picChg chg="del mod">
+          <ac:chgData name="Samuel Aldous" userId="0ff3eb4db5f3e0fd" providerId="LiveId" clId="{7273B22C-C245-4F33-9671-B4FF89330F8E}" dt="2025-03-30T09:47:51.301" v="3894" actId="478"/>
           <ac:picMkLst>
             <pc:docMk/>
             <pc:sldMk cId="2660082026" sldId="258"/>
             <ac:picMk id="4" creationId="{B76652E6-CED2-41D1-8DEE-59F278B2351E}"/>
+          </ac:picMkLst>
+        </pc:picChg>
+        <pc:picChg chg="add mod">
+          <ac:chgData name="Samuel Aldous" userId="0ff3eb4db5f3e0fd" providerId="LiveId" clId="{7273B22C-C245-4F33-9671-B4FF89330F8E}" dt="2025-03-30T10:07:43.928" v="4086" actId="14100"/>
+          <ac:picMkLst>
+            <pc:docMk/>
+            <pc:sldMk cId="2660082026" sldId="258"/>
+            <ac:picMk id="7" creationId="{850AC340-255D-0C4F-E3F4-B3BC8E6E8D45}"/>
           </ac:picMkLst>
         </pc:picChg>
       </pc:sldChg>
@@ -298,7 +322,7 @@
           <a:p>
             <a:fld id="{B5F3BB3C-60B3-4EAD-B55D-4EAADA830A78}" type="datetimeFigureOut">
               <a:rPr lang="en-GB" smtClean="0"/>
-              <a:t>29/03/2025</a:t>
+              <a:t>30/03/2025</a:t>
             </a:fld>
             <a:endParaRPr lang="en-GB"/>
           </a:p>
@@ -631,6 +655,90 @@
           <a:p>
             <a:fld id="{AAAAD632-E4E9-4110-93DC-E1EB88D29676}" type="slidenum">
               <a:rPr lang="en-GB" smtClean="0"/>
+              <a:t>2</a:t>
+            </a:fld>
+            <a:endParaRPr lang="en-GB"/>
+          </a:p>
+        </p:txBody>
+      </p:sp>
+    </p:spTree>
+    <p:extLst>
+      <p:ext uri="{BB962C8B-B14F-4D97-AF65-F5344CB8AC3E}">
+        <p14:creationId xmlns:p14="http://schemas.microsoft.com/office/powerpoint/2010/main" val="3046526175"/>
+      </p:ext>
+    </p:extLst>
+  </p:cSld>
+  <p:clrMapOvr>
+    <a:masterClrMapping/>
+  </p:clrMapOvr>
+</p:notes>
+</file>
+
+<file path=ppt/notesSlides/notesSlide2.xml><?xml version="1.0" encoding="utf-8"?>
+<p:notes xmlns:a="http://schemas.openxmlformats.org/drawingml/2006/main" xmlns:r="http://schemas.openxmlformats.org/officeDocument/2006/relationships" xmlns:p="http://schemas.openxmlformats.org/presentationml/2006/main">
+  <p:cSld>
+    <p:spTree>
+      <p:nvGrpSpPr>
+        <p:cNvPr id="1" name=""/>
+        <p:cNvGrpSpPr/>
+        <p:nvPr/>
+      </p:nvGrpSpPr>
+      <p:grpSpPr>
+        <a:xfrm>
+          <a:off x="0" y="0"/>
+          <a:ext cx="0" cy="0"/>
+          <a:chOff x="0" y="0"/>
+          <a:chExt cx="0" cy="0"/>
+        </a:xfrm>
+      </p:grpSpPr>
+      <p:sp>
+        <p:nvSpPr>
+          <p:cNvPr id="2" name="Slide Image Placeholder 1"/>
+          <p:cNvSpPr>
+            <a:spLocks noGrp="1" noRot="1" noChangeAspect="1"/>
+          </p:cNvSpPr>
+          <p:nvPr>
+            <p:ph type="sldImg"/>
+          </p:nvPr>
+        </p:nvSpPr>
+        <p:spPr/>
+      </p:sp>
+      <p:sp>
+        <p:nvSpPr>
+          <p:cNvPr id="3" name="Notes Placeholder 2"/>
+          <p:cNvSpPr>
+            <a:spLocks noGrp="1"/>
+          </p:cNvSpPr>
+          <p:nvPr>
+            <p:ph type="body" idx="1"/>
+          </p:nvPr>
+        </p:nvSpPr>
+        <p:spPr/>
+        <p:txBody>
+          <a:bodyPr/>
+          <a:lstStyle/>
+          <a:p>
+            <a:endParaRPr lang="en-GB" dirty="0"/>
+          </a:p>
+        </p:txBody>
+      </p:sp>
+      <p:sp>
+        <p:nvSpPr>
+          <p:cNvPr id="4" name="Slide Number Placeholder 3"/>
+          <p:cNvSpPr>
+            <a:spLocks noGrp="1"/>
+          </p:cNvSpPr>
+          <p:nvPr>
+            <p:ph type="sldNum" sz="quarter" idx="5"/>
+          </p:nvPr>
+        </p:nvSpPr>
+        <p:spPr/>
+        <p:txBody>
+          <a:bodyPr/>
+          <a:lstStyle/>
+          <a:p>
+            <a:fld id="{AAAAD632-E4E9-4110-93DC-E1EB88D29676}" type="slidenum">
+              <a:rPr lang="en-GB" smtClean="0"/>
               <a:t>3</a:t>
             </a:fld>
             <a:endParaRPr lang="en-GB"/>
@@ -799,7 +907,7 @@
           <a:p>
             <a:fld id="{7B17242C-12C5-4BCA-8614-627256A12318}" type="datetimeFigureOut">
               <a:rPr lang="en-GB" smtClean="0"/>
-              <a:t>29/03/2025</a:t>
+              <a:t>30/03/2025</a:t>
             </a:fld>
             <a:endParaRPr lang="en-GB"/>
           </a:p>
@@ -999,7 +1107,7 @@
           <a:p>
             <a:fld id="{7B17242C-12C5-4BCA-8614-627256A12318}" type="datetimeFigureOut">
               <a:rPr lang="en-GB" smtClean="0"/>
-              <a:t>29/03/2025</a:t>
+              <a:t>30/03/2025</a:t>
             </a:fld>
             <a:endParaRPr lang="en-GB"/>
           </a:p>
@@ -1209,7 +1317,7 @@
           <a:p>
             <a:fld id="{7B17242C-12C5-4BCA-8614-627256A12318}" type="datetimeFigureOut">
               <a:rPr lang="en-GB" smtClean="0"/>
-              <a:t>29/03/2025</a:t>
+              <a:t>30/03/2025</a:t>
             </a:fld>
             <a:endParaRPr lang="en-GB"/>
           </a:p>
@@ -1409,7 +1517,7 @@
           <a:p>
             <a:fld id="{7B17242C-12C5-4BCA-8614-627256A12318}" type="datetimeFigureOut">
               <a:rPr lang="en-GB" smtClean="0"/>
-              <a:t>29/03/2025</a:t>
+              <a:t>30/03/2025</a:t>
             </a:fld>
             <a:endParaRPr lang="en-GB"/>
           </a:p>
@@ -1685,7 +1793,7 @@
           <a:p>
             <a:fld id="{7B17242C-12C5-4BCA-8614-627256A12318}" type="datetimeFigureOut">
               <a:rPr lang="en-GB" smtClean="0"/>
-              <a:t>29/03/2025</a:t>
+              <a:t>30/03/2025</a:t>
             </a:fld>
             <a:endParaRPr lang="en-GB"/>
           </a:p>
@@ -1953,7 +2061,7 @@
           <a:p>
             <a:fld id="{7B17242C-12C5-4BCA-8614-627256A12318}" type="datetimeFigureOut">
               <a:rPr lang="en-GB" smtClean="0"/>
-              <a:t>29/03/2025</a:t>
+              <a:t>30/03/2025</a:t>
             </a:fld>
             <a:endParaRPr lang="en-GB"/>
           </a:p>
@@ -2368,7 +2476,7 @@
           <a:p>
             <a:fld id="{7B17242C-12C5-4BCA-8614-627256A12318}" type="datetimeFigureOut">
               <a:rPr lang="en-GB" smtClean="0"/>
-              <a:t>29/03/2025</a:t>
+              <a:t>30/03/2025</a:t>
             </a:fld>
             <a:endParaRPr lang="en-GB"/>
           </a:p>
@@ -2510,7 +2618,7 @@
           <a:p>
             <a:fld id="{7B17242C-12C5-4BCA-8614-627256A12318}" type="datetimeFigureOut">
               <a:rPr lang="en-GB" smtClean="0"/>
-              <a:t>29/03/2025</a:t>
+              <a:t>30/03/2025</a:t>
             </a:fld>
             <a:endParaRPr lang="en-GB"/>
           </a:p>
@@ -2623,7 +2731,7 @@
           <a:p>
             <a:fld id="{7B17242C-12C5-4BCA-8614-627256A12318}" type="datetimeFigureOut">
               <a:rPr lang="en-GB" smtClean="0"/>
-              <a:t>29/03/2025</a:t>
+              <a:t>30/03/2025</a:t>
             </a:fld>
             <a:endParaRPr lang="en-GB"/>
           </a:p>
@@ -2936,7 +3044,7 @@
           <a:p>
             <a:fld id="{7B17242C-12C5-4BCA-8614-627256A12318}" type="datetimeFigureOut">
               <a:rPr lang="en-GB" smtClean="0"/>
-              <a:t>29/03/2025</a:t>
+              <a:t>30/03/2025</a:t>
             </a:fld>
             <a:endParaRPr lang="en-GB"/>
           </a:p>
@@ -3225,7 +3333,7 @@
           <a:p>
             <a:fld id="{7B17242C-12C5-4BCA-8614-627256A12318}" type="datetimeFigureOut">
               <a:rPr lang="en-GB" smtClean="0"/>
-              <a:t>29/03/2025</a:t>
+              <a:t>30/03/2025</a:t>
             </a:fld>
             <a:endParaRPr lang="en-GB"/>
           </a:p>
@@ -3468,7 +3576,7 @@
           <a:p>
             <a:fld id="{7B17242C-12C5-4BCA-8614-627256A12318}" type="datetimeFigureOut">
               <a:rPr lang="en-GB" smtClean="0"/>
-              <a:t>29/03/2025</a:t>
+              <a:t>30/03/2025</a:t>
             </a:fld>
             <a:endParaRPr lang="en-GB"/>
           </a:p>
@@ -4154,8 +4262,8 @@
         </p:nvSpPr>
         <p:spPr>
           <a:xfrm>
-            <a:off x="0" y="3837540"/>
-            <a:ext cx="12192000" cy="1600438"/>
+            <a:off x="0" y="5670695"/>
+            <a:ext cx="12192000" cy="1200329"/>
           </a:xfrm>
           <a:prstGeom prst="rect">
             <a:avLst/>
@@ -4169,55 +4277,55 @@
           <a:lstStyle/>
           <a:p>
             <a:r>
-              <a:rPr lang="en-GB" sz="1400" b="1" dirty="0">
+              <a:rPr lang="en-GB" sz="1200" b="1" dirty="0">
                 <a:latin typeface="Arial" panose="020B0604020202020204" pitchFamily="34" charset="0"/>
                 <a:cs typeface="Arial" panose="020B0604020202020204" pitchFamily="34" charset="0"/>
               </a:rPr>
               <a:t>Figure 2. A </a:t>
             </a:r>
             <a:r>
-              <a:rPr lang="en-GB" sz="1400" dirty="0">
+              <a:rPr lang="en-GB" sz="1200" dirty="0">
                 <a:latin typeface="Arial" panose="020B0604020202020204" pitchFamily="34" charset="0"/>
                 <a:cs typeface="Arial" panose="020B0604020202020204" pitchFamily="34" charset="0"/>
               </a:rPr>
               <a:t>Violin plot, showing the number of mutations per sequence over time. The sequences have been grouped by year. The thicker black line across each distribution represents the median number of mutations per sequence for that year. Median values are as follows: 2020 = 3, 2021 = 12, 2022 = 36, 2023 = 44, 2024 = 65. Variance levels: 2020 = 10.7, 2021 = 4.61, 2022 = 12.0, 2023 = 16.7, 2024 = 25.4. There was a significant effect of the year the sequence was taken and the number of mutations per sequence (Kruskal-Wallis: </a:t>
             </a:r>
             <a:r>
-              <a:rPr lang="el-GR" sz="1400" dirty="0">
+              <a:rPr lang="el-GR" sz="1200" dirty="0">
                 <a:latin typeface="Arial" panose="020B0604020202020204" pitchFamily="34" charset="0"/>
                 <a:cs typeface="Arial" panose="020B0604020202020204" pitchFamily="34" charset="0"/>
               </a:rPr>
               <a:t>χ2 = 1558575, </a:t>
             </a:r>
             <a:r>
-              <a:rPr lang="en-GB" sz="1400" dirty="0" err="1">
+              <a:rPr lang="en-GB" sz="1200" dirty="0" err="1">
                 <a:latin typeface="Arial" panose="020B0604020202020204" pitchFamily="34" charset="0"/>
                 <a:cs typeface="Arial" panose="020B0604020202020204" pitchFamily="34" charset="0"/>
               </a:rPr>
               <a:t>d.f.</a:t>
             </a:r>
             <a:r>
-              <a:rPr lang="en-GB" sz="1400" dirty="0">
+              <a:rPr lang="en-GB" sz="1200" dirty="0">
                 <a:latin typeface="Arial" panose="020B0604020202020204" pitchFamily="34" charset="0"/>
                 <a:cs typeface="Arial" panose="020B0604020202020204" pitchFamily="34" charset="0"/>
               </a:rPr>
               <a:t> = 4, p &gt; 2.2e-16). Post-hoc comparison showed that there were significant differences between all the years. A significance level of 0.05 was used</a:t>
             </a:r>
             <a:r>
-              <a:rPr lang="en-GB" sz="1400" b="1" dirty="0">
+              <a:rPr lang="en-GB" sz="1200" b="1" dirty="0">
                 <a:latin typeface="Arial" panose="020B0604020202020204" pitchFamily="34" charset="0"/>
                 <a:cs typeface="Arial" panose="020B0604020202020204" pitchFamily="34" charset="0"/>
               </a:rPr>
               <a:t>. B</a:t>
             </a:r>
             <a:r>
-              <a:rPr lang="en-GB" sz="1400" dirty="0">
+              <a:rPr lang="en-GB" sz="1200" dirty="0">
                 <a:latin typeface="Arial" panose="020B0604020202020204" pitchFamily="34" charset="0"/>
                 <a:cs typeface="Arial" panose="020B0604020202020204" pitchFamily="34" charset="0"/>
               </a:rPr>
               <a:t> Scatter plot showing the median number of mutations per sequence over time (2020–2024). A strong positive correlation was observed between year and the median number of mutations per sequence (Spearman’s ρ = 0.895). The linear regression line suggests a consistent increase in median mutations over time.</a:t>
             </a:r>
-            <a:endParaRPr lang="en-GB" sz="1400" b="1" dirty="0">
+            <a:endParaRPr lang="en-GB" sz="1200" b="1" dirty="0">
               <a:latin typeface="Arial" panose="020B0604020202020204" pitchFamily="34" charset="0"/>
               <a:cs typeface="Arial" panose="020B0604020202020204" pitchFamily="34" charset="0"/>
             </a:endParaRPr>
@@ -4226,10 +4334,10 @@
       </p:sp>
       <p:pic>
         <p:nvPicPr>
-          <p:cNvPr id="2" name="Picture 1">
-            <a:extLst>
-              <a:ext uri="{FF2B5EF4-FFF2-40B4-BE49-F238E27FC236}">
-                <a16:creationId xmlns:a16="http://schemas.microsoft.com/office/drawing/2014/main" id="{0C6A1559-6B97-4EEC-A9DD-EBB650E21979}"/>
+          <p:cNvPr id="4" name="Picture 3">
+            <a:extLst>
+              <a:ext uri="{FF2B5EF4-FFF2-40B4-BE49-F238E27FC236}">
+                <a16:creationId xmlns:a16="http://schemas.microsoft.com/office/drawing/2014/main" id="{48B2FCF7-B52A-1EEE-5EE3-F7B390A435D8}"/>
               </a:ext>
             </a:extLst>
           </p:cNvPr>
@@ -4238,15 +4346,16 @@
           </p:cNvPicPr>
           <p:nvPr/>
         </p:nvPicPr>
-        <p:blipFill rotWithShape="1">
-          <a:blip r:embed="rId2"/>
-          <a:srcRect b="5177"/>
-          <a:stretch/>
+        <p:blipFill>
+          <a:blip r:embed="rId3"/>
+          <a:stretch>
+            <a:fillRect/>
+          </a:stretch>
         </p:blipFill>
         <p:spPr>
           <a:xfrm>
-            <a:off x="0" y="-1"/>
-            <a:ext cx="12192000" cy="3615436"/>
+            <a:off x="0" y="0"/>
+            <a:ext cx="12192000" cy="5740400"/>
           </a:xfrm>
           <a:prstGeom prst="rect">
             <a:avLst/>
@@ -4297,8 +4406,8 @@
         </p:nvSpPr>
         <p:spPr>
           <a:xfrm>
-            <a:off x="-2" y="4450991"/>
-            <a:ext cx="12192001" cy="954107"/>
+            <a:off x="-2" y="6015631"/>
+            <a:ext cx="12192001" cy="830997"/>
           </a:xfrm>
           <a:prstGeom prst="rect">
             <a:avLst/>
@@ -4312,34 +4421,48 @@
           <a:lstStyle/>
           <a:p>
             <a:r>
-              <a:rPr lang="en-GB" sz="1400" b="1" dirty="0">
+              <a:rPr lang="en-GB" sz="1200" b="1" dirty="0">
                 <a:latin typeface="Arial" panose="020B0604020202020204" pitchFamily="34" charset="0"/>
                 <a:cs typeface="Arial" panose="020B0604020202020204" pitchFamily="34" charset="0"/>
               </a:rPr>
               <a:t>Figure 3.  A </a:t>
             </a:r>
             <a:r>
-              <a:rPr lang="en-GB" sz="1400" dirty="0">
+              <a:rPr lang="en-GB" sz="1200" dirty="0">
                 <a:latin typeface="Arial" panose="020B0604020202020204" pitchFamily="34" charset="0"/>
                 <a:cs typeface="Arial" panose="020B0604020202020204" pitchFamily="34" charset="0"/>
               </a:rPr>
-              <a:t>The emergence of novel SARS-CoV-2 spike protein mutations from 2020 - 2024. Figure depicts the number of novel mutations for any given sample date. The colours represent the year the sample was taken: 2020 – red,  2021 - blue,  2022 - green, 2023 - yellow and 2024 - purple. Mean values for each year: 2020 = 10.8, 2021 = 29.0, 2022 = 7.95, 2023 = 3.47, 2024 = 2.25. </a:t>
-            </a:r>
-            <a:r>
-              <a:rPr lang="en-GB" sz="1400" b="1" dirty="0">
+              <a:t>The emergence of novel SARS-CoV-2 spike protein mutations from 2020 - 2024. Figure depicts the number of novel mutations for any given sample date. The colours represent the year the sample was taken: 2020 – yellow,  2021 - orange,  2022 - pink, 2023 - purple and 2024 – dark blue. Mean values for each year: 2020 = 10.8, 2021 = 29.0, 2022 = 7.95, 2023 = 3.47, 2024 = </a:t>
+            </a:r>
+            <a:r>
+              <a:rPr lang="en-GB" sz="1200">
+                <a:latin typeface="Arial" panose="020B0604020202020204" pitchFamily="34" charset="0"/>
+                <a:cs typeface="Arial" panose="020B0604020202020204" pitchFamily="34" charset="0"/>
+              </a:rPr>
+              <a:t>2.25. </a:t>
+            </a:r>
+            <a:r>
+              <a:rPr lang="en-GB" sz="1200" b="1">
                 <a:latin typeface="Arial" panose="020B0604020202020204" pitchFamily="34" charset="0"/>
                 <a:cs typeface="Arial" panose="020B0604020202020204" pitchFamily="34" charset="0"/>
               </a:rPr>
               <a:t>B</a:t>
             </a:r>
             <a:r>
-              <a:rPr lang="en-GB" sz="1400" dirty="0">
+              <a:rPr lang="en-GB" sz="1200">
                 <a:latin typeface="Arial" panose="020B0604020202020204" pitchFamily="34" charset="0"/>
                 <a:cs typeface="Arial" panose="020B0604020202020204" pitchFamily="34" charset="0"/>
               </a:rPr>
-              <a:t>  The median number of novel mutations from 2020 - 2024. Median values for each year: 2020 = 2, 2021 = 14, 2022 = 4, 2023 = 2, 2024 = 1.</a:t>
-            </a:r>
-            <a:endParaRPr lang="en-GB" sz="1400" b="1" dirty="0">
+              <a:t>  </a:t>
+            </a:r>
+            <a:r>
+              <a:rPr lang="en-GB" sz="1200" dirty="0">
+                <a:latin typeface="Arial" panose="020B0604020202020204" pitchFamily="34" charset="0"/>
+                <a:cs typeface="Arial" panose="020B0604020202020204" pitchFamily="34" charset="0"/>
+              </a:rPr>
+              <a:t>The median number of novel mutations from 2020 - 2024. Median values for each year: 2020 = 2, 2021 = 14, 2022 = 4, 2023 = 2, 2024 = 1.</a:t>
+            </a:r>
+            <a:endParaRPr lang="en-GB" sz="1200" b="1" dirty="0">
               <a:latin typeface="Arial" panose="020B0604020202020204" pitchFamily="34" charset="0"/>
               <a:cs typeface="Arial" panose="020B0604020202020204" pitchFamily="34" charset="0"/>
             </a:endParaRPr>
@@ -4348,10 +4471,10 @@
       </p:sp>
       <p:pic>
         <p:nvPicPr>
-          <p:cNvPr id="4" name="Picture 3">
-            <a:extLst>
-              <a:ext uri="{FF2B5EF4-FFF2-40B4-BE49-F238E27FC236}">
-                <a16:creationId xmlns:a16="http://schemas.microsoft.com/office/drawing/2014/main" id="{B76652E6-CED2-41D1-8DEE-59F278B2351E}"/>
+          <p:cNvPr id="7" name="Picture 6">
+            <a:extLst>
+              <a:ext uri="{FF2B5EF4-FFF2-40B4-BE49-F238E27FC236}">
+                <a16:creationId xmlns:a16="http://schemas.microsoft.com/office/drawing/2014/main" id="{850AC340-255D-0C4F-E3F4-B3BC8E6E8D45}"/>
               </a:ext>
             </a:extLst>
           </p:cNvPr>
@@ -4361,21 +4484,15 @@
           <p:nvPr/>
         </p:nvPicPr>
         <p:blipFill>
-          <a:blip r:embed="rId3">
-            <a:extLst>
-              <a:ext uri="{28A0092B-C50C-407E-A947-70E740481C1C}">
-                <a14:useLocalDpi xmlns:a14="http://schemas.microsoft.com/office/drawing/2010/main" val="0"/>
-              </a:ext>
-            </a:extLst>
-          </a:blip>
+          <a:blip r:embed="rId3"/>
           <a:stretch>
             <a:fillRect/>
           </a:stretch>
         </p:blipFill>
         <p:spPr>
           <a:xfrm>
-            <a:off x="-1" y="1"/>
-            <a:ext cx="12192001" cy="4208015"/>
+            <a:off x="0" y="0"/>
+            <a:ext cx="12192000" cy="6075680"/>
           </a:xfrm>
           <a:prstGeom prst="rect">
             <a:avLst/>

</xml_diff>

<commit_message>
Trying to sort out the elbow plots for the figure
</commit_message>
<xml_diff>
--- a/Plots and Figures/Real plots and figures/Completed figures with captions.pptx
+++ b/Plots and Figures/Real plots and figures/Completed figures with captions.pptx
@@ -5,13 +5,14 @@
     <p:sldMasterId id="2147483648" r:id="rId1"/>
   </p:sldMasterIdLst>
   <p:notesMasterIdLst>
-    <p:notesMasterId r:id="rId6"/>
+    <p:notesMasterId r:id="rId7"/>
   </p:notesMasterIdLst>
   <p:sldIdLst>
     <p:sldId id="256" r:id="rId2"/>
     <p:sldId id="257" r:id="rId3"/>
     <p:sldId id="258" r:id="rId4"/>
-    <p:sldId id="259" r:id="rId5"/>
+    <p:sldId id="260" r:id="rId5"/>
+    <p:sldId id="259" r:id="rId6"/>
   </p:sldIdLst>
   <p:sldSz cx="12192000" cy="6858000"/>
   <p:notesSz cx="6858000" cy="9144000"/>
@@ -322,7 +323,7 @@
           <a:p>
             <a:fld id="{B5F3BB3C-60B3-4EAD-B55D-4EAADA830A78}" type="datetimeFigureOut">
               <a:rPr lang="en-GB" smtClean="0"/>
-              <a:t>30/03/2025</a:t>
+              <a:t>31/03/2025</a:t>
             </a:fld>
             <a:endParaRPr lang="en-GB"/>
           </a:p>
@@ -907,7 +908,7 @@
           <a:p>
             <a:fld id="{7B17242C-12C5-4BCA-8614-627256A12318}" type="datetimeFigureOut">
               <a:rPr lang="en-GB" smtClean="0"/>
-              <a:t>30/03/2025</a:t>
+              <a:t>31/03/2025</a:t>
             </a:fld>
             <a:endParaRPr lang="en-GB"/>
           </a:p>
@@ -1107,7 +1108,7 @@
           <a:p>
             <a:fld id="{7B17242C-12C5-4BCA-8614-627256A12318}" type="datetimeFigureOut">
               <a:rPr lang="en-GB" smtClean="0"/>
-              <a:t>30/03/2025</a:t>
+              <a:t>31/03/2025</a:t>
             </a:fld>
             <a:endParaRPr lang="en-GB"/>
           </a:p>
@@ -1317,7 +1318,7 @@
           <a:p>
             <a:fld id="{7B17242C-12C5-4BCA-8614-627256A12318}" type="datetimeFigureOut">
               <a:rPr lang="en-GB" smtClean="0"/>
-              <a:t>30/03/2025</a:t>
+              <a:t>31/03/2025</a:t>
             </a:fld>
             <a:endParaRPr lang="en-GB"/>
           </a:p>
@@ -1517,7 +1518,7 @@
           <a:p>
             <a:fld id="{7B17242C-12C5-4BCA-8614-627256A12318}" type="datetimeFigureOut">
               <a:rPr lang="en-GB" smtClean="0"/>
-              <a:t>30/03/2025</a:t>
+              <a:t>31/03/2025</a:t>
             </a:fld>
             <a:endParaRPr lang="en-GB"/>
           </a:p>
@@ -1793,7 +1794,7 @@
           <a:p>
             <a:fld id="{7B17242C-12C5-4BCA-8614-627256A12318}" type="datetimeFigureOut">
               <a:rPr lang="en-GB" smtClean="0"/>
-              <a:t>30/03/2025</a:t>
+              <a:t>31/03/2025</a:t>
             </a:fld>
             <a:endParaRPr lang="en-GB"/>
           </a:p>
@@ -2061,7 +2062,7 @@
           <a:p>
             <a:fld id="{7B17242C-12C5-4BCA-8614-627256A12318}" type="datetimeFigureOut">
               <a:rPr lang="en-GB" smtClean="0"/>
-              <a:t>30/03/2025</a:t>
+              <a:t>31/03/2025</a:t>
             </a:fld>
             <a:endParaRPr lang="en-GB"/>
           </a:p>
@@ -2476,7 +2477,7 @@
           <a:p>
             <a:fld id="{7B17242C-12C5-4BCA-8614-627256A12318}" type="datetimeFigureOut">
               <a:rPr lang="en-GB" smtClean="0"/>
-              <a:t>30/03/2025</a:t>
+              <a:t>31/03/2025</a:t>
             </a:fld>
             <a:endParaRPr lang="en-GB"/>
           </a:p>
@@ -2618,7 +2619,7 @@
           <a:p>
             <a:fld id="{7B17242C-12C5-4BCA-8614-627256A12318}" type="datetimeFigureOut">
               <a:rPr lang="en-GB" smtClean="0"/>
-              <a:t>30/03/2025</a:t>
+              <a:t>31/03/2025</a:t>
             </a:fld>
             <a:endParaRPr lang="en-GB"/>
           </a:p>
@@ -2731,7 +2732,7 @@
           <a:p>
             <a:fld id="{7B17242C-12C5-4BCA-8614-627256A12318}" type="datetimeFigureOut">
               <a:rPr lang="en-GB" smtClean="0"/>
-              <a:t>30/03/2025</a:t>
+              <a:t>31/03/2025</a:t>
             </a:fld>
             <a:endParaRPr lang="en-GB"/>
           </a:p>
@@ -3044,7 +3045,7 @@
           <a:p>
             <a:fld id="{7B17242C-12C5-4BCA-8614-627256A12318}" type="datetimeFigureOut">
               <a:rPr lang="en-GB" smtClean="0"/>
-              <a:t>30/03/2025</a:t>
+              <a:t>31/03/2025</a:t>
             </a:fld>
             <a:endParaRPr lang="en-GB"/>
           </a:p>
@@ -3333,7 +3334,7 @@
           <a:p>
             <a:fld id="{7B17242C-12C5-4BCA-8614-627256A12318}" type="datetimeFigureOut">
               <a:rPr lang="en-GB" smtClean="0"/>
-              <a:t>30/03/2025</a:t>
+              <a:t>31/03/2025</a:t>
             </a:fld>
             <a:endParaRPr lang="en-GB"/>
           </a:p>
@@ -3576,7 +3577,7 @@
           <a:p>
             <a:fld id="{7B17242C-12C5-4BCA-8614-627256A12318}" type="datetimeFigureOut">
               <a:rPr lang="en-GB" smtClean="0"/>
-              <a:t>30/03/2025</a:t>
+              <a:t>31/03/2025</a:t>
             </a:fld>
             <a:endParaRPr lang="en-GB"/>
           </a:p>
@@ -4534,6 +4535,134 @@
           <p:cNvPr id="2" name="TextBox 1">
             <a:extLst>
               <a:ext uri="{FF2B5EF4-FFF2-40B4-BE49-F238E27FC236}">
+                <a16:creationId xmlns:a16="http://schemas.microsoft.com/office/drawing/2014/main" id="{42BC03BC-A176-4603-B319-BEEB53851EAF}"/>
+              </a:ext>
+            </a:extLst>
+          </p:cNvPr>
+          <p:cNvSpPr txBox="1"/>
+          <p:nvPr/>
+        </p:nvSpPr>
+        <p:spPr>
+          <a:xfrm>
+            <a:off x="355107" y="5601810"/>
+            <a:ext cx="10209321" cy="954107"/>
+          </a:xfrm>
+          <a:prstGeom prst="rect">
+            <a:avLst/>
+          </a:prstGeom>
+          <a:noFill/>
+        </p:spPr>
+        <p:txBody>
+          <a:bodyPr wrap="square" rtlCol="0">
+            <a:spAutoFit/>
+          </a:bodyPr>
+          <a:lstStyle/>
+          <a:p>
+            <a:r>
+              <a:rPr lang="en-GB" sz="1400" b="1" dirty="0">
+                <a:latin typeface="Arial" panose="020B0604020202020204" pitchFamily="34" charset="0"/>
+                <a:cs typeface="Arial" panose="020B0604020202020204" pitchFamily="34" charset="0"/>
+              </a:rPr>
+              <a:t>Figure 4.</a:t>
+            </a:r>
+            <a:r>
+              <a:rPr lang="en-GB" sz="1400" dirty="0">
+                <a:latin typeface="Arial" panose="020B0604020202020204" pitchFamily="34" charset="0"/>
+                <a:cs typeface="Arial" panose="020B0604020202020204" pitchFamily="34" charset="0"/>
+              </a:rPr>
+              <a:t> Elbow plots.</a:t>
+            </a:r>
+            <a:r>
+              <a:rPr lang="en-US" sz="1400" dirty="0">
+                <a:latin typeface="Arial" panose="020B0604020202020204" pitchFamily="34" charset="0"/>
+                <a:cs typeface="Arial" panose="020B0604020202020204" pitchFamily="34" charset="0"/>
+              </a:rPr>
+              <a:t> The optimal number of clusters is shown as the turning point in the in the elbow plots.</a:t>
+            </a:r>
+            <a:r>
+              <a:rPr lang="en-GB" sz="1400" dirty="0">
+                <a:latin typeface="Arial" panose="020B0604020202020204" pitchFamily="34" charset="0"/>
+                <a:cs typeface="Arial" panose="020B0604020202020204" pitchFamily="34" charset="0"/>
+              </a:rPr>
+              <a:t> Within cluster sum of squares of the PCA assisted K-means clustering. </a:t>
+            </a:r>
+            <a:r>
+              <a:rPr lang="en-GB" sz="1400" b="1" dirty="0">
+                <a:latin typeface="Arial" panose="020B0604020202020204" pitchFamily="34" charset="0"/>
+                <a:cs typeface="Arial" panose="020B0604020202020204" pitchFamily="34" charset="0"/>
+              </a:rPr>
+              <a:t>A</a:t>
+            </a:r>
+            <a:r>
+              <a:rPr lang="en-GB" sz="1400" dirty="0">
+                <a:latin typeface="Arial" panose="020B0604020202020204" pitchFamily="34" charset="0"/>
+                <a:cs typeface="Arial" panose="020B0604020202020204" pitchFamily="34" charset="0"/>
+              </a:rPr>
+              <a:t> PC1 and PC2, </a:t>
+            </a:r>
+            <a:r>
+              <a:rPr lang="en-US" sz="1400" dirty="0">
+                <a:latin typeface="Arial" panose="020B0604020202020204" pitchFamily="34" charset="0"/>
+                <a:cs typeface="Arial" panose="020B0604020202020204" pitchFamily="34" charset="0"/>
+              </a:rPr>
+              <a:t>then K-means for 1000 most common mutations on a log10 scale. </a:t>
+            </a:r>
+            <a:r>
+              <a:rPr lang="en-US" sz="1400" b="1" dirty="0">
+                <a:latin typeface="Arial" panose="020B0604020202020204" pitchFamily="34" charset="0"/>
+                <a:cs typeface="Arial" panose="020B0604020202020204" pitchFamily="34" charset="0"/>
+              </a:rPr>
+              <a:t>B</a:t>
+            </a:r>
+            <a:r>
+              <a:rPr lang="en-US" sz="1400" dirty="0">
+                <a:latin typeface="Arial" panose="020B0604020202020204" pitchFamily="34" charset="0"/>
+                <a:cs typeface="Arial" panose="020B0604020202020204" pitchFamily="34" charset="0"/>
+              </a:rPr>
+              <a:t> PC1:PC9, followed by K-means for the 1000 most common mutations on a log10 scale. From the elbow method, the optimal number of clusters in 3 or 7</a:t>
+            </a:r>
+            <a:endParaRPr lang="en-GB" sz="1400" b="1" dirty="0">
+              <a:latin typeface="Arial" panose="020B0604020202020204" pitchFamily="34" charset="0"/>
+              <a:cs typeface="Arial" panose="020B0604020202020204" pitchFamily="34" charset="0"/>
+            </a:endParaRPr>
+          </a:p>
+        </p:txBody>
+      </p:sp>
+    </p:spTree>
+    <p:extLst>
+      <p:ext uri="{BB962C8B-B14F-4D97-AF65-F5344CB8AC3E}">
+        <p14:creationId xmlns:p14="http://schemas.microsoft.com/office/powerpoint/2010/main" val="2142045004"/>
+      </p:ext>
+    </p:extLst>
+  </p:cSld>
+  <p:clrMapOvr>
+    <a:masterClrMapping/>
+  </p:clrMapOvr>
+</p:sld>
+</file>
+
+<file path=ppt/slides/slide5.xml><?xml version="1.0" encoding="utf-8"?>
+<p:sld xmlns:a="http://schemas.openxmlformats.org/drawingml/2006/main" xmlns:r="http://schemas.openxmlformats.org/officeDocument/2006/relationships" xmlns:p="http://schemas.openxmlformats.org/presentationml/2006/main">
+  <p:cSld>
+    <p:spTree>
+      <p:nvGrpSpPr>
+        <p:cNvPr id="1" name=""/>
+        <p:cNvGrpSpPr/>
+        <p:nvPr/>
+      </p:nvGrpSpPr>
+      <p:grpSpPr>
+        <a:xfrm>
+          <a:off x="0" y="0"/>
+          <a:ext cx="0" cy="0"/>
+          <a:chOff x="0" y="0"/>
+          <a:chExt cx="0" cy="0"/>
+        </a:xfrm>
+      </p:grpSpPr>
+      <p:sp>
+        <p:nvSpPr>
+          <p:cNvPr id="2" name="TextBox 1">
+            <a:extLst>
+              <a:ext uri="{FF2B5EF4-FFF2-40B4-BE49-F238E27FC236}">
                 <a16:creationId xmlns:a16="http://schemas.microsoft.com/office/drawing/2014/main" id="{916AE047-FCCB-B2BC-F40C-9D29AEE4FC50}"/>
               </a:ext>
             </a:extLst>
@@ -4562,7 +4691,7 @@
                 <a:latin typeface="Arial" panose="020B0604020202020204" pitchFamily="34" charset="0"/>
                 <a:cs typeface="Arial" panose="020B0604020202020204" pitchFamily="34" charset="0"/>
               </a:rPr>
-              <a:t>Figure 4</a:t>
+              <a:t>Figure 5</a:t>
             </a:r>
             <a:r>
               <a:rPr lang="en-GB" dirty="0">

</xml_diff>

<commit_message>
Methods and Materials section
</commit_message>
<xml_diff>
--- a/Plots and Figures/Real plots and figures/Completed figures with captions.pptx
+++ b/Plots and Figures/Real plots and figures/Completed figures with captions.pptx
@@ -133,24 +133,32 @@
   <pc:docChgLst>
     <pc:chgData name="Samuel Aldous" userId="0ff3eb4db5f3e0fd" providerId="LiveId" clId="{7273B22C-C245-4F33-9671-B4FF89330F8E}"/>
     <pc:docChg chg="undo custSel addSld modSld">
-      <pc:chgData name="Samuel Aldous" userId="0ff3eb4db5f3e0fd" providerId="LiveId" clId="{7273B22C-C245-4F33-9671-B4FF89330F8E}" dt="2025-04-05T12:14:37.121" v="4214" actId="680"/>
+      <pc:chgData name="Samuel Aldous" userId="0ff3eb4db5f3e0fd" providerId="LiveId" clId="{7273B22C-C245-4F33-9671-B4FF89330F8E}" dt="2025-04-16T15:53:01.124" v="4231" actId="1076"/>
       <pc:docMkLst>
         <pc:docMk/>
       </pc:docMkLst>
       <pc:sldChg chg="modSp mod">
-        <pc:chgData name="Samuel Aldous" userId="0ff3eb4db5f3e0fd" providerId="LiveId" clId="{7273B22C-C245-4F33-9671-B4FF89330F8E}" dt="2025-03-04T14:38:14.319" v="5" actId="14100"/>
+        <pc:chgData name="Samuel Aldous" userId="0ff3eb4db5f3e0fd" providerId="LiveId" clId="{7273B22C-C245-4F33-9671-B4FF89330F8E}" dt="2025-04-16T15:52:47.330" v="4228" actId="14100"/>
         <pc:sldMkLst>
           <pc:docMk/>
           <pc:sldMk cId="594746656" sldId="256"/>
         </pc:sldMkLst>
         <pc:spChg chg="mod">
-          <ac:chgData name="Samuel Aldous" userId="0ff3eb4db5f3e0fd" providerId="LiveId" clId="{7273B22C-C245-4F33-9671-B4FF89330F8E}" dt="2025-03-04T14:38:14.319" v="5" actId="14100"/>
+          <ac:chgData name="Samuel Aldous" userId="0ff3eb4db5f3e0fd" providerId="LiveId" clId="{7273B22C-C245-4F33-9671-B4FF89330F8E}" dt="2025-04-16T15:52:41.552" v="4227" actId="14100"/>
           <ac:spMkLst>
             <pc:docMk/>
             <pc:sldMk cId="594746656" sldId="256"/>
             <ac:spMk id="6" creationId="{7077D6E7-985E-13D7-E961-55106741562A}"/>
           </ac:spMkLst>
         </pc:spChg>
+        <pc:picChg chg="mod">
+          <ac:chgData name="Samuel Aldous" userId="0ff3eb4db5f3e0fd" providerId="LiveId" clId="{7273B22C-C245-4F33-9671-B4FF89330F8E}" dt="2025-04-16T15:52:47.330" v="4228" actId="14100"/>
+          <ac:picMkLst>
+            <pc:docMk/>
+            <pc:sldMk cId="594746656" sldId="256"/>
+            <ac:picMk id="5" creationId="{387C448B-3197-3822-276D-7FE2275A5F29}"/>
+          </ac:picMkLst>
+        </pc:picChg>
       </pc:sldChg>
       <pc:sldChg chg="addSp delSp modSp new mod">
         <pc:chgData name="Samuel Aldous" userId="0ff3eb4db5f3e0fd" providerId="LiveId" clId="{7273B22C-C245-4F33-9671-B4FF89330F8E}" dt="2025-03-30T09:59:45.317" v="4030" actId="14100"/>
@@ -176,13 +184,13 @@
         </pc:picChg>
       </pc:sldChg>
       <pc:sldChg chg="addSp delSp modSp new mod">
-        <pc:chgData name="Samuel Aldous" userId="0ff3eb4db5f3e0fd" providerId="LiveId" clId="{7273B22C-C245-4F33-9671-B4FF89330F8E}" dt="2025-03-30T10:12:13.698" v="4152" actId="20577"/>
+        <pc:chgData name="Samuel Aldous" userId="0ff3eb4db5f3e0fd" providerId="LiveId" clId="{7273B22C-C245-4F33-9671-B4FF89330F8E}" dt="2025-04-16T15:53:01.124" v="4231" actId="1076"/>
         <pc:sldMkLst>
           <pc:docMk/>
           <pc:sldMk cId="2660082026" sldId="258"/>
         </pc:sldMkLst>
         <pc:spChg chg="add mod">
-          <ac:chgData name="Samuel Aldous" userId="0ff3eb4db5f3e0fd" providerId="LiveId" clId="{7273B22C-C245-4F33-9671-B4FF89330F8E}" dt="2025-03-30T10:12:13.698" v="4152" actId="20577"/>
+          <ac:chgData name="Samuel Aldous" userId="0ff3eb4db5f3e0fd" providerId="LiveId" clId="{7273B22C-C245-4F33-9671-B4FF89330F8E}" dt="2025-04-16T15:53:01.124" v="4231" actId="1076"/>
           <ac:spMkLst>
             <pc:docMk/>
             <pc:sldMk cId="2660082026" sldId="258"/>
@@ -190,7 +198,7 @@
           </ac:spMkLst>
         </pc:spChg>
         <pc:picChg chg="add mod">
-          <ac:chgData name="Samuel Aldous" userId="0ff3eb4db5f3e0fd" providerId="LiveId" clId="{7273B22C-C245-4F33-9671-B4FF89330F8E}" dt="2025-03-30T10:07:43.928" v="4086" actId="14100"/>
+          <ac:chgData name="Samuel Aldous" userId="0ff3eb4db5f3e0fd" providerId="LiveId" clId="{7273B22C-C245-4F33-9671-B4FF89330F8E}" dt="2025-04-16T15:52:56.571" v="4230" actId="1076"/>
           <ac:picMkLst>
             <pc:docMk/>
             <pc:sldMk cId="2660082026" sldId="258"/>
@@ -315,7 +323,7 @@
           <a:p>
             <a:fld id="{B5F3BB3C-60B3-4EAD-B55D-4EAADA830A78}" type="datetimeFigureOut">
               <a:rPr lang="en-GB" smtClean="0"/>
-              <a:t>04/04/2025</a:t>
+              <a:t>16/04/2025</a:t>
             </a:fld>
             <a:endParaRPr lang="en-GB"/>
           </a:p>
@@ -900,7 +908,7 @@
           <a:p>
             <a:fld id="{7B17242C-12C5-4BCA-8614-627256A12318}" type="datetimeFigureOut">
               <a:rPr lang="en-GB" smtClean="0"/>
-              <a:t>04/04/2025</a:t>
+              <a:t>16/04/2025</a:t>
             </a:fld>
             <a:endParaRPr lang="en-GB"/>
           </a:p>
@@ -1100,7 +1108,7 @@
           <a:p>
             <a:fld id="{7B17242C-12C5-4BCA-8614-627256A12318}" type="datetimeFigureOut">
               <a:rPr lang="en-GB" smtClean="0"/>
-              <a:t>04/04/2025</a:t>
+              <a:t>16/04/2025</a:t>
             </a:fld>
             <a:endParaRPr lang="en-GB"/>
           </a:p>
@@ -1310,7 +1318,7 @@
           <a:p>
             <a:fld id="{7B17242C-12C5-4BCA-8614-627256A12318}" type="datetimeFigureOut">
               <a:rPr lang="en-GB" smtClean="0"/>
-              <a:t>04/04/2025</a:t>
+              <a:t>16/04/2025</a:t>
             </a:fld>
             <a:endParaRPr lang="en-GB"/>
           </a:p>
@@ -1510,7 +1518,7 @@
           <a:p>
             <a:fld id="{7B17242C-12C5-4BCA-8614-627256A12318}" type="datetimeFigureOut">
               <a:rPr lang="en-GB" smtClean="0"/>
-              <a:t>04/04/2025</a:t>
+              <a:t>16/04/2025</a:t>
             </a:fld>
             <a:endParaRPr lang="en-GB"/>
           </a:p>
@@ -1786,7 +1794,7 @@
           <a:p>
             <a:fld id="{7B17242C-12C5-4BCA-8614-627256A12318}" type="datetimeFigureOut">
               <a:rPr lang="en-GB" smtClean="0"/>
-              <a:t>04/04/2025</a:t>
+              <a:t>16/04/2025</a:t>
             </a:fld>
             <a:endParaRPr lang="en-GB"/>
           </a:p>
@@ -2054,7 +2062,7 @@
           <a:p>
             <a:fld id="{7B17242C-12C5-4BCA-8614-627256A12318}" type="datetimeFigureOut">
               <a:rPr lang="en-GB" smtClean="0"/>
-              <a:t>04/04/2025</a:t>
+              <a:t>16/04/2025</a:t>
             </a:fld>
             <a:endParaRPr lang="en-GB"/>
           </a:p>
@@ -2469,7 +2477,7 @@
           <a:p>
             <a:fld id="{7B17242C-12C5-4BCA-8614-627256A12318}" type="datetimeFigureOut">
               <a:rPr lang="en-GB" smtClean="0"/>
-              <a:t>04/04/2025</a:t>
+              <a:t>16/04/2025</a:t>
             </a:fld>
             <a:endParaRPr lang="en-GB"/>
           </a:p>
@@ -2611,7 +2619,7 @@
           <a:p>
             <a:fld id="{7B17242C-12C5-4BCA-8614-627256A12318}" type="datetimeFigureOut">
               <a:rPr lang="en-GB" smtClean="0"/>
-              <a:t>04/04/2025</a:t>
+              <a:t>16/04/2025</a:t>
             </a:fld>
             <a:endParaRPr lang="en-GB"/>
           </a:p>
@@ -2724,7 +2732,7 @@
           <a:p>
             <a:fld id="{7B17242C-12C5-4BCA-8614-627256A12318}" type="datetimeFigureOut">
               <a:rPr lang="en-GB" smtClean="0"/>
-              <a:t>04/04/2025</a:t>
+              <a:t>16/04/2025</a:t>
             </a:fld>
             <a:endParaRPr lang="en-GB"/>
           </a:p>
@@ -3037,7 +3045,7 @@
           <a:p>
             <a:fld id="{7B17242C-12C5-4BCA-8614-627256A12318}" type="datetimeFigureOut">
               <a:rPr lang="en-GB" smtClean="0"/>
-              <a:t>04/04/2025</a:t>
+              <a:t>16/04/2025</a:t>
             </a:fld>
             <a:endParaRPr lang="en-GB"/>
           </a:p>
@@ -3326,7 +3334,7 @@
           <a:p>
             <a:fld id="{7B17242C-12C5-4BCA-8614-627256A12318}" type="datetimeFigureOut">
               <a:rPr lang="en-GB" smtClean="0"/>
-              <a:t>04/04/2025</a:t>
+              <a:t>16/04/2025</a:t>
             </a:fld>
             <a:endParaRPr lang="en-GB"/>
           </a:p>
@@ -3569,7 +3577,7 @@
           <a:p>
             <a:fld id="{7B17242C-12C5-4BCA-8614-627256A12318}" type="datetimeFigureOut">
               <a:rPr lang="en-GB" smtClean="0"/>
-              <a:t>04/04/2025</a:t>
+              <a:t>16/04/2025</a:t>
             </a:fld>
             <a:endParaRPr lang="en-GB"/>
           </a:p>
@@ -4014,8 +4022,8 @@
         </p:blipFill>
         <p:spPr>
           <a:xfrm>
-            <a:off x="1789541" y="0"/>
-            <a:ext cx="8083298" cy="5019040"/>
+            <a:off x="1716509" y="0"/>
+            <a:ext cx="8214201" cy="5100320"/>
           </a:xfrm>
           <a:prstGeom prst="rect">
             <a:avLst/>
@@ -4036,8 +4044,8 @@
         </p:nvSpPr>
         <p:spPr>
           <a:xfrm>
-            <a:off x="1879600" y="4907280"/>
-            <a:ext cx="8010124" cy="1924822"/>
+            <a:off x="1046480" y="5380218"/>
+            <a:ext cx="10322560" cy="990271"/>
           </a:xfrm>
           <a:prstGeom prst="rect">
             <a:avLst/>
@@ -4059,7 +4067,7 @@
               </a:spcAft>
             </a:pPr>
             <a:r>
-              <a:rPr lang="en-GB" sz="1400" b="1" kern="100" dirty="0">
+              <a:rPr lang="en-GB" sz="1100" b="1" kern="100" dirty="0">
                 <a:effectLst/>
                 <a:latin typeface="Arial" panose="020B0604020202020204" pitchFamily="34" charset="0"/>
                 <a:ea typeface="Aptos" panose="020B0004020202020204" pitchFamily="34" charset="0"/>
@@ -4068,7 +4076,7 @@
               <a:t>Figure 1</a:t>
             </a:r>
             <a:r>
-              <a:rPr lang="en-GB" sz="1400" kern="100" dirty="0">
+              <a:rPr lang="en-GB" sz="1100" kern="100" dirty="0">
                 <a:effectLst/>
                 <a:latin typeface="Arial" panose="020B0604020202020204" pitchFamily="34" charset="0"/>
                 <a:ea typeface="Aptos" panose="020B0004020202020204" pitchFamily="34" charset="0"/>
@@ -4077,7 +4085,7 @@
               <a:t>. The number of sequences per day from 2020 – 2024. </a:t>
             </a:r>
             <a:r>
-              <a:rPr lang="en-GB" sz="1400" b="1" kern="100" dirty="0">
+              <a:rPr lang="en-GB" sz="1100" b="1" kern="100" dirty="0">
                 <a:effectLst/>
                 <a:latin typeface="Arial" panose="020B0604020202020204" pitchFamily="34" charset="0"/>
                 <a:ea typeface="Aptos" panose="020B0004020202020204" pitchFamily="34" charset="0"/>
@@ -4086,7 +4094,7 @@
               <a:t>A</a:t>
             </a:r>
             <a:r>
-              <a:rPr lang="en-GB" sz="1400" kern="100" dirty="0">
+              <a:rPr lang="en-GB" sz="1100" kern="100" dirty="0">
                 <a:effectLst/>
                 <a:latin typeface="Arial" panose="020B0604020202020204" pitchFamily="34" charset="0"/>
                 <a:ea typeface="Aptos" panose="020B0004020202020204" pitchFamily="34" charset="0"/>
@@ -4095,7 +4103,7 @@
               <a:t> The overall the number of sequences per day from years 2020 – 2024. The coloured zones represent the emergence of a new strain of SARS-CoV-2. Yellow – beta, red – alpha, purple – delta, pink – gamma, green - omicron. Also on the plot are specific dates showing the first use of that vaccine. A generalised </a:t>
             </a:r>
             <a:r>
-              <a:rPr lang="en-GB" sz="1400" kern="100" dirty="0">
+              <a:rPr lang="en-GB" sz="1100" kern="100" dirty="0">
                 <a:latin typeface="Arial" panose="020B0604020202020204" pitchFamily="34" charset="0"/>
                 <a:ea typeface="Aptos" panose="020B0004020202020204" pitchFamily="34" charset="0"/>
                 <a:cs typeface="Arial" panose="020B0604020202020204" pitchFamily="34" charset="0"/>
@@ -4103,7 +4111,7 @@
               <a:t>additive</a:t>
             </a:r>
             <a:r>
-              <a:rPr lang="en-GB" sz="1400" kern="100" dirty="0">
+              <a:rPr lang="en-GB" sz="1100" kern="100" dirty="0">
                 <a:effectLst/>
                 <a:latin typeface="Arial" panose="020B0604020202020204" pitchFamily="34" charset="0"/>
                 <a:ea typeface="Aptos" panose="020B0004020202020204" pitchFamily="34" charset="0"/>
@@ -4112,7 +4120,7 @@
               <a:t> model has been used to show the relationship between sample date and the number of sequences per day. </a:t>
             </a:r>
             <a:r>
-              <a:rPr lang="en-GB" sz="1400" b="1" kern="100" dirty="0">
+              <a:rPr lang="en-GB" sz="1100" b="1" kern="100" dirty="0">
                 <a:effectLst/>
                 <a:latin typeface="Arial" panose="020B0604020202020204" pitchFamily="34" charset="0"/>
                 <a:ea typeface="Aptos" panose="020B0004020202020204" pitchFamily="34" charset="0"/>
@@ -4121,7 +4129,7 @@
               <a:t>B</a:t>
             </a:r>
             <a:r>
-              <a:rPr lang="en-GB" sz="1400" kern="100" dirty="0">
+              <a:rPr lang="en-GB" sz="1100" kern="100" dirty="0">
                 <a:effectLst/>
                 <a:latin typeface="Arial" panose="020B0604020202020204" pitchFamily="34" charset="0"/>
                 <a:ea typeface="Aptos" panose="020B0004020202020204" pitchFamily="34" charset="0"/>
@@ -4130,7 +4138,7 @@
               <a:t> The number of sequences per day for 2020. </a:t>
             </a:r>
             <a:r>
-              <a:rPr lang="en-GB" sz="1400" b="1" kern="100" dirty="0">
+              <a:rPr lang="en-GB" sz="1100" b="1" kern="100" dirty="0">
                 <a:effectLst/>
                 <a:latin typeface="Arial" panose="020B0604020202020204" pitchFamily="34" charset="0"/>
                 <a:ea typeface="Aptos" panose="020B0004020202020204" pitchFamily="34" charset="0"/>
@@ -4139,7 +4147,7 @@
               <a:t>C</a:t>
             </a:r>
             <a:r>
-              <a:rPr lang="en-GB" sz="1400" kern="100" dirty="0">
+              <a:rPr lang="en-GB" sz="1100" kern="100" dirty="0">
                 <a:effectLst/>
                 <a:latin typeface="Arial" panose="020B0604020202020204" pitchFamily="34" charset="0"/>
                 <a:ea typeface="Aptos" panose="020B0004020202020204" pitchFamily="34" charset="0"/>
@@ -4148,7 +4156,7 @@
               <a:t> The number of sequences per day for 2021. </a:t>
             </a:r>
             <a:r>
-              <a:rPr lang="en-GB" sz="1400" b="1" kern="100" dirty="0">
+              <a:rPr lang="en-GB" sz="1100" b="1" kern="100" dirty="0">
                 <a:effectLst/>
                 <a:latin typeface="Arial" panose="020B0604020202020204" pitchFamily="34" charset="0"/>
                 <a:ea typeface="Aptos" panose="020B0004020202020204" pitchFamily="34" charset="0"/>
@@ -4157,7 +4165,7 @@
               <a:t>D</a:t>
             </a:r>
             <a:r>
-              <a:rPr lang="en-GB" sz="1400" kern="100" dirty="0">
+              <a:rPr lang="en-GB" sz="1100" kern="100" dirty="0">
                 <a:effectLst/>
                 <a:latin typeface="Arial" panose="020B0604020202020204" pitchFamily="34" charset="0"/>
                 <a:ea typeface="Aptos" panose="020B0004020202020204" pitchFamily="34" charset="0"/>
@@ -4166,7 +4174,7 @@
               <a:t> The number of sequences per day for 2022. </a:t>
             </a:r>
             <a:r>
-              <a:rPr lang="en-GB" sz="1400" b="1" kern="100" dirty="0">
+              <a:rPr lang="en-GB" sz="1100" b="1" kern="100" dirty="0">
                 <a:effectLst/>
                 <a:latin typeface="Arial" panose="020B0604020202020204" pitchFamily="34" charset="0"/>
                 <a:ea typeface="Aptos" panose="020B0004020202020204" pitchFamily="34" charset="0"/>
@@ -4175,7 +4183,7 @@
               <a:t>E</a:t>
             </a:r>
             <a:r>
-              <a:rPr lang="en-GB" sz="1400" kern="100" dirty="0">
+              <a:rPr lang="en-GB" sz="1100" kern="100" dirty="0">
                 <a:effectLst/>
                 <a:latin typeface="Arial" panose="020B0604020202020204" pitchFamily="34" charset="0"/>
                 <a:ea typeface="Aptos" panose="020B0004020202020204" pitchFamily="34" charset="0"/>
@@ -4184,7 +4192,7 @@
               <a:t> The number of sequences per day for 2023. </a:t>
             </a:r>
             <a:r>
-              <a:rPr lang="en-GB" sz="1400" b="1" kern="100" dirty="0">
+              <a:rPr lang="en-GB" sz="1100" b="1" kern="100" dirty="0">
                 <a:effectLst/>
                 <a:latin typeface="Arial" panose="020B0604020202020204" pitchFamily="34" charset="0"/>
                 <a:ea typeface="Aptos" panose="020B0004020202020204" pitchFamily="34" charset="0"/>
@@ -4193,7 +4201,7 @@
               <a:t>E </a:t>
             </a:r>
             <a:r>
-              <a:rPr lang="en-GB" sz="1400" kern="100" dirty="0">
+              <a:rPr lang="en-GB" sz="1100" kern="100" dirty="0">
                 <a:effectLst/>
                 <a:latin typeface="Arial" panose="020B0604020202020204" pitchFamily="34" charset="0"/>
                 <a:ea typeface="Aptos" panose="020B0004020202020204" pitchFamily="34" charset="0"/>
@@ -4202,7 +4210,7 @@
               <a:t>The number of sequences per day for 2023. </a:t>
             </a:r>
             <a:r>
-              <a:rPr lang="en-GB" sz="1400" b="1" kern="100" dirty="0">
+              <a:rPr lang="en-GB" sz="1100" b="1" kern="100" dirty="0">
                 <a:effectLst/>
                 <a:latin typeface="Arial" panose="020B0604020202020204" pitchFamily="34" charset="0"/>
                 <a:ea typeface="Aptos" panose="020B0004020202020204" pitchFamily="34" charset="0"/>
@@ -4211,7 +4219,7 @@
               <a:t>F </a:t>
             </a:r>
             <a:r>
-              <a:rPr lang="en-GB" sz="1400" kern="100" dirty="0">
+              <a:rPr lang="en-GB" sz="1100" kern="100" dirty="0">
                 <a:effectLst/>
                 <a:latin typeface="Arial" panose="020B0604020202020204" pitchFamily="34" charset="0"/>
                 <a:ea typeface="Aptos" panose="020B0004020202020204" pitchFamily="34" charset="0"/>
@@ -4219,7 +4227,7 @@
               </a:rPr>
               <a:t>The number of sequences per day for 2024.</a:t>
             </a:r>
-            <a:endParaRPr lang="en-GB" sz="1400" kern="100" dirty="0">
+            <a:endParaRPr lang="en-GB" sz="1100" kern="100" dirty="0">
               <a:effectLst/>
               <a:latin typeface="Aptos" panose="020B0004020202020204" pitchFamily="34" charset="0"/>
               <a:ea typeface="Aptos" panose="020B0004020202020204" pitchFamily="34" charset="0"/>
@@ -4416,7 +4424,7 @@
         </p:nvSpPr>
         <p:spPr>
           <a:xfrm>
-            <a:off x="-2" y="6015631"/>
+            <a:off x="-1" y="6027003"/>
             <a:ext cx="12192001" cy="830997"/>
           </a:xfrm>
           <a:prstGeom prst="rect">
@@ -4442,35 +4450,21 @@
                 <a:latin typeface="Arial" panose="020B0604020202020204" pitchFamily="34" charset="0"/>
                 <a:cs typeface="Arial" panose="020B0604020202020204" pitchFamily="34" charset="0"/>
               </a:rPr>
-              <a:t>The emergence of novel SARS-CoV-2 spike protein mutations from 2020 - 2024. Figure depicts the number of novel mutations for any given sample date. The colours represent the year the sample was taken: 2020 – yellow,  2021 - orange,  2022 - pink, 2023 - purple and 2024 – dark blue. Mean values for each year: 2020 = 10.8, 2021 = 29.0, 2022 = 7.95, 2023 = 3.47, 2024 = </a:t>
-            </a:r>
-            <a:r>
-              <a:rPr lang="en-GB" sz="1200">
-                <a:latin typeface="Arial" panose="020B0604020202020204" pitchFamily="34" charset="0"/>
-                <a:cs typeface="Arial" panose="020B0604020202020204" pitchFamily="34" charset="0"/>
-              </a:rPr>
-              <a:t>2.25. </a:t>
-            </a:r>
-            <a:r>
-              <a:rPr lang="en-GB" sz="1200" b="1">
+              <a:t>The emergence of novel SARS-CoV-2 spike protein mutations from 2020 - 2024. Figure depicts the number of novel mutations for any given sample date. The colours represent the year the sample was taken: 2020 – yellow,  2021 - orange,  2022 - pink, 2023 - purple and 2024 – dark blue. Mean values for each year: 2020 = 10.8, 2021 = 29.0, 2022 = 7.95, 2023 = 3.47, 2024 = 2.25. </a:t>
+            </a:r>
+            <a:r>
+              <a:rPr lang="en-GB" sz="1200" b="1" dirty="0">
                 <a:latin typeface="Arial" panose="020B0604020202020204" pitchFamily="34" charset="0"/>
                 <a:cs typeface="Arial" panose="020B0604020202020204" pitchFamily="34" charset="0"/>
               </a:rPr>
               <a:t>B</a:t>
             </a:r>
             <a:r>
-              <a:rPr lang="en-GB" sz="1200">
-                <a:latin typeface="Arial" panose="020B0604020202020204" pitchFamily="34" charset="0"/>
-                <a:cs typeface="Arial" panose="020B0604020202020204" pitchFamily="34" charset="0"/>
-              </a:rPr>
-              <a:t>  </a:t>
-            </a:r>
-            <a:r>
               <a:rPr lang="en-GB" sz="1200" dirty="0">
                 <a:latin typeface="Arial" panose="020B0604020202020204" pitchFamily="34" charset="0"/>
                 <a:cs typeface="Arial" panose="020B0604020202020204" pitchFamily="34" charset="0"/>
               </a:rPr>
-              <a:t>The median number of novel mutations from 2020 - 2024. Median values for each year: 2020 = 2, 2021 = 14, 2022 = 4, 2023 = 2, 2024 = 1.</a:t>
+              <a:t>  The median number of novel mutations from 2020 - 2024. Median values for each year: 2020 = 2, 2021 = 14, 2022 = 4, 2023 = 2, 2024 = 1.</a:t>
             </a:r>
             <a:endParaRPr lang="en-GB" sz="1200" b="1" dirty="0">
               <a:latin typeface="Arial" panose="020B0604020202020204" pitchFamily="34" charset="0"/>
@@ -4501,8 +4495,8 @@
         </p:blipFill>
         <p:spPr>
           <a:xfrm>
-            <a:off x="0" y="0"/>
-            <a:ext cx="12192000" cy="6075680"/>
+            <a:off x="233680" y="0"/>
+            <a:ext cx="11684000" cy="5822527"/>
           </a:xfrm>
           <a:prstGeom prst="rect">
             <a:avLst/>

</xml_diff>

<commit_message>
Planning report and figures
</commit_message>
<xml_diff>
--- a/Plots and Figures/Real plots and figures/Completed figures with captions.pptx
+++ b/Plots and Figures/Real plots and figures/Completed figures with captions.pptx
@@ -2,10 +2,10 @@
 <file path=ppt/presentation.xml><?xml version="1.0" encoding="utf-8"?>
 <p:presentation xmlns:a="http://schemas.openxmlformats.org/drawingml/2006/main" xmlns:r="http://schemas.openxmlformats.org/officeDocument/2006/relationships" xmlns:p="http://schemas.openxmlformats.org/presentationml/2006/main" saveSubsetFonts="1">
   <p:sldMasterIdLst>
-    <p:sldMasterId id="2147483648" r:id="rId1"/>
+    <p:sldMasterId id="2147483672" r:id="rId1"/>
   </p:sldMasterIdLst>
   <p:notesMasterIdLst>
-    <p:notesMasterId r:id="rId8"/>
+    <p:notesMasterId r:id="rId11"/>
   </p:notesMasterIdLst>
   <p:sldIdLst>
     <p:sldId id="256" r:id="rId2"/>
@@ -14,6 +14,9 @@
     <p:sldId id="260" r:id="rId5"/>
     <p:sldId id="259" r:id="rId6"/>
     <p:sldId id="261" r:id="rId7"/>
+    <p:sldId id="262" r:id="rId8"/>
+    <p:sldId id="263" r:id="rId9"/>
+    <p:sldId id="264" r:id="rId10"/>
   </p:sldIdLst>
   <p:sldSz cx="12192000" cy="6858000"/>
   <p:notesSz cx="6858000" cy="9144000"/>
@@ -21,7 +24,7 @@
     <a:defPPr>
       <a:defRPr lang="en-US"/>
     </a:defPPr>
-    <a:lvl1pPr marL="0" algn="l" defTabSz="914400" rtl="0" eaLnBrk="1" latinLnBrk="0" hangingPunct="1">
+    <a:lvl1pPr marL="0" algn="l" defTabSz="457200" rtl="0" eaLnBrk="1" latinLnBrk="0" hangingPunct="1">
       <a:defRPr sz="1800" kern="1200">
         <a:solidFill>
           <a:schemeClr val="tx1"/>
@@ -31,7 +34,7 @@
         <a:cs typeface="+mn-cs"/>
       </a:defRPr>
     </a:lvl1pPr>
-    <a:lvl2pPr marL="457200" algn="l" defTabSz="914400" rtl="0" eaLnBrk="1" latinLnBrk="0" hangingPunct="1">
+    <a:lvl2pPr marL="457200" algn="l" defTabSz="457200" rtl="0" eaLnBrk="1" latinLnBrk="0" hangingPunct="1">
       <a:defRPr sz="1800" kern="1200">
         <a:solidFill>
           <a:schemeClr val="tx1"/>
@@ -41,7 +44,7 @@
         <a:cs typeface="+mn-cs"/>
       </a:defRPr>
     </a:lvl2pPr>
-    <a:lvl3pPr marL="914400" algn="l" defTabSz="914400" rtl="0" eaLnBrk="1" latinLnBrk="0" hangingPunct="1">
+    <a:lvl3pPr marL="914400" algn="l" defTabSz="457200" rtl="0" eaLnBrk="1" latinLnBrk="0" hangingPunct="1">
       <a:defRPr sz="1800" kern="1200">
         <a:solidFill>
           <a:schemeClr val="tx1"/>
@@ -51,7 +54,7 @@
         <a:cs typeface="+mn-cs"/>
       </a:defRPr>
     </a:lvl3pPr>
-    <a:lvl4pPr marL="1371600" algn="l" defTabSz="914400" rtl="0" eaLnBrk="1" latinLnBrk="0" hangingPunct="1">
+    <a:lvl4pPr marL="1371600" algn="l" defTabSz="457200" rtl="0" eaLnBrk="1" latinLnBrk="0" hangingPunct="1">
       <a:defRPr sz="1800" kern="1200">
         <a:solidFill>
           <a:schemeClr val="tx1"/>
@@ -61,7 +64,7 @@
         <a:cs typeface="+mn-cs"/>
       </a:defRPr>
     </a:lvl4pPr>
-    <a:lvl5pPr marL="1828800" algn="l" defTabSz="914400" rtl="0" eaLnBrk="1" latinLnBrk="0" hangingPunct="1">
+    <a:lvl5pPr marL="1828800" algn="l" defTabSz="457200" rtl="0" eaLnBrk="1" latinLnBrk="0" hangingPunct="1">
       <a:defRPr sz="1800" kern="1200">
         <a:solidFill>
           <a:schemeClr val="tx1"/>
@@ -71,7 +74,7 @@
         <a:cs typeface="+mn-cs"/>
       </a:defRPr>
     </a:lvl5pPr>
-    <a:lvl6pPr marL="2286000" algn="l" defTabSz="914400" rtl="0" eaLnBrk="1" latinLnBrk="0" hangingPunct="1">
+    <a:lvl6pPr marL="2286000" algn="l" defTabSz="457200" rtl="0" eaLnBrk="1" latinLnBrk="0" hangingPunct="1">
       <a:defRPr sz="1800" kern="1200">
         <a:solidFill>
           <a:schemeClr val="tx1"/>
@@ -81,7 +84,7 @@
         <a:cs typeface="+mn-cs"/>
       </a:defRPr>
     </a:lvl6pPr>
-    <a:lvl7pPr marL="2743200" algn="l" defTabSz="914400" rtl="0" eaLnBrk="1" latinLnBrk="0" hangingPunct="1">
+    <a:lvl7pPr marL="2743200" algn="l" defTabSz="457200" rtl="0" eaLnBrk="1" latinLnBrk="0" hangingPunct="1">
       <a:defRPr sz="1800" kern="1200">
         <a:solidFill>
           <a:schemeClr val="tx1"/>
@@ -91,7 +94,7 @@
         <a:cs typeface="+mn-cs"/>
       </a:defRPr>
     </a:lvl7pPr>
-    <a:lvl8pPr marL="3200400" algn="l" defTabSz="914400" rtl="0" eaLnBrk="1" latinLnBrk="0" hangingPunct="1">
+    <a:lvl8pPr marL="3200400" algn="l" defTabSz="457200" rtl="0" eaLnBrk="1" latinLnBrk="0" hangingPunct="1">
       <a:defRPr sz="1800" kern="1200">
         <a:solidFill>
           <a:schemeClr val="tx1"/>
@@ -101,7 +104,7 @@
         <a:cs typeface="+mn-cs"/>
       </a:defRPr>
     </a:lvl8pPr>
-    <a:lvl9pPr marL="3657600" algn="l" defTabSz="914400" rtl="0" eaLnBrk="1" latinLnBrk="0" hangingPunct="1">
+    <a:lvl9pPr marL="3657600" algn="l" defTabSz="457200" rtl="0" eaLnBrk="1" latinLnBrk="0" hangingPunct="1">
       <a:defRPr sz="1800" kern="1200">
         <a:solidFill>
           <a:schemeClr val="tx1"/>
@@ -123,7 +126,7 @@
 <file path=ppt/revisionInfo.xml><?xml version="1.0" encoding="utf-8"?>
 <p1510:revInfo xmlns:a="http://schemas.openxmlformats.org/drawingml/2006/main" xmlns:r="http://schemas.openxmlformats.org/officeDocument/2006/relationships" xmlns:p1510="http://schemas.microsoft.com/office/powerpoint/2015/10/main">
   <p1510:revLst>
-    <p1510:client id="{7273B22C-C245-4F33-9671-B4FF89330F8E}" v="9" dt="2025-04-04T15:15:02.035"/>
+    <p1510:client id="{7273B22C-C245-4F33-9671-B4FF89330F8E}" v="15" dt="2025-04-17T18:00:25.683"/>
   </p1510:revLst>
 </p1510:revInfo>
 </file>
@@ -132,19 +135,19 @@
 <pc:chgInfo xmlns:a="http://schemas.openxmlformats.org/drawingml/2006/main" xmlns:r="http://schemas.openxmlformats.org/officeDocument/2006/relationships" xmlns:ac="http://schemas.microsoft.com/office/drawing/2013/main/command" xmlns:pc="http://schemas.microsoft.com/office/powerpoint/2013/main/command">
   <pc:docChgLst>
     <pc:chgData name="Samuel Aldous" userId="0ff3eb4db5f3e0fd" providerId="LiveId" clId="{7273B22C-C245-4F33-9671-B4FF89330F8E}"/>
-    <pc:docChg chg="undo custSel addSld modSld">
-      <pc:chgData name="Samuel Aldous" userId="0ff3eb4db5f3e0fd" providerId="LiveId" clId="{7273B22C-C245-4F33-9671-B4FF89330F8E}" dt="2025-04-16T15:53:01.124" v="4231" actId="1076"/>
+    <pc:docChg chg="undo custSel addSld modSld sldOrd modMainMaster modNotesMaster">
+      <pc:chgData name="Samuel Aldous" userId="0ff3eb4db5f3e0fd" providerId="LiveId" clId="{7273B22C-C245-4F33-9671-B4FF89330F8E}" dt="2025-04-17T18:02:01.609" v="4590" actId="20577"/>
       <pc:docMkLst>
         <pc:docMk/>
       </pc:docMkLst>
       <pc:sldChg chg="modSp mod">
-        <pc:chgData name="Samuel Aldous" userId="0ff3eb4db5f3e0fd" providerId="LiveId" clId="{7273B22C-C245-4F33-9671-B4FF89330F8E}" dt="2025-04-16T15:52:47.330" v="4228" actId="14100"/>
+        <pc:chgData name="Samuel Aldous" userId="0ff3eb4db5f3e0fd" providerId="LiveId" clId="{7273B22C-C245-4F33-9671-B4FF89330F8E}" dt="2025-04-17T17:57:06.280" v="4356"/>
         <pc:sldMkLst>
           <pc:docMk/>
           <pc:sldMk cId="594746656" sldId="256"/>
         </pc:sldMkLst>
         <pc:spChg chg="mod">
-          <ac:chgData name="Samuel Aldous" userId="0ff3eb4db5f3e0fd" providerId="LiveId" clId="{7273B22C-C245-4F33-9671-B4FF89330F8E}" dt="2025-04-16T15:52:41.552" v="4227" actId="14100"/>
+          <ac:chgData name="Samuel Aldous" userId="0ff3eb4db5f3e0fd" providerId="LiveId" clId="{7273B22C-C245-4F33-9671-B4FF89330F8E}" dt="2025-04-17T17:57:06.280" v="4356"/>
           <ac:spMkLst>
             <pc:docMk/>
             <pc:sldMk cId="594746656" sldId="256"/>
@@ -152,7 +155,7 @@
           </ac:spMkLst>
         </pc:spChg>
         <pc:picChg chg="mod">
-          <ac:chgData name="Samuel Aldous" userId="0ff3eb4db5f3e0fd" providerId="LiveId" clId="{7273B22C-C245-4F33-9671-B4FF89330F8E}" dt="2025-04-16T15:52:47.330" v="4228" actId="14100"/>
+          <ac:chgData name="Samuel Aldous" userId="0ff3eb4db5f3e0fd" providerId="LiveId" clId="{7273B22C-C245-4F33-9671-B4FF89330F8E}" dt="2025-04-17T17:57:06.280" v="4356"/>
           <ac:picMkLst>
             <pc:docMk/>
             <pc:sldMk cId="594746656" sldId="256"/>
@@ -160,14 +163,14 @@
           </ac:picMkLst>
         </pc:picChg>
       </pc:sldChg>
-      <pc:sldChg chg="addSp delSp modSp new mod">
-        <pc:chgData name="Samuel Aldous" userId="0ff3eb4db5f3e0fd" providerId="LiveId" clId="{7273B22C-C245-4F33-9671-B4FF89330F8E}" dt="2025-03-30T09:59:45.317" v="4030" actId="14100"/>
+      <pc:sldChg chg="addSp delSp modSp new mod modNotes">
+        <pc:chgData name="Samuel Aldous" userId="0ff3eb4db5f3e0fd" providerId="LiveId" clId="{7273B22C-C245-4F33-9671-B4FF89330F8E}" dt="2025-04-17T17:57:06.280" v="4356"/>
         <pc:sldMkLst>
           <pc:docMk/>
           <pc:sldMk cId="2377589347" sldId="257"/>
         </pc:sldMkLst>
         <pc:spChg chg="add mod">
-          <ac:chgData name="Samuel Aldous" userId="0ff3eb4db5f3e0fd" providerId="LiveId" clId="{7273B22C-C245-4F33-9671-B4FF89330F8E}" dt="2025-03-30T09:59:12.156" v="4027" actId="1035"/>
+          <ac:chgData name="Samuel Aldous" userId="0ff3eb4db5f3e0fd" providerId="LiveId" clId="{7273B22C-C245-4F33-9671-B4FF89330F8E}" dt="2025-04-17T17:57:06.280" v="4356"/>
           <ac:spMkLst>
             <pc:docMk/>
             <pc:sldMk cId="2377589347" sldId="257"/>
@@ -175,7 +178,7 @@
           </ac:spMkLst>
         </pc:spChg>
         <pc:picChg chg="add mod">
-          <ac:chgData name="Samuel Aldous" userId="0ff3eb4db5f3e0fd" providerId="LiveId" clId="{7273B22C-C245-4F33-9671-B4FF89330F8E}" dt="2025-03-30T09:59:45.317" v="4030" actId="14100"/>
+          <ac:chgData name="Samuel Aldous" userId="0ff3eb4db5f3e0fd" providerId="LiveId" clId="{7273B22C-C245-4F33-9671-B4FF89330F8E}" dt="2025-04-17T17:57:06.280" v="4356"/>
           <ac:picMkLst>
             <pc:docMk/>
             <pc:sldMk cId="2377589347" sldId="257"/>
@@ -183,14 +186,14 @@
           </ac:picMkLst>
         </pc:picChg>
       </pc:sldChg>
-      <pc:sldChg chg="addSp delSp modSp new mod">
-        <pc:chgData name="Samuel Aldous" userId="0ff3eb4db5f3e0fd" providerId="LiveId" clId="{7273B22C-C245-4F33-9671-B4FF89330F8E}" dt="2025-04-16T15:53:01.124" v="4231" actId="1076"/>
+      <pc:sldChg chg="addSp delSp modSp new mod modNotes">
+        <pc:chgData name="Samuel Aldous" userId="0ff3eb4db5f3e0fd" providerId="LiveId" clId="{7273B22C-C245-4F33-9671-B4FF89330F8E}" dt="2025-04-17T17:57:06.280" v="4356"/>
         <pc:sldMkLst>
           <pc:docMk/>
           <pc:sldMk cId="2660082026" sldId="258"/>
         </pc:sldMkLst>
         <pc:spChg chg="add mod">
-          <ac:chgData name="Samuel Aldous" userId="0ff3eb4db5f3e0fd" providerId="LiveId" clId="{7273B22C-C245-4F33-9671-B4FF89330F8E}" dt="2025-04-16T15:53:01.124" v="4231" actId="1076"/>
+          <ac:chgData name="Samuel Aldous" userId="0ff3eb4db5f3e0fd" providerId="LiveId" clId="{7273B22C-C245-4F33-9671-B4FF89330F8E}" dt="2025-04-17T17:57:06.280" v="4356"/>
           <ac:spMkLst>
             <pc:docMk/>
             <pc:sldMk cId="2660082026" sldId="258"/>
@@ -198,7 +201,7 @@
           </ac:spMkLst>
         </pc:spChg>
         <pc:picChg chg="add mod">
-          <ac:chgData name="Samuel Aldous" userId="0ff3eb4db5f3e0fd" providerId="LiveId" clId="{7273B22C-C245-4F33-9671-B4FF89330F8E}" dt="2025-04-16T15:52:56.571" v="4230" actId="1076"/>
+          <ac:chgData name="Samuel Aldous" userId="0ff3eb4db5f3e0fd" providerId="LiveId" clId="{7273B22C-C245-4F33-9671-B4FF89330F8E}" dt="2025-04-17T17:57:06.280" v="4356"/>
           <ac:picMkLst>
             <pc:docMk/>
             <pc:sldMk cId="2660082026" sldId="258"/>
@@ -207,13 +210,13 @@
         </pc:picChg>
       </pc:sldChg>
       <pc:sldChg chg="addSp modSp new mod">
-        <pc:chgData name="Samuel Aldous" userId="0ff3eb4db5f3e0fd" providerId="LiveId" clId="{7273B22C-C245-4F33-9671-B4FF89330F8E}" dt="2025-04-05T12:12:22.852" v="4213" actId="20577"/>
+        <pc:chgData name="Samuel Aldous" userId="0ff3eb4db5f3e0fd" providerId="LiveId" clId="{7273B22C-C245-4F33-9671-B4FF89330F8E}" dt="2025-04-17T17:57:34.985" v="4361" actId="14100"/>
         <pc:sldMkLst>
           <pc:docMk/>
           <pc:sldMk cId="2544863509" sldId="259"/>
         </pc:sldMkLst>
         <pc:spChg chg="add mod">
-          <ac:chgData name="Samuel Aldous" userId="0ff3eb4db5f3e0fd" providerId="LiveId" clId="{7273B22C-C245-4F33-9671-B4FF89330F8E}" dt="2025-04-05T12:12:22.852" v="4213" actId="20577"/>
+          <ac:chgData name="Samuel Aldous" userId="0ff3eb4db5f3e0fd" providerId="LiveId" clId="{7273B22C-C245-4F33-9671-B4FF89330F8E}" dt="2025-04-17T17:57:06.280" v="4356"/>
           <ac:spMkLst>
             <pc:docMk/>
             <pc:sldMk cId="2544863509" sldId="259"/>
@@ -221,7 +224,7 @@
           </ac:spMkLst>
         </pc:spChg>
         <pc:picChg chg="add mod">
-          <ac:chgData name="Samuel Aldous" userId="0ff3eb4db5f3e0fd" providerId="LiveId" clId="{7273B22C-C245-4F33-9671-B4FF89330F8E}" dt="2025-04-04T15:15:08.920" v="4156" actId="1076"/>
+          <ac:chgData name="Samuel Aldous" userId="0ff3eb4db5f3e0fd" providerId="LiveId" clId="{7273B22C-C245-4F33-9671-B4FF89330F8E}" dt="2025-04-17T17:57:34.985" v="4361" actId="14100"/>
           <ac:picMkLst>
             <pc:docMk/>
             <pc:sldMk cId="2544863509" sldId="259"/>
@@ -229,13 +232,355 @@
           </ac:picMkLst>
         </pc:picChg>
       </pc:sldChg>
-      <pc:sldChg chg="new">
-        <pc:chgData name="Samuel Aldous" userId="0ff3eb4db5f3e0fd" providerId="LiveId" clId="{7273B22C-C245-4F33-9671-B4FF89330F8E}" dt="2025-04-05T12:14:37.121" v="4214" actId="680"/>
+      <pc:sldChg chg="modSp mod ord">
+        <pc:chgData name="Samuel Aldous" userId="0ff3eb4db5f3e0fd" providerId="LiveId" clId="{7273B22C-C245-4F33-9671-B4FF89330F8E}" dt="2025-04-17T17:57:06.280" v="4356"/>
+        <pc:sldMkLst>
+          <pc:docMk/>
+          <pc:sldMk cId="2142045004" sldId="260"/>
+        </pc:sldMkLst>
+        <pc:spChg chg="mod">
+          <ac:chgData name="Samuel Aldous" userId="0ff3eb4db5f3e0fd" providerId="LiveId" clId="{7273B22C-C245-4F33-9671-B4FF89330F8E}" dt="2025-04-17T17:57:06.280" v="4356"/>
+          <ac:spMkLst>
+            <pc:docMk/>
+            <pc:sldMk cId="2142045004" sldId="260"/>
+            <ac:spMk id="2" creationId="{42BC03BC-A176-4603-B319-BEEB53851EAF}"/>
+          </ac:spMkLst>
+        </pc:spChg>
+      </pc:sldChg>
+      <pc:sldChg chg="addSp modSp new mod">
+        <pc:chgData name="Samuel Aldous" userId="0ff3eb4db5f3e0fd" providerId="LiveId" clId="{7273B22C-C245-4F33-9671-B4FF89330F8E}" dt="2025-04-17T17:57:54.458" v="4362" actId="113"/>
         <pc:sldMkLst>
           <pc:docMk/>
           <pc:sldMk cId="170184987" sldId="261"/>
         </pc:sldMkLst>
+        <pc:spChg chg="add mod">
+          <ac:chgData name="Samuel Aldous" userId="0ff3eb4db5f3e0fd" providerId="LiveId" clId="{7273B22C-C245-4F33-9671-B4FF89330F8E}" dt="2025-04-17T17:57:54.458" v="4362" actId="113"/>
+          <ac:spMkLst>
+            <pc:docMk/>
+            <pc:sldMk cId="170184987" sldId="261"/>
+            <ac:spMk id="2" creationId="{C2402DA4-11EE-8708-2087-613F15B6AEEE}"/>
+          </ac:spMkLst>
+        </pc:spChg>
       </pc:sldChg>
+      <pc:sldChg chg="addSp modSp new mod">
+        <pc:chgData name="Samuel Aldous" userId="0ff3eb4db5f3e0fd" providerId="LiveId" clId="{7273B22C-C245-4F33-9671-B4FF89330F8E}" dt="2025-04-17T17:58:26.021" v="4439" actId="20577"/>
+        <pc:sldMkLst>
+          <pc:docMk/>
+          <pc:sldMk cId="1233152676" sldId="262"/>
+        </pc:sldMkLst>
+        <pc:spChg chg="add mod">
+          <ac:chgData name="Samuel Aldous" userId="0ff3eb4db5f3e0fd" providerId="LiveId" clId="{7273B22C-C245-4F33-9671-B4FF89330F8E}" dt="2025-04-17T17:58:26.021" v="4439" actId="20577"/>
+          <ac:spMkLst>
+            <pc:docMk/>
+            <pc:sldMk cId="1233152676" sldId="262"/>
+            <ac:spMk id="2" creationId="{A2883001-A74A-9EC1-EAFB-163BE374828F}"/>
+          </ac:spMkLst>
+        </pc:spChg>
+      </pc:sldChg>
+      <pc:sldChg chg="addSp modSp new mod">
+        <pc:chgData name="Samuel Aldous" userId="0ff3eb4db5f3e0fd" providerId="LiveId" clId="{7273B22C-C245-4F33-9671-B4FF89330F8E}" dt="2025-04-17T18:00:10.815" v="4456" actId="1076"/>
+        <pc:sldMkLst>
+          <pc:docMk/>
+          <pc:sldMk cId="2480000070" sldId="263"/>
+        </pc:sldMkLst>
+        <pc:spChg chg="add mod">
+          <ac:chgData name="Samuel Aldous" userId="0ff3eb4db5f3e0fd" providerId="LiveId" clId="{7273B22C-C245-4F33-9671-B4FF89330F8E}" dt="2025-04-17T18:00:10.815" v="4456" actId="1076"/>
+          <ac:spMkLst>
+            <pc:docMk/>
+            <pc:sldMk cId="2480000070" sldId="263"/>
+            <ac:spMk id="2" creationId="{A8389FEB-A693-BCAD-76FA-27FB4DFEF374}"/>
+          </ac:spMkLst>
+        </pc:spChg>
+      </pc:sldChg>
+      <pc:sldChg chg="addSp modSp new mod">
+        <pc:chgData name="Samuel Aldous" userId="0ff3eb4db5f3e0fd" providerId="LiveId" clId="{7273B22C-C245-4F33-9671-B4FF89330F8E}" dt="2025-04-17T18:02:01.609" v="4590" actId="20577"/>
+        <pc:sldMkLst>
+          <pc:docMk/>
+          <pc:sldMk cId="1010243734" sldId="264"/>
+        </pc:sldMkLst>
+        <pc:spChg chg="add mod">
+          <ac:chgData name="Samuel Aldous" userId="0ff3eb4db5f3e0fd" providerId="LiveId" clId="{7273B22C-C245-4F33-9671-B4FF89330F8E}" dt="2025-04-17T18:02:01.609" v="4590" actId="20577"/>
+          <ac:spMkLst>
+            <pc:docMk/>
+            <pc:sldMk cId="1010243734" sldId="264"/>
+            <ac:spMk id="2" creationId="{C35AEC6F-DF4C-E153-C994-06805D4263D7}"/>
+          </ac:spMkLst>
+        </pc:spChg>
+      </pc:sldChg>
+      <pc:sldMasterChg chg="modSp modSldLayout">
+        <pc:chgData name="Samuel Aldous" userId="0ff3eb4db5f3e0fd" providerId="LiveId" clId="{7273B22C-C245-4F33-9671-B4FF89330F8E}" dt="2025-04-17T17:57:06.280" v="4356"/>
+        <pc:sldMasterMkLst>
+          <pc:docMk/>
+          <pc:sldMasterMk cId="1639791294" sldId="2147483660"/>
+        </pc:sldMasterMkLst>
+        <pc:spChg chg="mod">
+          <ac:chgData name="Samuel Aldous" userId="0ff3eb4db5f3e0fd" providerId="LiveId" clId="{7273B22C-C245-4F33-9671-B4FF89330F8E}" dt="2025-04-17T17:57:06.280" v="4356"/>
+          <ac:spMkLst>
+            <pc:docMk/>
+            <pc:sldMasterMk cId="1639791294" sldId="2147483660"/>
+            <ac:spMk id="2" creationId="{00000000-0000-0000-0000-000000000000}"/>
+          </ac:spMkLst>
+        </pc:spChg>
+        <pc:spChg chg="mod">
+          <ac:chgData name="Samuel Aldous" userId="0ff3eb4db5f3e0fd" providerId="LiveId" clId="{7273B22C-C245-4F33-9671-B4FF89330F8E}" dt="2025-04-17T17:57:06.280" v="4356"/>
+          <ac:spMkLst>
+            <pc:docMk/>
+            <pc:sldMasterMk cId="1639791294" sldId="2147483660"/>
+            <ac:spMk id="3" creationId="{00000000-0000-0000-0000-000000000000}"/>
+          </ac:spMkLst>
+        </pc:spChg>
+        <pc:spChg chg="mod">
+          <ac:chgData name="Samuel Aldous" userId="0ff3eb4db5f3e0fd" providerId="LiveId" clId="{7273B22C-C245-4F33-9671-B4FF89330F8E}" dt="2025-04-17T17:57:06.280" v="4356"/>
+          <ac:spMkLst>
+            <pc:docMk/>
+            <pc:sldMasterMk cId="1639791294" sldId="2147483660"/>
+            <ac:spMk id="4" creationId="{00000000-0000-0000-0000-000000000000}"/>
+          </ac:spMkLst>
+        </pc:spChg>
+        <pc:spChg chg="mod">
+          <ac:chgData name="Samuel Aldous" userId="0ff3eb4db5f3e0fd" providerId="LiveId" clId="{7273B22C-C245-4F33-9671-B4FF89330F8E}" dt="2025-04-17T17:57:06.280" v="4356"/>
+          <ac:spMkLst>
+            <pc:docMk/>
+            <pc:sldMasterMk cId="1639791294" sldId="2147483660"/>
+            <ac:spMk id="5" creationId="{00000000-0000-0000-0000-000000000000}"/>
+          </ac:spMkLst>
+        </pc:spChg>
+        <pc:spChg chg="mod">
+          <ac:chgData name="Samuel Aldous" userId="0ff3eb4db5f3e0fd" providerId="LiveId" clId="{7273B22C-C245-4F33-9671-B4FF89330F8E}" dt="2025-04-17T17:57:06.280" v="4356"/>
+          <ac:spMkLst>
+            <pc:docMk/>
+            <pc:sldMasterMk cId="1639791294" sldId="2147483660"/>
+            <ac:spMk id="6" creationId="{00000000-0000-0000-0000-000000000000}"/>
+          </ac:spMkLst>
+        </pc:spChg>
+        <pc:sldLayoutChg chg="modSp">
+          <pc:chgData name="Samuel Aldous" userId="0ff3eb4db5f3e0fd" providerId="LiveId" clId="{7273B22C-C245-4F33-9671-B4FF89330F8E}" dt="2025-04-17T17:57:06.280" v="4356"/>
+          <pc:sldLayoutMkLst>
+            <pc:docMk/>
+            <pc:sldMasterMk cId="1639791294" sldId="2147483660"/>
+            <pc:sldLayoutMk cId="880864121" sldId="2147483661"/>
+          </pc:sldLayoutMkLst>
+          <pc:spChg chg="mod">
+            <ac:chgData name="Samuel Aldous" userId="0ff3eb4db5f3e0fd" providerId="LiveId" clId="{7273B22C-C245-4F33-9671-B4FF89330F8E}" dt="2025-04-17T17:57:06.280" v="4356"/>
+            <ac:spMkLst>
+              <pc:docMk/>
+              <pc:sldMasterMk cId="1639791294" sldId="2147483660"/>
+              <pc:sldLayoutMk cId="880864121" sldId="2147483661"/>
+              <ac:spMk id="2" creationId="{00000000-0000-0000-0000-000000000000}"/>
+            </ac:spMkLst>
+          </pc:spChg>
+          <pc:spChg chg="mod">
+            <ac:chgData name="Samuel Aldous" userId="0ff3eb4db5f3e0fd" providerId="LiveId" clId="{7273B22C-C245-4F33-9671-B4FF89330F8E}" dt="2025-04-17T17:57:06.280" v="4356"/>
+            <ac:spMkLst>
+              <pc:docMk/>
+              <pc:sldMasterMk cId="1639791294" sldId="2147483660"/>
+              <pc:sldLayoutMk cId="880864121" sldId="2147483661"/>
+              <ac:spMk id="3" creationId="{00000000-0000-0000-0000-000000000000}"/>
+            </ac:spMkLst>
+          </pc:spChg>
+        </pc:sldLayoutChg>
+        <pc:sldLayoutChg chg="modSp">
+          <pc:chgData name="Samuel Aldous" userId="0ff3eb4db5f3e0fd" providerId="LiveId" clId="{7273B22C-C245-4F33-9671-B4FF89330F8E}" dt="2025-04-17T17:57:06.280" v="4356"/>
+          <pc:sldLayoutMkLst>
+            <pc:docMk/>
+            <pc:sldMasterMk cId="1639791294" sldId="2147483660"/>
+            <pc:sldLayoutMk cId="3519707564" sldId="2147483663"/>
+          </pc:sldLayoutMkLst>
+          <pc:spChg chg="mod">
+            <ac:chgData name="Samuel Aldous" userId="0ff3eb4db5f3e0fd" providerId="LiveId" clId="{7273B22C-C245-4F33-9671-B4FF89330F8E}" dt="2025-04-17T17:57:06.280" v="4356"/>
+            <ac:spMkLst>
+              <pc:docMk/>
+              <pc:sldMasterMk cId="1639791294" sldId="2147483660"/>
+              <pc:sldLayoutMk cId="3519707564" sldId="2147483663"/>
+              <ac:spMk id="2" creationId="{00000000-0000-0000-0000-000000000000}"/>
+            </ac:spMkLst>
+          </pc:spChg>
+          <pc:spChg chg="mod">
+            <ac:chgData name="Samuel Aldous" userId="0ff3eb4db5f3e0fd" providerId="LiveId" clId="{7273B22C-C245-4F33-9671-B4FF89330F8E}" dt="2025-04-17T17:57:06.280" v="4356"/>
+            <ac:spMkLst>
+              <pc:docMk/>
+              <pc:sldMasterMk cId="1639791294" sldId="2147483660"/>
+              <pc:sldLayoutMk cId="3519707564" sldId="2147483663"/>
+              <ac:spMk id="3" creationId="{00000000-0000-0000-0000-000000000000}"/>
+            </ac:spMkLst>
+          </pc:spChg>
+        </pc:sldLayoutChg>
+        <pc:sldLayoutChg chg="modSp">
+          <pc:chgData name="Samuel Aldous" userId="0ff3eb4db5f3e0fd" providerId="LiveId" clId="{7273B22C-C245-4F33-9671-B4FF89330F8E}" dt="2025-04-17T17:57:06.280" v="4356"/>
+          <pc:sldLayoutMkLst>
+            <pc:docMk/>
+            <pc:sldMasterMk cId="1639791294" sldId="2147483660"/>
+            <pc:sldLayoutMk cId="4106865199" sldId="2147483664"/>
+          </pc:sldLayoutMkLst>
+          <pc:spChg chg="mod">
+            <ac:chgData name="Samuel Aldous" userId="0ff3eb4db5f3e0fd" providerId="LiveId" clId="{7273B22C-C245-4F33-9671-B4FF89330F8E}" dt="2025-04-17T17:57:06.280" v="4356"/>
+            <ac:spMkLst>
+              <pc:docMk/>
+              <pc:sldMasterMk cId="1639791294" sldId="2147483660"/>
+              <pc:sldLayoutMk cId="4106865199" sldId="2147483664"/>
+              <ac:spMk id="3" creationId="{00000000-0000-0000-0000-000000000000}"/>
+            </ac:spMkLst>
+          </pc:spChg>
+          <pc:spChg chg="mod">
+            <ac:chgData name="Samuel Aldous" userId="0ff3eb4db5f3e0fd" providerId="LiveId" clId="{7273B22C-C245-4F33-9671-B4FF89330F8E}" dt="2025-04-17T17:57:06.280" v="4356"/>
+            <ac:spMkLst>
+              <pc:docMk/>
+              <pc:sldMasterMk cId="1639791294" sldId="2147483660"/>
+              <pc:sldLayoutMk cId="4106865199" sldId="2147483664"/>
+              <ac:spMk id="4" creationId="{00000000-0000-0000-0000-000000000000}"/>
+            </ac:spMkLst>
+          </pc:spChg>
+        </pc:sldLayoutChg>
+        <pc:sldLayoutChg chg="modSp">
+          <pc:chgData name="Samuel Aldous" userId="0ff3eb4db5f3e0fd" providerId="LiveId" clId="{7273B22C-C245-4F33-9671-B4FF89330F8E}" dt="2025-04-17T17:57:06.280" v="4356"/>
+          <pc:sldLayoutMkLst>
+            <pc:docMk/>
+            <pc:sldMasterMk cId="1639791294" sldId="2147483660"/>
+            <pc:sldLayoutMk cId="3811016800" sldId="2147483665"/>
+          </pc:sldLayoutMkLst>
+          <pc:spChg chg="mod">
+            <ac:chgData name="Samuel Aldous" userId="0ff3eb4db5f3e0fd" providerId="LiveId" clId="{7273B22C-C245-4F33-9671-B4FF89330F8E}" dt="2025-04-17T17:57:06.280" v="4356"/>
+            <ac:spMkLst>
+              <pc:docMk/>
+              <pc:sldMasterMk cId="1639791294" sldId="2147483660"/>
+              <pc:sldLayoutMk cId="3811016800" sldId="2147483665"/>
+              <ac:spMk id="2" creationId="{00000000-0000-0000-0000-000000000000}"/>
+            </ac:spMkLst>
+          </pc:spChg>
+          <pc:spChg chg="mod">
+            <ac:chgData name="Samuel Aldous" userId="0ff3eb4db5f3e0fd" providerId="LiveId" clId="{7273B22C-C245-4F33-9671-B4FF89330F8E}" dt="2025-04-17T17:57:06.280" v="4356"/>
+            <ac:spMkLst>
+              <pc:docMk/>
+              <pc:sldMasterMk cId="1639791294" sldId="2147483660"/>
+              <pc:sldLayoutMk cId="3811016800" sldId="2147483665"/>
+              <ac:spMk id="3" creationId="{00000000-0000-0000-0000-000000000000}"/>
+            </ac:spMkLst>
+          </pc:spChg>
+          <pc:spChg chg="mod">
+            <ac:chgData name="Samuel Aldous" userId="0ff3eb4db5f3e0fd" providerId="LiveId" clId="{7273B22C-C245-4F33-9671-B4FF89330F8E}" dt="2025-04-17T17:57:06.280" v="4356"/>
+            <ac:spMkLst>
+              <pc:docMk/>
+              <pc:sldMasterMk cId="1639791294" sldId="2147483660"/>
+              <pc:sldLayoutMk cId="3811016800" sldId="2147483665"/>
+              <ac:spMk id="4" creationId="{00000000-0000-0000-0000-000000000000}"/>
+            </ac:spMkLst>
+          </pc:spChg>
+          <pc:spChg chg="mod">
+            <ac:chgData name="Samuel Aldous" userId="0ff3eb4db5f3e0fd" providerId="LiveId" clId="{7273B22C-C245-4F33-9671-B4FF89330F8E}" dt="2025-04-17T17:57:06.280" v="4356"/>
+            <ac:spMkLst>
+              <pc:docMk/>
+              <pc:sldMasterMk cId="1639791294" sldId="2147483660"/>
+              <pc:sldLayoutMk cId="3811016800" sldId="2147483665"/>
+              <ac:spMk id="5" creationId="{00000000-0000-0000-0000-000000000000}"/>
+            </ac:spMkLst>
+          </pc:spChg>
+          <pc:spChg chg="mod">
+            <ac:chgData name="Samuel Aldous" userId="0ff3eb4db5f3e0fd" providerId="LiveId" clId="{7273B22C-C245-4F33-9671-B4FF89330F8E}" dt="2025-04-17T17:57:06.280" v="4356"/>
+            <ac:spMkLst>
+              <pc:docMk/>
+              <pc:sldMasterMk cId="1639791294" sldId="2147483660"/>
+              <pc:sldLayoutMk cId="3811016800" sldId="2147483665"/>
+              <ac:spMk id="6" creationId="{00000000-0000-0000-0000-000000000000}"/>
+            </ac:spMkLst>
+          </pc:spChg>
+        </pc:sldLayoutChg>
+        <pc:sldLayoutChg chg="modSp">
+          <pc:chgData name="Samuel Aldous" userId="0ff3eb4db5f3e0fd" providerId="LiveId" clId="{7273B22C-C245-4F33-9671-B4FF89330F8E}" dt="2025-04-17T17:57:06.280" v="4356"/>
+          <pc:sldLayoutMkLst>
+            <pc:docMk/>
+            <pc:sldMasterMk cId="1639791294" sldId="2147483660"/>
+            <pc:sldLayoutMk cId="1898176345" sldId="2147483668"/>
+          </pc:sldLayoutMkLst>
+          <pc:spChg chg="mod">
+            <ac:chgData name="Samuel Aldous" userId="0ff3eb4db5f3e0fd" providerId="LiveId" clId="{7273B22C-C245-4F33-9671-B4FF89330F8E}" dt="2025-04-17T17:57:06.280" v="4356"/>
+            <ac:spMkLst>
+              <pc:docMk/>
+              <pc:sldMasterMk cId="1639791294" sldId="2147483660"/>
+              <pc:sldLayoutMk cId="1898176345" sldId="2147483668"/>
+              <ac:spMk id="2" creationId="{00000000-0000-0000-0000-000000000000}"/>
+            </ac:spMkLst>
+          </pc:spChg>
+          <pc:spChg chg="mod">
+            <ac:chgData name="Samuel Aldous" userId="0ff3eb4db5f3e0fd" providerId="LiveId" clId="{7273B22C-C245-4F33-9671-B4FF89330F8E}" dt="2025-04-17T17:57:06.280" v="4356"/>
+            <ac:spMkLst>
+              <pc:docMk/>
+              <pc:sldMasterMk cId="1639791294" sldId="2147483660"/>
+              <pc:sldLayoutMk cId="1898176345" sldId="2147483668"/>
+              <ac:spMk id="3" creationId="{00000000-0000-0000-0000-000000000000}"/>
+            </ac:spMkLst>
+          </pc:spChg>
+          <pc:spChg chg="mod">
+            <ac:chgData name="Samuel Aldous" userId="0ff3eb4db5f3e0fd" providerId="LiveId" clId="{7273B22C-C245-4F33-9671-B4FF89330F8E}" dt="2025-04-17T17:57:06.280" v="4356"/>
+            <ac:spMkLst>
+              <pc:docMk/>
+              <pc:sldMasterMk cId="1639791294" sldId="2147483660"/>
+              <pc:sldLayoutMk cId="1898176345" sldId="2147483668"/>
+              <ac:spMk id="4" creationId="{00000000-0000-0000-0000-000000000000}"/>
+            </ac:spMkLst>
+          </pc:spChg>
+        </pc:sldLayoutChg>
+        <pc:sldLayoutChg chg="modSp">
+          <pc:chgData name="Samuel Aldous" userId="0ff3eb4db5f3e0fd" providerId="LiveId" clId="{7273B22C-C245-4F33-9671-B4FF89330F8E}" dt="2025-04-17T17:57:06.280" v="4356"/>
+          <pc:sldLayoutMkLst>
+            <pc:docMk/>
+            <pc:sldMasterMk cId="1639791294" sldId="2147483660"/>
+            <pc:sldLayoutMk cId="1339397477" sldId="2147483669"/>
+          </pc:sldLayoutMkLst>
+          <pc:spChg chg="mod">
+            <ac:chgData name="Samuel Aldous" userId="0ff3eb4db5f3e0fd" providerId="LiveId" clId="{7273B22C-C245-4F33-9671-B4FF89330F8E}" dt="2025-04-17T17:57:06.280" v="4356"/>
+            <ac:spMkLst>
+              <pc:docMk/>
+              <pc:sldMasterMk cId="1639791294" sldId="2147483660"/>
+              <pc:sldLayoutMk cId="1339397477" sldId="2147483669"/>
+              <ac:spMk id="2" creationId="{00000000-0000-0000-0000-000000000000}"/>
+            </ac:spMkLst>
+          </pc:spChg>
+          <pc:spChg chg="mod">
+            <ac:chgData name="Samuel Aldous" userId="0ff3eb4db5f3e0fd" providerId="LiveId" clId="{7273B22C-C245-4F33-9671-B4FF89330F8E}" dt="2025-04-17T17:57:06.280" v="4356"/>
+            <ac:spMkLst>
+              <pc:docMk/>
+              <pc:sldMasterMk cId="1639791294" sldId="2147483660"/>
+              <pc:sldLayoutMk cId="1339397477" sldId="2147483669"/>
+              <ac:spMk id="3" creationId="{00000000-0000-0000-0000-000000000000}"/>
+            </ac:spMkLst>
+          </pc:spChg>
+          <pc:spChg chg="mod">
+            <ac:chgData name="Samuel Aldous" userId="0ff3eb4db5f3e0fd" providerId="LiveId" clId="{7273B22C-C245-4F33-9671-B4FF89330F8E}" dt="2025-04-17T17:57:06.280" v="4356"/>
+            <ac:spMkLst>
+              <pc:docMk/>
+              <pc:sldMasterMk cId="1639791294" sldId="2147483660"/>
+              <pc:sldLayoutMk cId="1339397477" sldId="2147483669"/>
+              <ac:spMk id="4" creationId="{00000000-0000-0000-0000-000000000000}"/>
+            </ac:spMkLst>
+          </pc:spChg>
+        </pc:sldLayoutChg>
+        <pc:sldLayoutChg chg="modSp">
+          <pc:chgData name="Samuel Aldous" userId="0ff3eb4db5f3e0fd" providerId="LiveId" clId="{7273B22C-C245-4F33-9671-B4FF89330F8E}" dt="2025-04-17T17:57:06.280" v="4356"/>
+          <pc:sldLayoutMkLst>
+            <pc:docMk/>
+            <pc:sldMasterMk cId="1639791294" sldId="2147483660"/>
+            <pc:sldLayoutMk cId="440341984" sldId="2147483671"/>
+          </pc:sldLayoutMkLst>
+          <pc:spChg chg="mod">
+            <ac:chgData name="Samuel Aldous" userId="0ff3eb4db5f3e0fd" providerId="LiveId" clId="{7273B22C-C245-4F33-9671-B4FF89330F8E}" dt="2025-04-17T17:57:06.280" v="4356"/>
+            <ac:spMkLst>
+              <pc:docMk/>
+              <pc:sldMasterMk cId="1639791294" sldId="2147483660"/>
+              <pc:sldLayoutMk cId="440341984" sldId="2147483671"/>
+              <ac:spMk id="2" creationId="{00000000-0000-0000-0000-000000000000}"/>
+            </ac:spMkLst>
+          </pc:spChg>
+          <pc:spChg chg="mod">
+            <ac:chgData name="Samuel Aldous" userId="0ff3eb4db5f3e0fd" providerId="LiveId" clId="{7273B22C-C245-4F33-9671-B4FF89330F8E}" dt="2025-04-17T17:57:06.280" v="4356"/>
+            <ac:spMkLst>
+              <pc:docMk/>
+              <pc:sldMasterMk cId="1639791294" sldId="2147483660"/>
+              <pc:sldLayoutMk cId="440341984" sldId="2147483671"/>
+              <ac:spMk id="3" creationId="{00000000-0000-0000-0000-000000000000}"/>
+            </ac:spMkLst>
+          </pc:spChg>
+        </pc:sldLayoutChg>
+      </pc:sldMasterChg>
     </pc:docChg>
   </pc:docChgLst>
 </pc:chgInfo>
@@ -323,7 +668,7 @@
           <a:p>
             <a:fld id="{B5F3BB3C-60B3-4EAD-B55D-4EAADA830A78}" type="datetimeFigureOut">
               <a:rPr lang="en-GB" smtClean="0"/>
-              <a:t>16/04/2025</a:t>
+              <a:t>17/04/2025</a:t>
             </a:fld>
             <a:endParaRPr lang="en-GB"/>
           </a:p>
@@ -618,7 +963,12 @@
             <p:ph type="sldImg"/>
           </p:nvPr>
         </p:nvSpPr>
-        <p:spPr/>
+        <p:spPr>
+          <a:xfrm>
+            <a:off x="685800" y="1143000"/>
+            <a:ext cx="5486400" cy="3086100"/>
+          </a:xfrm>
+        </p:spPr>
       </p:sp>
       <p:sp>
         <p:nvSpPr>
@@ -702,7 +1052,12 @@
             <p:ph type="sldImg"/>
           </p:nvPr>
         </p:nvSpPr>
-        <p:spPr/>
+        <p:spPr>
+          <a:xfrm>
+            <a:off x="685800" y="1143000"/>
+            <a:ext cx="5486400" cy="3086100"/>
+          </a:xfrm>
+        </p:spPr>
       </p:sp>
       <p:sp>
         <p:nvSpPr>
@@ -778,13 +1133,7 @@
       </p:grpSpPr>
       <p:sp>
         <p:nvSpPr>
-          <p:cNvPr id="2" name="Title 1">
-            <a:extLst>
-              <a:ext uri="{FF2B5EF4-FFF2-40B4-BE49-F238E27FC236}">
-                <a16:creationId xmlns:a16="http://schemas.microsoft.com/office/drawing/2014/main" id="{8D16B88C-A4C7-9FD1-610C-2B916A93966C}"/>
-              </a:ext>
-            </a:extLst>
-          </p:cNvPr>
+          <p:cNvPr id="2" name="Title 1"/>
           <p:cNvSpPr>
             <a:spLocks noGrp="1"/>
           </p:cNvSpPr>
@@ -810,19 +1159,13 @@
               <a:rPr lang="en-US"/>
               <a:t>Click to edit Master title style</a:t>
             </a:r>
-            <a:endParaRPr lang="en-GB"/>
-          </a:p>
-        </p:txBody>
-      </p:sp>
-      <p:sp>
-        <p:nvSpPr>
-          <p:cNvPr id="3" name="Subtitle 2">
-            <a:extLst>
-              <a:ext uri="{FF2B5EF4-FFF2-40B4-BE49-F238E27FC236}">
-                <a16:creationId xmlns:a16="http://schemas.microsoft.com/office/drawing/2014/main" id="{C5F349F2-373B-BA52-39F5-EF8621884983}"/>
-              </a:ext>
-            </a:extLst>
-          </p:cNvPr>
+            <a:endParaRPr lang="en-US" dirty="0"/>
+          </a:p>
+        </p:txBody>
+      </p:sp>
+      <p:sp>
+        <p:nvSpPr>
+          <p:cNvPr id="3" name="Subtitle 2"/>
           <p:cNvSpPr>
             <a:spLocks noGrp="1"/>
           </p:cNvSpPr>
@@ -881,19 +1224,13 @@
               <a:rPr lang="en-US"/>
               <a:t>Click to edit Master subtitle style</a:t>
             </a:r>
-            <a:endParaRPr lang="en-GB"/>
-          </a:p>
-        </p:txBody>
-      </p:sp>
-      <p:sp>
-        <p:nvSpPr>
-          <p:cNvPr id="4" name="Date Placeholder 3">
-            <a:extLst>
-              <a:ext uri="{FF2B5EF4-FFF2-40B4-BE49-F238E27FC236}">
-                <a16:creationId xmlns:a16="http://schemas.microsoft.com/office/drawing/2014/main" id="{35B2BD89-7C9E-9B4F-B6E3-2CB6429EDA13}"/>
-              </a:ext>
-            </a:extLst>
-          </p:cNvPr>
+            <a:endParaRPr lang="en-US" dirty="0"/>
+          </a:p>
+        </p:txBody>
+      </p:sp>
+      <p:sp>
+        <p:nvSpPr>
+          <p:cNvPr id="4" name="Date Placeholder 3"/>
           <p:cNvSpPr>
             <a:spLocks noGrp="1"/>
           </p:cNvSpPr>
@@ -908,7 +1245,7 @@
           <a:p>
             <a:fld id="{7B17242C-12C5-4BCA-8614-627256A12318}" type="datetimeFigureOut">
               <a:rPr lang="en-GB" smtClean="0"/>
-              <a:t>16/04/2025</a:t>
+              <a:t>17/04/2025</a:t>
             </a:fld>
             <a:endParaRPr lang="en-GB"/>
           </a:p>
@@ -916,13 +1253,7 @@
       </p:sp>
       <p:sp>
         <p:nvSpPr>
-          <p:cNvPr id="5" name="Footer Placeholder 4">
-            <a:extLst>
-              <a:ext uri="{FF2B5EF4-FFF2-40B4-BE49-F238E27FC236}">
-                <a16:creationId xmlns:a16="http://schemas.microsoft.com/office/drawing/2014/main" id="{7B29C015-ECD1-AAA6-8A0F-1E5F83EB528F}"/>
-              </a:ext>
-            </a:extLst>
-          </p:cNvPr>
+          <p:cNvPr id="5" name="Footer Placeholder 4"/>
           <p:cNvSpPr>
             <a:spLocks noGrp="1"/>
           </p:cNvSpPr>
@@ -941,13 +1272,7 @@
       </p:sp>
       <p:sp>
         <p:nvSpPr>
-          <p:cNvPr id="6" name="Slide Number Placeholder 5">
-            <a:extLst>
-              <a:ext uri="{FF2B5EF4-FFF2-40B4-BE49-F238E27FC236}">
-                <a16:creationId xmlns:a16="http://schemas.microsoft.com/office/drawing/2014/main" id="{0202E0A3-0FEE-7FFD-940B-CE5C7CC8A785}"/>
-              </a:ext>
-            </a:extLst>
-          </p:cNvPr>
+          <p:cNvPr id="6" name="Slide Number Placeholder 5"/>
           <p:cNvSpPr>
             <a:spLocks noGrp="1"/>
           </p:cNvSpPr>
@@ -971,7 +1296,7 @@
     </p:spTree>
     <p:extLst>
       <p:ext uri="{BB962C8B-B14F-4D97-AF65-F5344CB8AC3E}">
-        <p14:creationId xmlns:p14="http://schemas.microsoft.com/office/powerpoint/2010/main" val="3719319056"/>
+        <p14:creationId xmlns:p14="http://schemas.microsoft.com/office/powerpoint/2010/main" val="2009929909"/>
       </p:ext>
     </p:extLst>
   </p:cSld>
@@ -1000,13 +1325,7 @@
       </p:grpSpPr>
       <p:sp>
         <p:nvSpPr>
-          <p:cNvPr id="2" name="Title 1">
-            <a:extLst>
-              <a:ext uri="{FF2B5EF4-FFF2-40B4-BE49-F238E27FC236}">
-                <a16:creationId xmlns:a16="http://schemas.microsoft.com/office/drawing/2014/main" id="{9E271611-F877-A5AF-D39F-6C1A282C441B}"/>
-              </a:ext>
-            </a:extLst>
-          </p:cNvPr>
+          <p:cNvPr id="2" name="Title 1"/>
           <p:cNvSpPr>
             <a:spLocks noGrp="1"/>
           </p:cNvSpPr>
@@ -1023,19 +1342,13 @@
               <a:rPr lang="en-US"/>
               <a:t>Click to edit Master title style</a:t>
             </a:r>
-            <a:endParaRPr lang="en-GB"/>
-          </a:p>
-        </p:txBody>
-      </p:sp>
-      <p:sp>
-        <p:nvSpPr>
-          <p:cNvPr id="3" name="Vertical Text Placeholder 2">
-            <a:extLst>
-              <a:ext uri="{FF2B5EF4-FFF2-40B4-BE49-F238E27FC236}">
-                <a16:creationId xmlns:a16="http://schemas.microsoft.com/office/drawing/2014/main" id="{EFF8B1DF-715E-300E-561A-D7324F8FBFC3}"/>
-              </a:ext>
-            </a:extLst>
-          </p:cNvPr>
+            <a:endParaRPr lang="en-US" dirty="0"/>
+          </a:p>
+        </p:txBody>
+      </p:sp>
+      <p:sp>
+        <p:nvSpPr>
+          <p:cNvPr id="3" name="Vertical Text Placeholder 2"/>
           <p:cNvSpPr>
             <a:spLocks noGrp="1"/>
           </p:cNvSpPr>
@@ -1081,19 +1394,13 @@
               <a:rPr lang="en-US"/>
               <a:t>Fifth level</a:t>
             </a:r>
-            <a:endParaRPr lang="en-GB"/>
-          </a:p>
-        </p:txBody>
-      </p:sp>
-      <p:sp>
-        <p:nvSpPr>
-          <p:cNvPr id="4" name="Date Placeholder 3">
-            <a:extLst>
-              <a:ext uri="{FF2B5EF4-FFF2-40B4-BE49-F238E27FC236}">
-                <a16:creationId xmlns:a16="http://schemas.microsoft.com/office/drawing/2014/main" id="{8181436E-6914-6933-DAD5-8F2282E74E33}"/>
-              </a:ext>
-            </a:extLst>
-          </p:cNvPr>
+            <a:endParaRPr lang="en-US" dirty="0"/>
+          </a:p>
+        </p:txBody>
+      </p:sp>
+      <p:sp>
+        <p:nvSpPr>
+          <p:cNvPr id="4" name="Date Placeholder 3"/>
           <p:cNvSpPr>
             <a:spLocks noGrp="1"/>
           </p:cNvSpPr>
@@ -1108,7 +1415,7 @@
           <a:p>
             <a:fld id="{7B17242C-12C5-4BCA-8614-627256A12318}" type="datetimeFigureOut">
               <a:rPr lang="en-GB" smtClean="0"/>
-              <a:t>16/04/2025</a:t>
+              <a:t>17/04/2025</a:t>
             </a:fld>
             <a:endParaRPr lang="en-GB"/>
           </a:p>
@@ -1116,13 +1423,7 @@
       </p:sp>
       <p:sp>
         <p:nvSpPr>
-          <p:cNvPr id="5" name="Footer Placeholder 4">
-            <a:extLst>
-              <a:ext uri="{FF2B5EF4-FFF2-40B4-BE49-F238E27FC236}">
-                <a16:creationId xmlns:a16="http://schemas.microsoft.com/office/drawing/2014/main" id="{79697C9D-AB5F-4302-B3F7-1A2C828F50FF}"/>
-              </a:ext>
-            </a:extLst>
-          </p:cNvPr>
+          <p:cNvPr id="5" name="Footer Placeholder 4"/>
           <p:cNvSpPr>
             <a:spLocks noGrp="1"/>
           </p:cNvSpPr>
@@ -1141,13 +1442,7 @@
       </p:sp>
       <p:sp>
         <p:nvSpPr>
-          <p:cNvPr id="6" name="Slide Number Placeholder 5">
-            <a:extLst>
-              <a:ext uri="{FF2B5EF4-FFF2-40B4-BE49-F238E27FC236}">
-                <a16:creationId xmlns:a16="http://schemas.microsoft.com/office/drawing/2014/main" id="{77D51E06-1BC1-AACC-9FB9-61DD96A8B7F6}"/>
-              </a:ext>
-            </a:extLst>
-          </p:cNvPr>
+          <p:cNvPr id="6" name="Slide Number Placeholder 5"/>
           <p:cNvSpPr>
             <a:spLocks noGrp="1"/>
           </p:cNvSpPr>
@@ -1171,7 +1466,7 @@
     </p:spTree>
     <p:extLst>
       <p:ext uri="{BB962C8B-B14F-4D97-AF65-F5344CB8AC3E}">
-        <p14:creationId xmlns:p14="http://schemas.microsoft.com/office/powerpoint/2010/main" val="3679980267"/>
+        <p14:creationId xmlns:p14="http://schemas.microsoft.com/office/powerpoint/2010/main" val="1166586556"/>
       </p:ext>
     </p:extLst>
   </p:cSld>
@@ -1200,13 +1495,7 @@
       </p:grpSpPr>
       <p:sp>
         <p:nvSpPr>
-          <p:cNvPr id="2" name="Vertical Title 1">
-            <a:extLst>
-              <a:ext uri="{FF2B5EF4-FFF2-40B4-BE49-F238E27FC236}">
-                <a16:creationId xmlns:a16="http://schemas.microsoft.com/office/drawing/2014/main" id="{D7AA965E-CB43-640A-F3EC-C7E567FED413}"/>
-              </a:ext>
-            </a:extLst>
-          </p:cNvPr>
+          <p:cNvPr id="2" name="Vertical Title 1"/>
           <p:cNvSpPr>
             <a:spLocks noGrp="1"/>
           </p:cNvSpPr>
@@ -1228,19 +1517,13 @@
               <a:rPr lang="en-US"/>
               <a:t>Click to edit Master title style</a:t>
             </a:r>
-            <a:endParaRPr lang="en-GB"/>
-          </a:p>
-        </p:txBody>
-      </p:sp>
-      <p:sp>
-        <p:nvSpPr>
-          <p:cNvPr id="3" name="Vertical Text Placeholder 2">
-            <a:extLst>
-              <a:ext uri="{FF2B5EF4-FFF2-40B4-BE49-F238E27FC236}">
-                <a16:creationId xmlns:a16="http://schemas.microsoft.com/office/drawing/2014/main" id="{76C2B123-F4E2-B84C-AB8A-E5197A64DD98}"/>
-              </a:ext>
-            </a:extLst>
-          </p:cNvPr>
+            <a:endParaRPr lang="en-US" dirty="0"/>
+          </a:p>
+        </p:txBody>
+      </p:sp>
+      <p:sp>
+        <p:nvSpPr>
+          <p:cNvPr id="3" name="Vertical Text Placeholder 2"/>
           <p:cNvSpPr>
             <a:spLocks noGrp="1"/>
           </p:cNvSpPr>
@@ -1291,19 +1574,13 @@
               <a:rPr lang="en-US"/>
               <a:t>Fifth level</a:t>
             </a:r>
-            <a:endParaRPr lang="en-GB"/>
-          </a:p>
-        </p:txBody>
-      </p:sp>
-      <p:sp>
-        <p:nvSpPr>
-          <p:cNvPr id="4" name="Date Placeholder 3">
-            <a:extLst>
-              <a:ext uri="{FF2B5EF4-FFF2-40B4-BE49-F238E27FC236}">
-                <a16:creationId xmlns:a16="http://schemas.microsoft.com/office/drawing/2014/main" id="{23DD4156-BBB9-A65D-BB3F-B10392AA8344}"/>
-              </a:ext>
-            </a:extLst>
-          </p:cNvPr>
+            <a:endParaRPr lang="en-US" dirty="0"/>
+          </a:p>
+        </p:txBody>
+      </p:sp>
+      <p:sp>
+        <p:nvSpPr>
+          <p:cNvPr id="4" name="Date Placeholder 3"/>
           <p:cNvSpPr>
             <a:spLocks noGrp="1"/>
           </p:cNvSpPr>
@@ -1318,7 +1595,7 @@
           <a:p>
             <a:fld id="{7B17242C-12C5-4BCA-8614-627256A12318}" type="datetimeFigureOut">
               <a:rPr lang="en-GB" smtClean="0"/>
-              <a:t>16/04/2025</a:t>
+              <a:t>17/04/2025</a:t>
             </a:fld>
             <a:endParaRPr lang="en-GB"/>
           </a:p>
@@ -1326,13 +1603,7 @@
       </p:sp>
       <p:sp>
         <p:nvSpPr>
-          <p:cNvPr id="5" name="Footer Placeholder 4">
-            <a:extLst>
-              <a:ext uri="{FF2B5EF4-FFF2-40B4-BE49-F238E27FC236}">
-                <a16:creationId xmlns:a16="http://schemas.microsoft.com/office/drawing/2014/main" id="{A300A20E-7005-FE0B-726D-07B25DA6F1FE}"/>
-              </a:ext>
-            </a:extLst>
-          </p:cNvPr>
+          <p:cNvPr id="5" name="Footer Placeholder 4"/>
           <p:cNvSpPr>
             <a:spLocks noGrp="1"/>
           </p:cNvSpPr>
@@ -1351,13 +1622,7 @@
       </p:sp>
       <p:sp>
         <p:nvSpPr>
-          <p:cNvPr id="6" name="Slide Number Placeholder 5">
-            <a:extLst>
-              <a:ext uri="{FF2B5EF4-FFF2-40B4-BE49-F238E27FC236}">
-                <a16:creationId xmlns:a16="http://schemas.microsoft.com/office/drawing/2014/main" id="{69F2D343-D04D-0099-DD8B-CF76C49BC0E3}"/>
-              </a:ext>
-            </a:extLst>
-          </p:cNvPr>
+          <p:cNvPr id="6" name="Slide Number Placeholder 5"/>
           <p:cNvSpPr>
             <a:spLocks noGrp="1"/>
           </p:cNvSpPr>
@@ -1381,7 +1646,7 @@
     </p:spTree>
     <p:extLst>
       <p:ext uri="{BB962C8B-B14F-4D97-AF65-F5344CB8AC3E}">
-        <p14:creationId xmlns:p14="http://schemas.microsoft.com/office/powerpoint/2010/main" val="1168276670"/>
+        <p14:creationId xmlns:p14="http://schemas.microsoft.com/office/powerpoint/2010/main" val="1157012167"/>
       </p:ext>
     </p:extLst>
   </p:cSld>
@@ -1410,13 +1675,7 @@
       </p:grpSpPr>
       <p:sp>
         <p:nvSpPr>
-          <p:cNvPr id="2" name="Title 1">
-            <a:extLst>
-              <a:ext uri="{FF2B5EF4-FFF2-40B4-BE49-F238E27FC236}">
-                <a16:creationId xmlns:a16="http://schemas.microsoft.com/office/drawing/2014/main" id="{75783F67-0197-D799-759C-9EEED5EAFD8E}"/>
-              </a:ext>
-            </a:extLst>
-          </p:cNvPr>
+          <p:cNvPr id="2" name="Title 1"/>
           <p:cNvSpPr>
             <a:spLocks noGrp="1"/>
           </p:cNvSpPr>
@@ -1433,19 +1692,13 @@
               <a:rPr lang="en-US"/>
               <a:t>Click to edit Master title style</a:t>
             </a:r>
-            <a:endParaRPr lang="en-GB"/>
-          </a:p>
-        </p:txBody>
-      </p:sp>
-      <p:sp>
-        <p:nvSpPr>
-          <p:cNvPr id="3" name="Content Placeholder 2">
-            <a:extLst>
-              <a:ext uri="{FF2B5EF4-FFF2-40B4-BE49-F238E27FC236}">
-                <a16:creationId xmlns:a16="http://schemas.microsoft.com/office/drawing/2014/main" id="{D70D132E-69DF-9018-E2A7-E024561092BF}"/>
-              </a:ext>
-            </a:extLst>
-          </p:cNvPr>
+            <a:endParaRPr lang="en-US" dirty="0"/>
+          </a:p>
+        </p:txBody>
+      </p:sp>
+      <p:sp>
+        <p:nvSpPr>
+          <p:cNvPr id="3" name="Content Placeholder 2"/>
           <p:cNvSpPr>
             <a:spLocks noGrp="1"/>
           </p:cNvSpPr>
@@ -1491,19 +1744,13 @@
               <a:rPr lang="en-US"/>
               <a:t>Fifth level</a:t>
             </a:r>
-            <a:endParaRPr lang="en-GB"/>
-          </a:p>
-        </p:txBody>
-      </p:sp>
-      <p:sp>
-        <p:nvSpPr>
-          <p:cNvPr id="4" name="Date Placeholder 3">
-            <a:extLst>
-              <a:ext uri="{FF2B5EF4-FFF2-40B4-BE49-F238E27FC236}">
-                <a16:creationId xmlns:a16="http://schemas.microsoft.com/office/drawing/2014/main" id="{EDA7B905-08FC-B66D-C097-AB5D157913CD}"/>
-              </a:ext>
-            </a:extLst>
-          </p:cNvPr>
+            <a:endParaRPr lang="en-US" dirty="0"/>
+          </a:p>
+        </p:txBody>
+      </p:sp>
+      <p:sp>
+        <p:nvSpPr>
+          <p:cNvPr id="4" name="Date Placeholder 3"/>
           <p:cNvSpPr>
             <a:spLocks noGrp="1"/>
           </p:cNvSpPr>
@@ -1518,7 +1765,7 @@
           <a:p>
             <a:fld id="{7B17242C-12C5-4BCA-8614-627256A12318}" type="datetimeFigureOut">
               <a:rPr lang="en-GB" smtClean="0"/>
-              <a:t>16/04/2025</a:t>
+              <a:t>17/04/2025</a:t>
             </a:fld>
             <a:endParaRPr lang="en-GB"/>
           </a:p>
@@ -1526,13 +1773,7 @@
       </p:sp>
       <p:sp>
         <p:nvSpPr>
-          <p:cNvPr id="5" name="Footer Placeholder 4">
-            <a:extLst>
-              <a:ext uri="{FF2B5EF4-FFF2-40B4-BE49-F238E27FC236}">
-                <a16:creationId xmlns:a16="http://schemas.microsoft.com/office/drawing/2014/main" id="{E3950C75-C510-971C-D8DC-A18BAB0A1AB9}"/>
-              </a:ext>
-            </a:extLst>
-          </p:cNvPr>
+          <p:cNvPr id="5" name="Footer Placeholder 4"/>
           <p:cNvSpPr>
             <a:spLocks noGrp="1"/>
           </p:cNvSpPr>
@@ -1551,13 +1792,7 @@
       </p:sp>
       <p:sp>
         <p:nvSpPr>
-          <p:cNvPr id="6" name="Slide Number Placeholder 5">
-            <a:extLst>
-              <a:ext uri="{FF2B5EF4-FFF2-40B4-BE49-F238E27FC236}">
-                <a16:creationId xmlns:a16="http://schemas.microsoft.com/office/drawing/2014/main" id="{0D893994-38BA-9ED2-DBC0-F73CFAEDF4A9}"/>
-              </a:ext>
-            </a:extLst>
-          </p:cNvPr>
+          <p:cNvPr id="6" name="Slide Number Placeholder 5"/>
           <p:cNvSpPr>
             <a:spLocks noGrp="1"/>
           </p:cNvSpPr>
@@ -1581,7 +1816,7 @@
     </p:spTree>
     <p:extLst>
       <p:ext uri="{BB962C8B-B14F-4D97-AF65-F5344CB8AC3E}">
-        <p14:creationId xmlns:p14="http://schemas.microsoft.com/office/powerpoint/2010/main" val="2196532090"/>
+        <p14:creationId xmlns:p14="http://schemas.microsoft.com/office/powerpoint/2010/main" val="1020766575"/>
       </p:ext>
     </p:extLst>
   </p:cSld>
@@ -1610,13 +1845,7 @@
       </p:grpSpPr>
       <p:sp>
         <p:nvSpPr>
-          <p:cNvPr id="2" name="Title 1">
-            <a:extLst>
-              <a:ext uri="{FF2B5EF4-FFF2-40B4-BE49-F238E27FC236}">
-                <a16:creationId xmlns:a16="http://schemas.microsoft.com/office/drawing/2014/main" id="{D9D4F533-C006-993E-212A-8FEEB81BF3EB}"/>
-              </a:ext>
-            </a:extLst>
-          </p:cNvPr>
+          <p:cNvPr id="2" name="Title 1"/>
           <p:cNvSpPr>
             <a:spLocks noGrp="1"/>
           </p:cNvSpPr>
@@ -1642,19 +1871,13 @@
               <a:rPr lang="en-US"/>
               <a:t>Click to edit Master title style</a:t>
             </a:r>
-            <a:endParaRPr lang="en-GB"/>
-          </a:p>
-        </p:txBody>
-      </p:sp>
-      <p:sp>
-        <p:nvSpPr>
-          <p:cNvPr id="3" name="Text Placeholder 2">
-            <a:extLst>
-              <a:ext uri="{FF2B5EF4-FFF2-40B4-BE49-F238E27FC236}">
-                <a16:creationId xmlns:a16="http://schemas.microsoft.com/office/drawing/2014/main" id="{CAF16B6A-2254-6855-8FBE-10DD14772BCC}"/>
-              </a:ext>
-            </a:extLst>
-          </p:cNvPr>
+            <a:endParaRPr lang="en-US" dirty="0"/>
+          </a:p>
+        </p:txBody>
+      </p:sp>
+      <p:sp>
+        <p:nvSpPr>
+          <p:cNvPr id="3" name="Text Placeholder 2"/>
           <p:cNvSpPr>
             <a:spLocks noGrp="1"/>
           </p:cNvSpPr>
@@ -1773,13 +1996,7 @@
       </p:sp>
       <p:sp>
         <p:nvSpPr>
-          <p:cNvPr id="4" name="Date Placeholder 3">
-            <a:extLst>
-              <a:ext uri="{FF2B5EF4-FFF2-40B4-BE49-F238E27FC236}">
-                <a16:creationId xmlns:a16="http://schemas.microsoft.com/office/drawing/2014/main" id="{43C0FD81-BD8C-F785-8AE8-D42955B1EB56}"/>
-              </a:ext>
-            </a:extLst>
-          </p:cNvPr>
+          <p:cNvPr id="4" name="Date Placeholder 3"/>
           <p:cNvSpPr>
             <a:spLocks noGrp="1"/>
           </p:cNvSpPr>
@@ -1794,7 +2011,7 @@
           <a:p>
             <a:fld id="{7B17242C-12C5-4BCA-8614-627256A12318}" type="datetimeFigureOut">
               <a:rPr lang="en-GB" smtClean="0"/>
-              <a:t>16/04/2025</a:t>
+              <a:t>17/04/2025</a:t>
             </a:fld>
             <a:endParaRPr lang="en-GB"/>
           </a:p>
@@ -1802,13 +2019,7 @@
       </p:sp>
       <p:sp>
         <p:nvSpPr>
-          <p:cNvPr id="5" name="Footer Placeholder 4">
-            <a:extLst>
-              <a:ext uri="{FF2B5EF4-FFF2-40B4-BE49-F238E27FC236}">
-                <a16:creationId xmlns:a16="http://schemas.microsoft.com/office/drawing/2014/main" id="{4919364B-A687-9E36-4599-87CA6424CC59}"/>
-              </a:ext>
-            </a:extLst>
-          </p:cNvPr>
+          <p:cNvPr id="5" name="Footer Placeholder 4"/>
           <p:cNvSpPr>
             <a:spLocks noGrp="1"/>
           </p:cNvSpPr>
@@ -1827,13 +2038,7 @@
       </p:sp>
       <p:sp>
         <p:nvSpPr>
-          <p:cNvPr id="6" name="Slide Number Placeholder 5">
-            <a:extLst>
-              <a:ext uri="{FF2B5EF4-FFF2-40B4-BE49-F238E27FC236}">
-                <a16:creationId xmlns:a16="http://schemas.microsoft.com/office/drawing/2014/main" id="{48877523-1DD6-58BA-6144-534CD0BE329C}"/>
-              </a:ext>
-            </a:extLst>
-          </p:cNvPr>
+          <p:cNvPr id="6" name="Slide Number Placeholder 5"/>
           <p:cNvSpPr>
             <a:spLocks noGrp="1"/>
           </p:cNvSpPr>
@@ -1857,7 +2062,7 @@
     </p:spTree>
     <p:extLst>
       <p:ext uri="{BB962C8B-B14F-4D97-AF65-F5344CB8AC3E}">
-        <p14:creationId xmlns:p14="http://schemas.microsoft.com/office/powerpoint/2010/main" val="2339958786"/>
+        <p14:creationId xmlns:p14="http://schemas.microsoft.com/office/powerpoint/2010/main" val="3127045562"/>
       </p:ext>
     </p:extLst>
   </p:cSld>
@@ -1886,13 +2091,7 @@
       </p:grpSpPr>
       <p:sp>
         <p:nvSpPr>
-          <p:cNvPr id="2" name="Title 1">
-            <a:extLst>
-              <a:ext uri="{FF2B5EF4-FFF2-40B4-BE49-F238E27FC236}">
-                <a16:creationId xmlns:a16="http://schemas.microsoft.com/office/drawing/2014/main" id="{CB1D4497-146E-D01E-6B5D-3FC954F212FD}"/>
-              </a:ext>
-            </a:extLst>
-          </p:cNvPr>
+          <p:cNvPr id="2" name="Title 1"/>
           <p:cNvSpPr>
             <a:spLocks noGrp="1"/>
           </p:cNvSpPr>
@@ -1909,19 +2108,13 @@
               <a:rPr lang="en-US"/>
               <a:t>Click to edit Master title style</a:t>
             </a:r>
-            <a:endParaRPr lang="en-GB"/>
-          </a:p>
-        </p:txBody>
-      </p:sp>
-      <p:sp>
-        <p:nvSpPr>
-          <p:cNvPr id="3" name="Content Placeholder 2">
-            <a:extLst>
-              <a:ext uri="{FF2B5EF4-FFF2-40B4-BE49-F238E27FC236}">
-                <a16:creationId xmlns:a16="http://schemas.microsoft.com/office/drawing/2014/main" id="{91C3B807-15D6-24AF-D103-455BAFECE8F4}"/>
-              </a:ext>
-            </a:extLst>
-          </p:cNvPr>
+            <a:endParaRPr lang="en-US" dirty="0"/>
+          </a:p>
+        </p:txBody>
+      </p:sp>
+      <p:sp>
+        <p:nvSpPr>
+          <p:cNvPr id="3" name="Content Placeholder 2"/>
           <p:cNvSpPr>
             <a:spLocks noGrp="1"/>
           </p:cNvSpPr>
@@ -1972,19 +2165,13 @@
               <a:rPr lang="en-US"/>
               <a:t>Fifth level</a:t>
             </a:r>
-            <a:endParaRPr lang="en-GB"/>
-          </a:p>
-        </p:txBody>
-      </p:sp>
-      <p:sp>
-        <p:nvSpPr>
-          <p:cNvPr id="4" name="Content Placeholder 3">
-            <a:extLst>
-              <a:ext uri="{FF2B5EF4-FFF2-40B4-BE49-F238E27FC236}">
-                <a16:creationId xmlns:a16="http://schemas.microsoft.com/office/drawing/2014/main" id="{D1605CF1-5C23-DFC0-80E0-9BF4EC678434}"/>
-              </a:ext>
-            </a:extLst>
-          </p:cNvPr>
+            <a:endParaRPr lang="en-US" dirty="0"/>
+          </a:p>
+        </p:txBody>
+      </p:sp>
+      <p:sp>
+        <p:nvSpPr>
+          <p:cNvPr id="4" name="Content Placeholder 3"/>
           <p:cNvSpPr>
             <a:spLocks noGrp="1"/>
           </p:cNvSpPr>
@@ -2035,19 +2222,13 @@
               <a:rPr lang="en-US"/>
               <a:t>Fifth level</a:t>
             </a:r>
-            <a:endParaRPr lang="en-GB"/>
-          </a:p>
-        </p:txBody>
-      </p:sp>
-      <p:sp>
-        <p:nvSpPr>
-          <p:cNvPr id="5" name="Date Placeholder 4">
-            <a:extLst>
-              <a:ext uri="{FF2B5EF4-FFF2-40B4-BE49-F238E27FC236}">
-                <a16:creationId xmlns:a16="http://schemas.microsoft.com/office/drawing/2014/main" id="{840A4D93-B19E-EE29-F310-B286D4E671CE}"/>
-              </a:ext>
-            </a:extLst>
-          </p:cNvPr>
+            <a:endParaRPr lang="en-US" dirty="0"/>
+          </a:p>
+        </p:txBody>
+      </p:sp>
+      <p:sp>
+        <p:nvSpPr>
+          <p:cNvPr id="5" name="Date Placeholder 4"/>
           <p:cNvSpPr>
             <a:spLocks noGrp="1"/>
           </p:cNvSpPr>
@@ -2062,7 +2243,7 @@
           <a:p>
             <a:fld id="{7B17242C-12C5-4BCA-8614-627256A12318}" type="datetimeFigureOut">
               <a:rPr lang="en-GB" smtClean="0"/>
-              <a:t>16/04/2025</a:t>
+              <a:t>17/04/2025</a:t>
             </a:fld>
             <a:endParaRPr lang="en-GB"/>
           </a:p>
@@ -2070,13 +2251,7 @@
       </p:sp>
       <p:sp>
         <p:nvSpPr>
-          <p:cNvPr id="6" name="Footer Placeholder 5">
-            <a:extLst>
-              <a:ext uri="{FF2B5EF4-FFF2-40B4-BE49-F238E27FC236}">
-                <a16:creationId xmlns:a16="http://schemas.microsoft.com/office/drawing/2014/main" id="{7A3DB5AB-B26C-BC2C-753F-29B654F003EF}"/>
-              </a:ext>
-            </a:extLst>
-          </p:cNvPr>
+          <p:cNvPr id="6" name="Footer Placeholder 5"/>
           <p:cNvSpPr>
             <a:spLocks noGrp="1"/>
           </p:cNvSpPr>
@@ -2095,13 +2270,7 @@
       </p:sp>
       <p:sp>
         <p:nvSpPr>
-          <p:cNvPr id="7" name="Slide Number Placeholder 6">
-            <a:extLst>
-              <a:ext uri="{FF2B5EF4-FFF2-40B4-BE49-F238E27FC236}">
-                <a16:creationId xmlns:a16="http://schemas.microsoft.com/office/drawing/2014/main" id="{D13FDDB6-6A9B-9E4F-BEFD-32284CEB102A}"/>
-              </a:ext>
-            </a:extLst>
-          </p:cNvPr>
+          <p:cNvPr id="7" name="Slide Number Placeholder 6"/>
           <p:cNvSpPr>
             <a:spLocks noGrp="1"/>
           </p:cNvSpPr>
@@ -2125,7 +2294,7 @@
     </p:spTree>
     <p:extLst>
       <p:ext uri="{BB962C8B-B14F-4D97-AF65-F5344CB8AC3E}">
-        <p14:creationId xmlns:p14="http://schemas.microsoft.com/office/powerpoint/2010/main" val="1339348728"/>
+        <p14:creationId xmlns:p14="http://schemas.microsoft.com/office/powerpoint/2010/main" val="328558950"/>
       </p:ext>
     </p:extLst>
   </p:cSld>
@@ -2154,13 +2323,7 @@
       </p:grpSpPr>
       <p:sp>
         <p:nvSpPr>
-          <p:cNvPr id="2" name="Title 1">
-            <a:extLst>
-              <a:ext uri="{FF2B5EF4-FFF2-40B4-BE49-F238E27FC236}">
-                <a16:creationId xmlns:a16="http://schemas.microsoft.com/office/drawing/2014/main" id="{5AC97076-5D0A-EAE7-BBD6-E65D07AF0E2B}"/>
-              </a:ext>
-            </a:extLst>
-          </p:cNvPr>
+          <p:cNvPr id="2" name="Title 1"/>
           <p:cNvSpPr>
             <a:spLocks noGrp="1"/>
           </p:cNvSpPr>
@@ -2182,19 +2345,13 @@
               <a:rPr lang="en-US"/>
               <a:t>Click to edit Master title style</a:t>
             </a:r>
-            <a:endParaRPr lang="en-GB"/>
-          </a:p>
-        </p:txBody>
-      </p:sp>
-      <p:sp>
-        <p:nvSpPr>
-          <p:cNvPr id="3" name="Text Placeholder 2">
-            <a:extLst>
-              <a:ext uri="{FF2B5EF4-FFF2-40B4-BE49-F238E27FC236}">
-                <a16:creationId xmlns:a16="http://schemas.microsoft.com/office/drawing/2014/main" id="{04852606-E62F-E7A8-EAAF-A34B8E249D56}"/>
-              </a:ext>
-            </a:extLst>
-          </p:cNvPr>
+            <a:endParaRPr lang="en-US" dirty="0"/>
+          </a:p>
+        </p:txBody>
+      </p:sp>
+      <p:sp>
+        <p:nvSpPr>
+          <p:cNvPr id="3" name="Text Placeholder 2"/>
           <p:cNvSpPr>
             <a:spLocks noGrp="1"/>
           </p:cNvSpPr>
@@ -2259,13 +2416,7 @@
       </p:sp>
       <p:sp>
         <p:nvSpPr>
-          <p:cNvPr id="4" name="Content Placeholder 3">
-            <a:extLst>
-              <a:ext uri="{FF2B5EF4-FFF2-40B4-BE49-F238E27FC236}">
-                <a16:creationId xmlns:a16="http://schemas.microsoft.com/office/drawing/2014/main" id="{BE60B35C-3DD0-3689-2794-B302862A3096}"/>
-              </a:ext>
-            </a:extLst>
-          </p:cNvPr>
+          <p:cNvPr id="4" name="Content Placeholder 3"/>
           <p:cNvSpPr>
             <a:spLocks noGrp="1"/>
           </p:cNvSpPr>
@@ -2316,19 +2467,13 @@
               <a:rPr lang="en-US"/>
               <a:t>Fifth level</a:t>
             </a:r>
-            <a:endParaRPr lang="en-GB"/>
-          </a:p>
-        </p:txBody>
-      </p:sp>
-      <p:sp>
-        <p:nvSpPr>
-          <p:cNvPr id="5" name="Text Placeholder 4">
-            <a:extLst>
-              <a:ext uri="{FF2B5EF4-FFF2-40B4-BE49-F238E27FC236}">
-                <a16:creationId xmlns:a16="http://schemas.microsoft.com/office/drawing/2014/main" id="{C91F5268-A40A-A61E-FC4C-6DC76CCDB73B}"/>
-              </a:ext>
-            </a:extLst>
-          </p:cNvPr>
+            <a:endParaRPr lang="en-US" dirty="0"/>
+          </a:p>
+        </p:txBody>
+      </p:sp>
+      <p:sp>
+        <p:nvSpPr>
+          <p:cNvPr id="5" name="Text Placeholder 4"/>
           <p:cNvSpPr>
             <a:spLocks noGrp="1"/>
           </p:cNvSpPr>
@@ -2393,13 +2538,7 @@
       </p:sp>
       <p:sp>
         <p:nvSpPr>
-          <p:cNvPr id="6" name="Content Placeholder 5">
-            <a:extLst>
-              <a:ext uri="{FF2B5EF4-FFF2-40B4-BE49-F238E27FC236}">
-                <a16:creationId xmlns:a16="http://schemas.microsoft.com/office/drawing/2014/main" id="{721576F7-B6FF-148B-B24E-0E7F21DF7D6A}"/>
-              </a:ext>
-            </a:extLst>
-          </p:cNvPr>
+          <p:cNvPr id="6" name="Content Placeholder 5"/>
           <p:cNvSpPr>
             <a:spLocks noGrp="1"/>
           </p:cNvSpPr>
@@ -2450,19 +2589,13 @@
               <a:rPr lang="en-US"/>
               <a:t>Fifth level</a:t>
             </a:r>
-            <a:endParaRPr lang="en-GB"/>
-          </a:p>
-        </p:txBody>
-      </p:sp>
-      <p:sp>
-        <p:nvSpPr>
-          <p:cNvPr id="7" name="Date Placeholder 6">
-            <a:extLst>
-              <a:ext uri="{FF2B5EF4-FFF2-40B4-BE49-F238E27FC236}">
-                <a16:creationId xmlns:a16="http://schemas.microsoft.com/office/drawing/2014/main" id="{70658704-1A8F-E8E9-5988-947B1B1167FD}"/>
-              </a:ext>
-            </a:extLst>
-          </p:cNvPr>
+            <a:endParaRPr lang="en-US" dirty="0"/>
+          </a:p>
+        </p:txBody>
+      </p:sp>
+      <p:sp>
+        <p:nvSpPr>
+          <p:cNvPr id="7" name="Date Placeholder 6"/>
           <p:cNvSpPr>
             <a:spLocks noGrp="1"/>
           </p:cNvSpPr>
@@ -2477,7 +2610,7 @@
           <a:p>
             <a:fld id="{7B17242C-12C5-4BCA-8614-627256A12318}" type="datetimeFigureOut">
               <a:rPr lang="en-GB" smtClean="0"/>
-              <a:t>16/04/2025</a:t>
+              <a:t>17/04/2025</a:t>
             </a:fld>
             <a:endParaRPr lang="en-GB"/>
           </a:p>
@@ -2485,13 +2618,7 @@
       </p:sp>
       <p:sp>
         <p:nvSpPr>
-          <p:cNvPr id="8" name="Footer Placeholder 7">
-            <a:extLst>
-              <a:ext uri="{FF2B5EF4-FFF2-40B4-BE49-F238E27FC236}">
-                <a16:creationId xmlns:a16="http://schemas.microsoft.com/office/drawing/2014/main" id="{84445EDF-A0BD-856A-22C4-CBC4D976738B}"/>
-              </a:ext>
-            </a:extLst>
-          </p:cNvPr>
+          <p:cNvPr id="8" name="Footer Placeholder 7"/>
           <p:cNvSpPr>
             <a:spLocks noGrp="1"/>
           </p:cNvSpPr>
@@ -2510,13 +2637,7 @@
       </p:sp>
       <p:sp>
         <p:nvSpPr>
-          <p:cNvPr id="9" name="Slide Number Placeholder 8">
-            <a:extLst>
-              <a:ext uri="{FF2B5EF4-FFF2-40B4-BE49-F238E27FC236}">
-                <a16:creationId xmlns:a16="http://schemas.microsoft.com/office/drawing/2014/main" id="{02E28032-878C-181D-CD8B-E0969CDA355B}"/>
-              </a:ext>
-            </a:extLst>
-          </p:cNvPr>
+          <p:cNvPr id="9" name="Slide Number Placeholder 8"/>
           <p:cNvSpPr>
             <a:spLocks noGrp="1"/>
           </p:cNvSpPr>
@@ -2540,7 +2661,7 @@
     </p:spTree>
     <p:extLst>
       <p:ext uri="{BB962C8B-B14F-4D97-AF65-F5344CB8AC3E}">
-        <p14:creationId xmlns:p14="http://schemas.microsoft.com/office/powerpoint/2010/main" val="2264433333"/>
+        <p14:creationId xmlns:p14="http://schemas.microsoft.com/office/powerpoint/2010/main" val="2676333409"/>
       </p:ext>
     </p:extLst>
   </p:cSld>
@@ -2569,13 +2690,7 @@
       </p:grpSpPr>
       <p:sp>
         <p:nvSpPr>
-          <p:cNvPr id="2" name="Title 1">
-            <a:extLst>
-              <a:ext uri="{FF2B5EF4-FFF2-40B4-BE49-F238E27FC236}">
-                <a16:creationId xmlns:a16="http://schemas.microsoft.com/office/drawing/2014/main" id="{4A887709-BDDD-CBBA-4007-03216EDA04EF}"/>
-              </a:ext>
-            </a:extLst>
-          </p:cNvPr>
+          <p:cNvPr id="2" name="Title 1"/>
           <p:cNvSpPr>
             <a:spLocks noGrp="1"/>
           </p:cNvSpPr>
@@ -2592,19 +2707,13 @@
               <a:rPr lang="en-US"/>
               <a:t>Click to edit Master title style</a:t>
             </a:r>
-            <a:endParaRPr lang="en-GB"/>
-          </a:p>
-        </p:txBody>
-      </p:sp>
-      <p:sp>
-        <p:nvSpPr>
-          <p:cNvPr id="3" name="Date Placeholder 2">
-            <a:extLst>
-              <a:ext uri="{FF2B5EF4-FFF2-40B4-BE49-F238E27FC236}">
-                <a16:creationId xmlns:a16="http://schemas.microsoft.com/office/drawing/2014/main" id="{A661D14A-016E-5E28-E575-66AC6DFAAA18}"/>
-              </a:ext>
-            </a:extLst>
-          </p:cNvPr>
+            <a:endParaRPr lang="en-US" dirty="0"/>
+          </a:p>
+        </p:txBody>
+      </p:sp>
+      <p:sp>
+        <p:nvSpPr>
+          <p:cNvPr id="3" name="Date Placeholder 2"/>
           <p:cNvSpPr>
             <a:spLocks noGrp="1"/>
           </p:cNvSpPr>
@@ -2619,7 +2728,7 @@
           <a:p>
             <a:fld id="{7B17242C-12C5-4BCA-8614-627256A12318}" type="datetimeFigureOut">
               <a:rPr lang="en-GB" smtClean="0"/>
-              <a:t>16/04/2025</a:t>
+              <a:t>17/04/2025</a:t>
             </a:fld>
             <a:endParaRPr lang="en-GB"/>
           </a:p>
@@ -2627,13 +2736,7 @@
       </p:sp>
       <p:sp>
         <p:nvSpPr>
-          <p:cNvPr id="4" name="Footer Placeholder 3">
-            <a:extLst>
-              <a:ext uri="{FF2B5EF4-FFF2-40B4-BE49-F238E27FC236}">
-                <a16:creationId xmlns:a16="http://schemas.microsoft.com/office/drawing/2014/main" id="{9FD4908A-EED1-0DE7-781D-6F45ADC983B2}"/>
-              </a:ext>
-            </a:extLst>
-          </p:cNvPr>
+          <p:cNvPr id="4" name="Footer Placeholder 3"/>
           <p:cNvSpPr>
             <a:spLocks noGrp="1"/>
           </p:cNvSpPr>
@@ -2652,13 +2755,7 @@
       </p:sp>
       <p:sp>
         <p:nvSpPr>
-          <p:cNvPr id="5" name="Slide Number Placeholder 4">
-            <a:extLst>
-              <a:ext uri="{FF2B5EF4-FFF2-40B4-BE49-F238E27FC236}">
-                <a16:creationId xmlns:a16="http://schemas.microsoft.com/office/drawing/2014/main" id="{831F0667-5A8C-3018-6E43-E935EB66E78E}"/>
-              </a:ext>
-            </a:extLst>
-          </p:cNvPr>
+          <p:cNvPr id="5" name="Slide Number Placeholder 4"/>
           <p:cNvSpPr>
             <a:spLocks noGrp="1"/>
           </p:cNvSpPr>
@@ -2682,7 +2779,7 @@
     </p:spTree>
     <p:extLst>
       <p:ext uri="{BB962C8B-B14F-4D97-AF65-F5344CB8AC3E}">
-        <p14:creationId xmlns:p14="http://schemas.microsoft.com/office/powerpoint/2010/main" val="505833567"/>
+        <p14:creationId xmlns:p14="http://schemas.microsoft.com/office/powerpoint/2010/main" val="3043098614"/>
       </p:ext>
     </p:extLst>
   </p:cSld>
@@ -2711,13 +2808,7 @@
       </p:grpSpPr>
       <p:sp>
         <p:nvSpPr>
-          <p:cNvPr id="2" name="Date Placeholder 1">
-            <a:extLst>
-              <a:ext uri="{FF2B5EF4-FFF2-40B4-BE49-F238E27FC236}">
-                <a16:creationId xmlns:a16="http://schemas.microsoft.com/office/drawing/2014/main" id="{7804CA95-E029-42DC-2C6B-A6526F62B09B}"/>
-              </a:ext>
-            </a:extLst>
-          </p:cNvPr>
+          <p:cNvPr id="2" name="Date Placeholder 1"/>
           <p:cNvSpPr>
             <a:spLocks noGrp="1"/>
           </p:cNvSpPr>
@@ -2732,7 +2823,7 @@
           <a:p>
             <a:fld id="{7B17242C-12C5-4BCA-8614-627256A12318}" type="datetimeFigureOut">
               <a:rPr lang="en-GB" smtClean="0"/>
-              <a:t>16/04/2025</a:t>
+              <a:t>17/04/2025</a:t>
             </a:fld>
             <a:endParaRPr lang="en-GB"/>
           </a:p>
@@ -2740,13 +2831,7 @@
       </p:sp>
       <p:sp>
         <p:nvSpPr>
-          <p:cNvPr id="3" name="Footer Placeholder 2">
-            <a:extLst>
-              <a:ext uri="{FF2B5EF4-FFF2-40B4-BE49-F238E27FC236}">
-                <a16:creationId xmlns:a16="http://schemas.microsoft.com/office/drawing/2014/main" id="{D09D7AE8-AAD9-669A-BB51-F36314118A5E}"/>
-              </a:ext>
-            </a:extLst>
-          </p:cNvPr>
+          <p:cNvPr id="3" name="Footer Placeholder 2"/>
           <p:cNvSpPr>
             <a:spLocks noGrp="1"/>
           </p:cNvSpPr>
@@ -2765,13 +2850,7 @@
       </p:sp>
       <p:sp>
         <p:nvSpPr>
-          <p:cNvPr id="4" name="Slide Number Placeholder 3">
-            <a:extLst>
-              <a:ext uri="{FF2B5EF4-FFF2-40B4-BE49-F238E27FC236}">
-                <a16:creationId xmlns:a16="http://schemas.microsoft.com/office/drawing/2014/main" id="{1A9B75E3-87CD-6D1A-09B2-869208CA1744}"/>
-              </a:ext>
-            </a:extLst>
-          </p:cNvPr>
+          <p:cNvPr id="4" name="Slide Number Placeholder 3"/>
           <p:cNvSpPr>
             <a:spLocks noGrp="1"/>
           </p:cNvSpPr>
@@ -2795,7 +2874,7 @@
     </p:spTree>
     <p:extLst>
       <p:ext uri="{BB962C8B-B14F-4D97-AF65-F5344CB8AC3E}">
-        <p14:creationId xmlns:p14="http://schemas.microsoft.com/office/powerpoint/2010/main" val="2498326375"/>
+        <p14:creationId xmlns:p14="http://schemas.microsoft.com/office/powerpoint/2010/main" val="3962960023"/>
       </p:ext>
     </p:extLst>
   </p:cSld>
@@ -2824,13 +2903,7 @@
       </p:grpSpPr>
       <p:sp>
         <p:nvSpPr>
-          <p:cNvPr id="2" name="Title 1">
-            <a:extLst>
-              <a:ext uri="{FF2B5EF4-FFF2-40B4-BE49-F238E27FC236}">
-                <a16:creationId xmlns:a16="http://schemas.microsoft.com/office/drawing/2014/main" id="{612FEEE0-3940-8F7C-C2BF-FB4D4976C672}"/>
-              </a:ext>
-            </a:extLst>
-          </p:cNvPr>
+          <p:cNvPr id="2" name="Title 1"/>
           <p:cNvSpPr>
             <a:spLocks noGrp="1"/>
           </p:cNvSpPr>
@@ -2856,19 +2929,13 @@
               <a:rPr lang="en-US"/>
               <a:t>Click to edit Master title style</a:t>
             </a:r>
-            <a:endParaRPr lang="en-GB"/>
-          </a:p>
-        </p:txBody>
-      </p:sp>
-      <p:sp>
-        <p:nvSpPr>
-          <p:cNvPr id="3" name="Content Placeholder 2">
-            <a:extLst>
-              <a:ext uri="{FF2B5EF4-FFF2-40B4-BE49-F238E27FC236}">
-                <a16:creationId xmlns:a16="http://schemas.microsoft.com/office/drawing/2014/main" id="{2A400954-9D8D-0AC3-B67B-F1FD248201E9}"/>
-              </a:ext>
-            </a:extLst>
-          </p:cNvPr>
+            <a:endParaRPr lang="en-US" dirty="0"/>
+          </a:p>
+        </p:txBody>
+      </p:sp>
+      <p:sp>
+        <p:nvSpPr>
+          <p:cNvPr id="3" name="Content Placeholder 2"/>
           <p:cNvSpPr>
             <a:spLocks noGrp="1"/>
           </p:cNvSpPr>
@@ -2947,19 +3014,13 @@
               <a:rPr lang="en-US"/>
               <a:t>Fifth level</a:t>
             </a:r>
-            <a:endParaRPr lang="en-GB"/>
-          </a:p>
-        </p:txBody>
-      </p:sp>
-      <p:sp>
-        <p:nvSpPr>
-          <p:cNvPr id="4" name="Text Placeholder 3">
-            <a:extLst>
-              <a:ext uri="{FF2B5EF4-FFF2-40B4-BE49-F238E27FC236}">
-                <a16:creationId xmlns:a16="http://schemas.microsoft.com/office/drawing/2014/main" id="{E4083FAF-AF8D-3540-6E14-B5F83E3692F6}"/>
-              </a:ext>
-            </a:extLst>
-          </p:cNvPr>
+            <a:endParaRPr lang="en-US" dirty="0"/>
+          </a:p>
+        </p:txBody>
+      </p:sp>
+      <p:sp>
+        <p:nvSpPr>
+          <p:cNvPr id="4" name="Text Placeholder 3"/>
           <p:cNvSpPr>
             <a:spLocks noGrp="1"/>
           </p:cNvSpPr>
@@ -3024,13 +3085,7 @@
       </p:sp>
       <p:sp>
         <p:nvSpPr>
-          <p:cNvPr id="5" name="Date Placeholder 4">
-            <a:extLst>
-              <a:ext uri="{FF2B5EF4-FFF2-40B4-BE49-F238E27FC236}">
-                <a16:creationId xmlns:a16="http://schemas.microsoft.com/office/drawing/2014/main" id="{DB0388CA-624B-77F4-43AB-4392EC9F6A32}"/>
-              </a:ext>
-            </a:extLst>
-          </p:cNvPr>
+          <p:cNvPr id="5" name="Date Placeholder 4"/>
           <p:cNvSpPr>
             <a:spLocks noGrp="1"/>
           </p:cNvSpPr>
@@ -3045,7 +3100,7 @@
           <a:p>
             <a:fld id="{7B17242C-12C5-4BCA-8614-627256A12318}" type="datetimeFigureOut">
               <a:rPr lang="en-GB" smtClean="0"/>
-              <a:t>16/04/2025</a:t>
+              <a:t>17/04/2025</a:t>
             </a:fld>
             <a:endParaRPr lang="en-GB"/>
           </a:p>
@@ -3053,13 +3108,7 @@
       </p:sp>
       <p:sp>
         <p:nvSpPr>
-          <p:cNvPr id="6" name="Footer Placeholder 5">
-            <a:extLst>
-              <a:ext uri="{FF2B5EF4-FFF2-40B4-BE49-F238E27FC236}">
-                <a16:creationId xmlns:a16="http://schemas.microsoft.com/office/drawing/2014/main" id="{A151A156-97B2-8D06-C8C7-6BE64C0A4DDA}"/>
-              </a:ext>
-            </a:extLst>
-          </p:cNvPr>
+          <p:cNvPr id="6" name="Footer Placeholder 5"/>
           <p:cNvSpPr>
             <a:spLocks noGrp="1"/>
           </p:cNvSpPr>
@@ -3078,13 +3127,7 @@
       </p:sp>
       <p:sp>
         <p:nvSpPr>
-          <p:cNvPr id="7" name="Slide Number Placeholder 6">
-            <a:extLst>
-              <a:ext uri="{FF2B5EF4-FFF2-40B4-BE49-F238E27FC236}">
-                <a16:creationId xmlns:a16="http://schemas.microsoft.com/office/drawing/2014/main" id="{AD83A64E-BEAC-CD3B-7CFF-B5D7BC31FB92}"/>
-              </a:ext>
-            </a:extLst>
-          </p:cNvPr>
+          <p:cNvPr id="7" name="Slide Number Placeholder 6"/>
           <p:cNvSpPr>
             <a:spLocks noGrp="1"/>
           </p:cNvSpPr>
@@ -3108,7 +3151,7 @@
     </p:spTree>
     <p:extLst>
       <p:ext uri="{BB962C8B-B14F-4D97-AF65-F5344CB8AC3E}">
-        <p14:creationId xmlns:p14="http://schemas.microsoft.com/office/powerpoint/2010/main" val="2488976416"/>
+        <p14:creationId xmlns:p14="http://schemas.microsoft.com/office/powerpoint/2010/main" val="1932372189"/>
       </p:ext>
     </p:extLst>
   </p:cSld>
@@ -3137,13 +3180,7 @@
       </p:grpSpPr>
       <p:sp>
         <p:nvSpPr>
-          <p:cNvPr id="2" name="Title 1">
-            <a:extLst>
-              <a:ext uri="{FF2B5EF4-FFF2-40B4-BE49-F238E27FC236}">
-                <a16:creationId xmlns:a16="http://schemas.microsoft.com/office/drawing/2014/main" id="{3A7A0BD1-28EB-A705-7C3A-48F3C3C93A62}"/>
-              </a:ext>
-            </a:extLst>
-          </p:cNvPr>
+          <p:cNvPr id="2" name="Title 1"/>
           <p:cNvSpPr>
             <a:spLocks noGrp="1"/>
           </p:cNvSpPr>
@@ -3169,21 +3206,15 @@
               <a:rPr lang="en-US"/>
               <a:t>Click to edit Master title style</a:t>
             </a:r>
-            <a:endParaRPr lang="en-GB"/>
-          </a:p>
-        </p:txBody>
-      </p:sp>
-      <p:sp>
-        <p:nvSpPr>
-          <p:cNvPr id="3" name="Picture Placeholder 2">
-            <a:extLst>
-              <a:ext uri="{FF2B5EF4-FFF2-40B4-BE49-F238E27FC236}">
-                <a16:creationId xmlns:a16="http://schemas.microsoft.com/office/drawing/2014/main" id="{6E7EBC1B-5B4C-62F6-06D0-84EBA8BF5C20}"/>
-              </a:ext>
-            </a:extLst>
-          </p:cNvPr>
-          <p:cNvSpPr>
-            <a:spLocks noGrp="1"/>
+            <a:endParaRPr lang="en-US" dirty="0"/>
+          </a:p>
+        </p:txBody>
+      </p:sp>
+      <p:sp>
+        <p:nvSpPr>
+          <p:cNvPr id="3" name="Picture Placeholder 2"/>
+          <p:cNvSpPr>
+            <a:spLocks noGrp="1" noChangeAspect="1"/>
           </p:cNvSpPr>
           <p:nvPr>
             <p:ph type="pic" idx="1"/>
@@ -3196,7 +3227,7 @@
           </a:xfrm>
         </p:spPr>
         <p:txBody>
-          <a:bodyPr/>
+          <a:bodyPr anchor="t"/>
           <a:lstStyle>
             <a:lvl1pPr marL="0" indent="0">
               <a:buNone/>
@@ -3236,19 +3267,17 @@
             </a:lvl9pPr>
           </a:lstStyle>
           <a:p>
-            <a:endParaRPr lang="en-GB"/>
-          </a:p>
-        </p:txBody>
-      </p:sp>
-      <p:sp>
-        <p:nvSpPr>
-          <p:cNvPr id="4" name="Text Placeholder 3">
-            <a:extLst>
-              <a:ext uri="{FF2B5EF4-FFF2-40B4-BE49-F238E27FC236}">
-                <a16:creationId xmlns:a16="http://schemas.microsoft.com/office/drawing/2014/main" id="{52795053-4223-2877-6193-F4A411C9D15F}"/>
-              </a:ext>
-            </a:extLst>
-          </p:cNvPr>
+            <a:r>
+              <a:rPr lang="en-US"/>
+              <a:t>Click icon to add picture</a:t>
+            </a:r>
+            <a:endParaRPr lang="en-US" dirty="0"/>
+          </a:p>
+        </p:txBody>
+      </p:sp>
+      <p:sp>
+        <p:nvSpPr>
+          <p:cNvPr id="4" name="Text Placeholder 3"/>
           <p:cNvSpPr>
             <a:spLocks noGrp="1"/>
           </p:cNvSpPr>
@@ -3313,13 +3342,7 @@
       </p:sp>
       <p:sp>
         <p:nvSpPr>
-          <p:cNvPr id="5" name="Date Placeholder 4">
-            <a:extLst>
-              <a:ext uri="{FF2B5EF4-FFF2-40B4-BE49-F238E27FC236}">
-                <a16:creationId xmlns:a16="http://schemas.microsoft.com/office/drawing/2014/main" id="{AD796224-6989-2C2D-7B32-17111CEC6B02}"/>
-              </a:ext>
-            </a:extLst>
-          </p:cNvPr>
+          <p:cNvPr id="5" name="Date Placeholder 4"/>
           <p:cNvSpPr>
             <a:spLocks noGrp="1"/>
           </p:cNvSpPr>
@@ -3334,7 +3357,7 @@
           <a:p>
             <a:fld id="{7B17242C-12C5-4BCA-8614-627256A12318}" type="datetimeFigureOut">
               <a:rPr lang="en-GB" smtClean="0"/>
-              <a:t>16/04/2025</a:t>
+              <a:t>17/04/2025</a:t>
             </a:fld>
             <a:endParaRPr lang="en-GB"/>
           </a:p>
@@ -3342,13 +3365,7 @@
       </p:sp>
       <p:sp>
         <p:nvSpPr>
-          <p:cNvPr id="6" name="Footer Placeholder 5">
-            <a:extLst>
-              <a:ext uri="{FF2B5EF4-FFF2-40B4-BE49-F238E27FC236}">
-                <a16:creationId xmlns:a16="http://schemas.microsoft.com/office/drawing/2014/main" id="{7508CBE9-27B4-9449-3CB2-F5E4AAFB9BF3}"/>
-              </a:ext>
-            </a:extLst>
-          </p:cNvPr>
+          <p:cNvPr id="6" name="Footer Placeholder 5"/>
           <p:cNvSpPr>
             <a:spLocks noGrp="1"/>
           </p:cNvSpPr>
@@ -3367,13 +3384,7 @@
       </p:sp>
       <p:sp>
         <p:nvSpPr>
-          <p:cNvPr id="7" name="Slide Number Placeholder 6">
-            <a:extLst>
-              <a:ext uri="{FF2B5EF4-FFF2-40B4-BE49-F238E27FC236}">
-                <a16:creationId xmlns:a16="http://schemas.microsoft.com/office/drawing/2014/main" id="{B2DA092C-564C-BEE1-1853-76D1F20C5CDE}"/>
-              </a:ext>
-            </a:extLst>
-          </p:cNvPr>
+          <p:cNvPr id="7" name="Slide Number Placeholder 6"/>
           <p:cNvSpPr>
             <a:spLocks noGrp="1"/>
           </p:cNvSpPr>
@@ -3397,7 +3408,7 @@
     </p:spTree>
     <p:extLst>
       <p:ext uri="{BB962C8B-B14F-4D97-AF65-F5344CB8AC3E}">
-        <p14:creationId xmlns:p14="http://schemas.microsoft.com/office/powerpoint/2010/main" val="3737469128"/>
+        <p14:creationId xmlns:p14="http://schemas.microsoft.com/office/powerpoint/2010/main" val="3474616686"/>
       </p:ext>
     </p:extLst>
   </p:cSld>
@@ -3431,13 +3442,7 @@
       </p:grpSpPr>
       <p:sp>
         <p:nvSpPr>
-          <p:cNvPr id="2" name="Title Placeholder 1">
-            <a:extLst>
-              <a:ext uri="{FF2B5EF4-FFF2-40B4-BE49-F238E27FC236}">
-                <a16:creationId xmlns:a16="http://schemas.microsoft.com/office/drawing/2014/main" id="{BC8FCCE2-10BF-9E69-4509-682156AED0B0}"/>
-              </a:ext>
-            </a:extLst>
-          </p:cNvPr>
+          <p:cNvPr id="2" name="Title Placeholder 1"/>
           <p:cNvSpPr>
             <a:spLocks noGrp="1"/>
           </p:cNvSpPr>
@@ -3464,19 +3469,13 @@
               <a:rPr lang="en-US"/>
               <a:t>Click to edit Master title style</a:t>
             </a:r>
-            <a:endParaRPr lang="en-GB"/>
-          </a:p>
-        </p:txBody>
-      </p:sp>
-      <p:sp>
-        <p:nvSpPr>
-          <p:cNvPr id="3" name="Text Placeholder 2">
-            <a:extLst>
-              <a:ext uri="{FF2B5EF4-FFF2-40B4-BE49-F238E27FC236}">
-                <a16:creationId xmlns:a16="http://schemas.microsoft.com/office/drawing/2014/main" id="{7F2738DB-4DCD-3E5C-32BB-CE7E20170491}"/>
-              </a:ext>
-            </a:extLst>
-          </p:cNvPr>
+            <a:endParaRPr lang="en-US" dirty="0"/>
+          </a:p>
+        </p:txBody>
+      </p:sp>
+      <p:sp>
+        <p:nvSpPr>
+          <p:cNvPr id="3" name="Text Placeholder 2"/>
           <p:cNvSpPr>
             <a:spLocks noGrp="1"/>
           </p:cNvSpPr>
@@ -3532,19 +3531,13 @@
               <a:rPr lang="en-US"/>
               <a:t>Fifth level</a:t>
             </a:r>
-            <a:endParaRPr lang="en-GB"/>
-          </a:p>
-        </p:txBody>
-      </p:sp>
-      <p:sp>
-        <p:nvSpPr>
-          <p:cNvPr id="4" name="Date Placeholder 3">
-            <a:extLst>
-              <a:ext uri="{FF2B5EF4-FFF2-40B4-BE49-F238E27FC236}">
-                <a16:creationId xmlns:a16="http://schemas.microsoft.com/office/drawing/2014/main" id="{1B2ED758-B89E-7C98-D7D5-DBF9FDC69A34}"/>
-              </a:ext>
-            </a:extLst>
-          </p:cNvPr>
+            <a:endParaRPr lang="en-US" dirty="0"/>
+          </a:p>
+        </p:txBody>
+      </p:sp>
+      <p:sp>
+        <p:nvSpPr>
+          <p:cNvPr id="4" name="Date Placeholder 3"/>
           <p:cNvSpPr>
             <a:spLocks noGrp="1"/>
           </p:cNvSpPr>
@@ -3577,7 +3570,7 @@
           <a:p>
             <a:fld id="{7B17242C-12C5-4BCA-8614-627256A12318}" type="datetimeFigureOut">
               <a:rPr lang="en-GB" smtClean="0"/>
-              <a:t>16/04/2025</a:t>
+              <a:t>17/04/2025</a:t>
             </a:fld>
             <a:endParaRPr lang="en-GB"/>
           </a:p>
@@ -3585,13 +3578,7 @@
       </p:sp>
       <p:sp>
         <p:nvSpPr>
-          <p:cNvPr id="5" name="Footer Placeholder 4">
-            <a:extLst>
-              <a:ext uri="{FF2B5EF4-FFF2-40B4-BE49-F238E27FC236}">
-                <a16:creationId xmlns:a16="http://schemas.microsoft.com/office/drawing/2014/main" id="{179C2C45-517A-4249-DAD4-E916ECAF85B7}"/>
-              </a:ext>
-            </a:extLst>
-          </p:cNvPr>
+          <p:cNvPr id="5" name="Footer Placeholder 4"/>
           <p:cNvSpPr>
             <a:spLocks noGrp="1"/>
           </p:cNvSpPr>
@@ -3628,13 +3615,7 @@
       </p:sp>
       <p:sp>
         <p:nvSpPr>
-          <p:cNvPr id="6" name="Slide Number Placeholder 5">
-            <a:extLst>
-              <a:ext uri="{FF2B5EF4-FFF2-40B4-BE49-F238E27FC236}">
-                <a16:creationId xmlns:a16="http://schemas.microsoft.com/office/drawing/2014/main" id="{FB4B034F-72BA-AC46-DFF3-4F23DBA30ED2}"/>
-              </a:ext>
-            </a:extLst>
-          </p:cNvPr>
+          <p:cNvPr id="6" name="Slide Number Placeholder 5"/>
           <p:cNvSpPr>
             <a:spLocks noGrp="1"/>
           </p:cNvSpPr>
@@ -3676,23 +3657,23 @@
     </p:spTree>
     <p:extLst>
       <p:ext uri="{BB962C8B-B14F-4D97-AF65-F5344CB8AC3E}">
-        <p14:creationId xmlns:p14="http://schemas.microsoft.com/office/powerpoint/2010/main" val="2458080398"/>
+        <p14:creationId xmlns:p14="http://schemas.microsoft.com/office/powerpoint/2010/main" val="743632344"/>
       </p:ext>
     </p:extLst>
   </p:cSld>
   <p:clrMap bg1="lt1" tx1="dk1" bg2="lt2" tx2="dk2" accent1="accent1" accent2="accent2" accent3="accent3" accent4="accent4" accent5="accent5" accent6="accent6" hlink="hlink" folHlink="folHlink"/>
   <p:sldLayoutIdLst>
-    <p:sldLayoutId id="2147483649" r:id="rId1"/>
-    <p:sldLayoutId id="2147483650" r:id="rId2"/>
-    <p:sldLayoutId id="2147483651" r:id="rId3"/>
-    <p:sldLayoutId id="2147483652" r:id="rId4"/>
-    <p:sldLayoutId id="2147483653" r:id="rId5"/>
-    <p:sldLayoutId id="2147483654" r:id="rId6"/>
-    <p:sldLayoutId id="2147483655" r:id="rId7"/>
-    <p:sldLayoutId id="2147483656" r:id="rId8"/>
-    <p:sldLayoutId id="2147483657" r:id="rId9"/>
-    <p:sldLayoutId id="2147483658" r:id="rId10"/>
-    <p:sldLayoutId id="2147483659" r:id="rId11"/>
+    <p:sldLayoutId id="2147483673" r:id="rId1"/>
+    <p:sldLayoutId id="2147483674" r:id="rId2"/>
+    <p:sldLayoutId id="2147483675" r:id="rId3"/>
+    <p:sldLayoutId id="2147483676" r:id="rId4"/>
+    <p:sldLayoutId id="2147483677" r:id="rId5"/>
+    <p:sldLayoutId id="2147483678" r:id="rId6"/>
+    <p:sldLayoutId id="2147483679" r:id="rId7"/>
+    <p:sldLayoutId id="2147483680" r:id="rId8"/>
+    <p:sldLayoutId id="2147483681" r:id="rId9"/>
+    <p:sldLayoutId id="2147483682" r:id="rId10"/>
+    <p:sldLayoutId id="2147483683" r:id="rId11"/>
   </p:sldLayoutIdLst>
   <p:txStyles>
     <p:titleStyle>
@@ -4022,7 +4003,7 @@
         </p:blipFill>
         <p:spPr>
           <a:xfrm>
-            <a:off x="1716509" y="0"/>
+            <a:off x="1716511" y="0"/>
             <a:ext cx="8214201" cy="5100320"/>
           </a:xfrm>
           <a:prstGeom prst="rect">
@@ -4044,8 +4025,8 @@
         </p:nvSpPr>
         <p:spPr>
           <a:xfrm>
-            <a:off x="1046480" y="5380218"/>
-            <a:ext cx="10322560" cy="990271"/>
+            <a:off x="1143000" y="5380220"/>
+            <a:ext cx="9906000" cy="990271"/>
           </a:xfrm>
           <a:prstGeom prst="rect">
             <a:avLst/>
@@ -4068,7 +4049,6 @@
             </a:pPr>
             <a:r>
               <a:rPr lang="en-GB" sz="1100" b="1" kern="100" dirty="0">
-                <a:effectLst/>
                 <a:latin typeface="Arial" panose="020B0604020202020204" pitchFamily="34" charset="0"/>
                 <a:ea typeface="Aptos" panose="020B0004020202020204" pitchFamily="34" charset="0"/>
                 <a:cs typeface="Arial" panose="020B0604020202020204" pitchFamily="34" charset="0"/>
@@ -4077,7 +4057,6 @@
             </a:r>
             <a:r>
               <a:rPr lang="en-GB" sz="1100" kern="100" dirty="0">
-                <a:effectLst/>
                 <a:latin typeface="Arial" panose="020B0604020202020204" pitchFamily="34" charset="0"/>
                 <a:ea typeface="Aptos" panose="020B0004020202020204" pitchFamily="34" charset="0"/>
                 <a:cs typeface="Arial" panose="020B0604020202020204" pitchFamily="34" charset="0"/>
@@ -4086,7 +4065,6 @@
             </a:r>
             <a:r>
               <a:rPr lang="en-GB" sz="1100" b="1" kern="100" dirty="0">
-                <a:effectLst/>
                 <a:latin typeface="Arial" panose="020B0604020202020204" pitchFamily="34" charset="0"/>
                 <a:ea typeface="Aptos" panose="020B0004020202020204" pitchFamily="34" charset="0"/>
                 <a:cs typeface="Arial" panose="020B0604020202020204" pitchFamily="34" charset="0"/>
@@ -4095,12 +4073,19 @@
             </a:r>
             <a:r>
               <a:rPr lang="en-GB" sz="1100" kern="100" dirty="0">
-                <a:effectLst/>
                 <a:latin typeface="Arial" panose="020B0604020202020204" pitchFamily="34" charset="0"/>
                 <a:ea typeface="Aptos" panose="020B0004020202020204" pitchFamily="34" charset="0"/>
                 <a:cs typeface="Arial" panose="020B0604020202020204" pitchFamily="34" charset="0"/>
               </a:rPr>
-              <a:t> The overall the number of sequences per day from years 2020 – 2024. The coloured zones represent the emergence of a new strain of SARS-CoV-2. Yellow – beta, red – alpha, purple – delta, pink – gamma, green - omicron. Also on the plot are specific dates showing the first use of that vaccine. A generalised </a:t>
+              <a:t> The overall the number of sequences per day from years 2020 – 2024. The coloured zones represent the emergence of a new strain of SARS-CoV-2. Yellow – beta, red – alpha, purple – delta, pink – gamma, green - omicron. Also on the plot are specific dates showing the first use of that vaccine. A generalised additive model has been used to show the relationship between sample date and the number of sequences per day. </a:t>
+            </a:r>
+            <a:r>
+              <a:rPr lang="en-GB" sz="1100" b="1" kern="100" dirty="0">
+                <a:latin typeface="Arial" panose="020B0604020202020204" pitchFamily="34" charset="0"/>
+                <a:ea typeface="Aptos" panose="020B0004020202020204" pitchFamily="34" charset="0"/>
+                <a:cs typeface="Arial" panose="020B0604020202020204" pitchFamily="34" charset="0"/>
+              </a:rPr>
+              <a:t>B</a:t>
             </a:r>
             <a:r>
               <a:rPr lang="en-GB" sz="1100" kern="100" dirty="0">
@@ -4108,38 +4093,10 @@
                 <a:ea typeface="Aptos" panose="020B0004020202020204" pitchFamily="34" charset="0"/>
                 <a:cs typeface="Arial" panose="020B0604020202020204" pitchFamily="34" charset="0"/>
               </a:rPr>
-              <a:t>additive</a:t>
-            </a:r>
-            <a:r>
-              <a:rPr lang="en-GB" sz="1100" kern="100" dirty="0">
-                <a:effectLst/>
-                <a:latin typeface="Arial" panose="020B0604020202020204" pitchFamily="34" charset="0"/>
-                <a:ea typeface="Aptos" panose="020B0004020202020204" pitchFamily="34" charset="0"/>
-                <a:cs typeface="Arial" panose="020B0604020202020204" pitchFamily="34" charset="0"/>
-              </a:rPr>
-              <a:t> model has been used to show the relationship between sample date and the number of sequences per day. </a:t>
+              <a:t> The number of sequences per day for 2020. </a:t>
             </a:r>
             <a:r>
               <a:rPr lang="en-GB" sz="1100" b="1" kern="100" dirty="0">
-                <a:effectLst/>
-                <a:latin typeface="Arial" panose="020B0604020202020204" pitchFamily="34" charset="0"/>
-                <a:ea typeface="Aptos" panose="020B0004020202020204" pitchFamily="34" charset="0"/>
-                <a:cs typeface="Arial" panose="020B0604020202020204" pitchFamily="34" charset="0"/>
-              </a:rPr>
-              <a:t>B</a:t>
-            </a:r>
-            <a:r>
-              <a:rPr lang="en-GB" sz="1100" kern="100" dirty="0">
-                <a:effectLst/>
-                <a:latin typeface="Arial" panose="020B0604020202020204" pitchFamily="34" charset="0"/>
-                <a:ea typeface="Aptos" panose="020B0004020202020204" pitchFamily="34" charset="0"/>
-                <a:cs typeface="Arial" panose="020B0604020202020204" pitchFamily="34" charset="0"/>
-              </a:rPr>
-              <a:t> The number of sequences per day for 2020. </a:t>
-            </a:r>
-            <a:r>
-              <a:rPr lang="en-GB" sz="1100" b="1" kern="100" dirty="0">
-                <a:effectLst/>
                 <a:latin typeface="Arial" panose="020B0604020202020204" pitchFamily="34" charset="0"/>
                 <a:ea typeface="Aptos" panose="020B0004020202020204" pitchFamily="34" charset="0"/>
                 <a:cs typeface="Arial" panose="020B0604020202020204" pitchFamily="34" charset="0"/>
@@ -4148,7 +4105,6 @@
             </a:r>
             <a:r>
               <a:rPr lang="en-GB" sz="1100" kern="100" dirty="0">
-                <a:effectLst/>
                 <a:latin typeface="Arial" panose="020B0604020202020204" pitchFamily="34" charset="0"/>
                 <a:ea typeface="Aptos" panose="020B0004020202020204" pitchFamily="34" charset="0"/>
                 <a:cs typeface="Arial" panose="020B0604020202020204" pitchFamily="34" charset="0"/>
@@ -4157,7 +4113,6 @@
             </a:r>
             <a:r>
               <a:rPr lang="en-GB" sz="1100" b="1" kern="100" dirty="0">
-                <a:effectLst/>
                 <a:latin typeface="Arial" panose="020B0604020202020204" pitchFamily="34" charset="0"/>
                 <a:ea typeface="Aptos" panose="020B0004020202020204" pitchFamily="34" charset="0"/>
                 <a:cs typeface="Arial" panose="020B0604020202020204" pitchFamily="34" charset="0"/>
@@ -4166,7 +4121,6 @@
             </a:r>
             <a:r>
               <a:rPr lang="en-GB" sz="1100" kern="100" dirty="0">
-                <a:effectLst/>
                 <a:latin typeface="Arial" panose="020B0604020202020204" pitchFamily="34" charset="0"/>
                 <a:ea typeface="Aptos" panose="020B0004020202020204" pitchFamily="34" charset="0"/>
                 <a:cs typeface="Arial" panose="020B0604020202020204" pitchFamily="34" charset="0"/>
@@ -4175,7 +4129,6 @@
             </a:r>
             <a:r>
               <a:rPr lang="en-GB" sz="1100" b="1" kern="100" dirty="0">
-                <a:effectLst/>
                 <a:latin typeface="Arial" panose="020B0604020202020204" pitchFamily="34" charset="0"/>
                 <a:ea typeface="Aptos" panose="020B0004020202020204" pitchFamily="34" charset="0"/>
                 <a:cs typeface="Arial" panose="020B0604020202020204" pitchFamily="34" charset="0"/>
@@ -4184,7 +4137,6 @@
             </a:r>
             <a:r>
               <a:rPr lang="en-GB" sz="1100" kern="100" dirty="0">
-                <a:effectLst/>
                 <a:latin typeface="Arial" panose="020B0604020202020204" pitchFamily="34" charset="0"/>
                 <a:ea typeface="Aptos" panose="020B0004020202020204" pitchFamily="34" charset="0"/>
                 <a:cs typeface="Arial" panose="020B0604020202020204" pitchFamily="34" charset="0"/>
@@ -4193,7 +4145,6 @@
             </a:r>
             <a:r>
               <a:rPr lang="en-GB" sz="1100" b="1" kern="100" dirty="0">
-                <a:effectLst/>
                 <a:latin typeface="Arial" panose="020B0604020202020204" pitchFamily="34" charset="0"/>
                 <a:ea typeface="Aptos" panose="020B0004020202020204" pitchFamily="34" charset="0"/>
                 <a:cs typeface="Arial" panose="020B0604020202020204" pitchFamily="34" charset="0"/>
@@ -4202,7 +4153,6 @@
             </a:r>
             <a:r>
               <a:rPr lang="en-GB" sz="1100" kern="100" dirty="0">
-                <a:effectLst/>
                 <a:latin typeface="Arial" panose="020B0604020202020204" pitchFamily="34" charset="0"/>
                 <a:ea typeface="Aptos" panose="020B0004020202020204" pitchFamily="34" charset="0"/>
                 <a:cs typeface="Arial" panose="020B0604020202020204" pitchFamily="34" charset="0"/>
@@ -4211,7 +4161,6 @@
             </a:r>
             <a:r>
               <a:rPr lang="en-GB" sz="1100" b="1" kern="100" dirty="0">
-                <a:effectLst/>
                 <a:latin typeface="Arial" panose="020B0604020202020204" pitchFamily="34" charset="0"/>
                 <a:ea typeface="Aptos" panose="020B0004020202020204" pitchFamily="34" charset="0"/>
                 <a:cs typeface="Arial" panose="020B0604020202020204" pitchFamily="34" charset="0"/>
@@ -4220,7 +4169,6 @@
             </a:r>
             <a:r>
               <a:rPr lang="en-GB" sz="1100" kern="100" dirty="0">
-                <a:effectLst/>
                 <a:latin typeface="Arial" panose="020B0604020202020204" pitchFamily="34" charset="0"/>
                 <a:ea typeface="Aptos" panose="020B0004020202020204" pitchFamily="34" charset="0"/>
                 <a:cs typeface="Arial" panose="020B0604020202020204" pitchFamily="34" charset="0"/>
@@ -4228,7 +4176,6 @@
               <a:t>The number of sequences per day for 2024.</a:t>
             </a:r>
             <a:endParaRPr lang="en-GB" sz="1100" kern="100" dirty="0">
-              <a:effectLst/>
               <a:latin typeface="Aptos" panose="020B0004020202020204" pitchFamily="34" charset="0"/>
               <a:ea typeface="Aptos" panose="020B0004020202020204" pitchFamily="34" charset="0"/>
               <a:cs typeface="Arial" panose="020B0604020202020204" pitchFamily="34" charset="0"/>
@@ -4280,8 +4227,8 @@
         </p:nvSpPr>
         <p:spPr>
           <a:xfrm>
-            <a:off x="0" y="5670695"/>
-            <a:ext cx="12192000" cy="1200329"/>
+            <a:off x="1143000" y="5091576"/>
+            <a:ext cx="9906000" cy="1569660"/>
           </a:xfrm>
           <a:prstGeom prst="rect">
             <a:avLst/>
@@ -4372,8 +4319,8 @@
         </p:blipFill>
         <p:spPr>
           <a:xfrm>
-            <a:off x="0" y="0"/>
-            <a:ext cx="12192000" cy="5740400"/>
+            <a:off x="1143000" y="71120"/>
+            <a:ext cx="9861494" cy="4643120"/>
           </a:xfrm>
           <a:prstGeom prst="rect">
             <a:avLst/>
@@ -4424,8 +4371,8 @@
         </p:nvSpPr>
         <p:spPr>
           <a:xfrm>
-            <a:off x="-1" y="6027003"/>
-            <a:ext cx="12192001" cy="830997"/>
+            <a:off x="1143000" y="5071965"/>
+            <a:ext cx="9906000" cy="830997"/>
           </a:xfrm>
           <a:prstGeom prst="rect">
             <a:avLst/>
@@ -4495,8 +4442,8 @@
         </p:blipFill>
         <p:spPr>
           <a:xfrm>
-            <a:off x="233680" y="0"/>
-            <a:ext cx="11684000" cy="5822527"/>
+            <a:off x="1143001" y="2"/>
+            <a:ext cx="9806605" cy="4886959"/>
           </a:xfrm>
           <a:prstGeom prst="rect">
             <a:avLst/>
@@ -4547,8 +4494,8 @@
         </p:nvSpPr>
         <p:spPr>
           <a:xfrm>
-            <a:off x="355107" y="5601810"/>
-            <a:ext cx="10209321" cy="954107"/>
+            <a:off x="1143000" y="5601812"/>
+            <a:ext cx="9906000" cy="954107"/>
           </a:xfrm>
           <a:prstGeom prst="rect">
             <a:avLst/>
@@ -4675,8 +4622,8 @@
         </p:nvSpPr>
         <p:spPr>
           <a:xfrm>
-            <a:off x="748092" y="5437672"/>
-            <a:ext cx="10728960" cy="1200329"/>
+            <a:off x="1214120" y="5232402"/>
+            <a:ext cx="9834880" cy="1200329"/>
           </a:xfrm>
           <a:prstGeom prst="rect">
             <a:avLst/>
@@ -4776,8 +4723,8 @@
         </p:blipFill>
         <p:spPr>
           <a:xfrm>
-            <a:off x="0" y="1456878"/>
-            <a:ext cx="12192000" cy="3172083"/>
+            <a:off x="127073" y="955041"/>
+            <a:ext cx="11943007" cy="3107300"/>
           </a:xfrm>
           <a:prstGeom prst="rect">
             <a:avLst/>
@@ -4814,6 +4761,83 @@
           <a:chExt cx="0" cy="0"/>
         </a:xfrm>
       </p:grpSpPr>
+      <p:sp>
+        <p:nvSpPr>
+          <p:cNvPr id="2" name="TextBox 1">
+            <a:extLst>
+              <a:ext uri="{FF2B5EF4-FFF2-40B4-BE49-F238E27FC236}">
+                <a16:creationId xmlns:a16="http://schemas.microsoft.com/office/drawing/2014/main" id="{C2402DA4-11EE-8708-2087-613F15B6AEEE}"/>
+              </a:ext>
+            </a:extLst>
+          </p:cNvPr>
+          <p:cNvSpPr txBox="1"/>
+          <p:nvPr/>
+        </p:nvSpPr>
+        <p:spPr>
+          <a:xfrm>
+            <a:off x="1143000" y="5344162"/>
+            <a:ext cx="9906000" cy="646331"/>
+          </a:xfrm>
+          <a:prstGeom prst="rect">
+            <a:avLst/>
+          </a:prstGeom>
+          <a:noFill/>
+        </p:spPr>
+        <p:txBody>
+          <a:bodyPr wrap="square" rtlCol="0">
+            <a:spAutoFit/>
+          </a:bodyPr>
+          <a:lstStyle/>
+          <a:p>
+            <a:r>
+              <a:rPr lang="en-GB" b="1" dirty="0">
+                <a:latin typeface="Arial" panose="020B0604020202020204" pitchFamily="34" charset="0"/>
+                <a:cs typeface="Arial" panose="020B0604020202020204" pitchFamily="34" charset="0"/>
+              </a:rPr>
+              <a:t>Figure 6</a:t>
+            </a:r>
+            <a:r>
+              <a:rPr lang="en-GB" dirty="0">
+                <a:latin typeface="Arial" panose="020B0604020202020204" pitchFamily="34" charset="0"/>
+                <a:cs typeface="Arial" panose="020B0604020202020204" pitchFamily="34" charset="0"/>
+              </a:rPr>
+              <a:t>. </a:t>
+            </a:r>
+            <a:r>
+              <a:rPr lang="en-GB" dirty="0">
+                <a:latin typeface="Arial" panose="020B0604020202020204" pitchFamily="34" charset="0"/>
+                <a:ea typeface="Aptos" panose="020B0004020202020204" pitchFamily="34" charset="0"/>
+              </a:rPr>
+              <a:t>Figure 2D visualisation of the SARS-CoV-2 spike protein mutations in the UK with </a:t>
+            </a:r>
+            <a:r>
+              <a:rPr lang="en-GB" b="1" dirty="0">
+                <a:latin typeface="Arial" panose="020B0604020202020204" pitchFamily="34" charset="0"/>
+                <a:ea typeface="Aptos" panose="020B0004020202020204" pitchFamily="34" charset="0"/>
+              </a:rPr>
+              <a:t>X </a:t>
+            </a:r>
+            <a:r>
+              <a:rPr lang="en-GB" dirty="0">
+                <a:latin typeface="Arial" panose="020B0604020202020204" pitchFamily="34" charset="0"/>
+                <a:ea typeface="Aptos" panose="020B0004020202020204" pitchFamily="34" charset="0"/>
+              </a:rPr>
+              <a:t>clusters using </a:t>
+            </a:r>
+            <a:r>
+              <a:rPr lang="en-GB" b="1" dirty="0">
+                <a:latin typeface="Arial" panose="020B0604020202020204" pitchFamily="34" charset="0"/>
+                <a:ea typeface="Aptos" panose="020B0004020202020204" pitchFamily="34" charset="0"/>
+              </a:rPr>
+              <a:t>X dimensionality reduction method paired with K-means</a:t>
+            </a:r>
+            <a:endParaRPr lang="en-GB" dirty="0">
+              <a:latin typeface="Arial" panose="020B0604020202020204" pitchFamily="34" charset="0"/>
+              <a:cs typeface="Arial" panose="020B0604020202020204" pitchFamily="34" charset="0"/>
+            </a:endParaRPr>
+          </a:p>
+        </p:txBody>
+      </p:sp>
     </p:spTree>
     <p:extLst>
       <p:ext uri="{BB962C8B-B14F-4D97-AF65-F5344CB8AC3E}">
@@ -4827,10 +4851,257 @@
 </p:sld>
 </file>
 
+<file path=ppt/slides/slide7.xml><?xml version="1.0" encoding="utf-8"?>
+<p:sld xmlns:a="http://schemas.openxmlformats.org/drawingml/2006/main" xmlns:r="http://schemas.openxmlformats.org/officeDocument/2006/relationships" xmlns:p="http://schemas.openxmlformats.org/presentationml/2006/main">
+  <p:cSld>
+    <p:spTree>
+      <p:nvGrpSpPr>
+        <p:cNvPr id="1" name=""/>
+        <p:cNvGrpSpPr/>
+        <p:nvPr/>
+      </p:nvGrpSpPr>
+      <p:grpSpPr>
+        <a:xfrm>
+          <a:off x="0" y="0"/>
+          <a:ext cx="0" cy="0"/>
+          <a:chOff x="0" y="0"/>
+          <a:chExt cx="0" cy="0"/>
+        </a:xfrm>
+      </p:grpSpPr>
+      <p:sp>
+        <p:nvSpPr>
+          <p:cNvPr id="2" name="TextBox 1">
+            <a:extLst>
+              <a:ext uri="{FF2B5EF4-FFF2-40B4-BE49-F238E27FC236}">
+                <a16:creationId xmlns:a16="http://schemas.microsoft.com/office/drawing/2014/main" id="{A2883001-A74A-9EC1-EAFB-163BE374828F}"/>
+              </a:ext>
+            </a:extLst>
+          </p:cNvPr>
+          <p:cNvSpPr txBox="1"/>
+          <p:nvPr/>
+        </p:nvSpPr>
+        <p:spPr>
+          <a:xfrm>
+            <a:off x="924560" y="5344160"/>
+            <a:ext cx="10891520" cy="369332"/>
+          </a:xfrm>
+          <a:prstGeom prst="rect">
+            <a:avLst/>
+          </a:prstGeom>
+          <a:noFill/>
+        </p:spPr>
+        <p:txBody>
+          <a:bodyPr wrap="square" rtlCol="0">
+            <a:spAutoFit/>
+          </a:bodyPr>
+          <a:lstStyle/>
+          <a:p>
+            <a:r>
+              <a:rPr lang="en-GB" b="1" dirty="0">
+                <a:latin typeface="Arial" panose="020B0604020202020204" pitchFamily="34" charset="0"/>
+                <a:cs typeface="Arial" panose="020B0604020202020204" pitchFamily="34" charset="0"/>
+              </a:rPr>
+              <a:t>Figure 7.</a:t>
+            </a:r>
+            <a:r>
+              <a:rPr lang="en-GB" dirty="0">
+                <a:latin typeface="Arial" panose="020B0604020202020204" pitchFamily="34" charset="0"/>
+                <a:cs typeface="Arial" panose="020B0604020202020204" pitchFamily="34" charset="0"/>
+              </a:rPr>
+              <a:t> Box plots of the number sequences per centroid</a:t>
+            </a:r>
+            <a:endParaRPr lang="en-GB" b="1" dirty="0">
+              <a:latin typeface="Arial" panose="020B0604020202020204" pitchFamily="34" charset="0"/>
+              <a:cs typeface="Arial" panose="020B0604020202020204" pitchFamily="34" charset="0"/>
+            </a:endParaRPr>
+          </a:p>
+        </p:txBody>
+      </p:sp>
+    </p:spTree>
+    <p:extLst>
+      <p:ext uri="{BB962C8B-B14F-4D97-AF65-F5344CB8AC3E}">
+        <p14:creationId xmlns:p14="http://schemas.microsoft.com/office/powerpoint/2010/main" val="1233152676"/>
+      </p:ext>
+    </p:extLst>
+  </p:cSld>
+  <p:clrMapOvr>
+    <a:masterClrMapping/>
+  </p:clrMapOvr>
+</p:sld>
+</file>
+
+<file path=ppt/slides/slide8.xml><?xml version="1.0" encoding="utf-8"?>
+<p:sld xmlns:a="http://schemas.openxmlformats.org/drawingml/2006/main" xmlns:r="http://schemas.openxmlformats.org/officeDocument/2006/relationships" xmlns:p="http://schemas.openxmlformats.org/presentationml/2006/main">
+  <p:cSld>
+    <p:spTree>
+      <p:nvGrpSpPr>
+        <p:cNvPr id="1" name=""/>
+        <p:cNvGrpSpPr/>
+        <p:nvPr/>
+      </p:nvGrpSpPr>
+      <p:grpSpPr>
+        <a:xfrm>
+          <a:off x="0" y="0"/>
+          <a:ext cx="0" cy="0"/>
+          <a:chOff x="0" y="0"/>
+          <a:chExt cx="0" cy="0"/>
+        </a:xfrm>
+      </p:grpSpPr>
+      <p:sp>
+        <p:nvSpPr>
+          <p:cNvPr id="2" name="TextBox 1">
+            <a:extLst>
+              <a:ext uri="{FF2B5EF4-FFF2-40B4-BE49-F238E27FC236}">
+                <a16:creationId xmlns:a16="http://schemas.microsoft.com/office/drawing/2014/main" id="{A8389FEB-A693-BCAD-76FA-27FB4DFEF374}"/>
+              </a:ext>
+            </a:extLst>
+          </p:cNvPr>
+          <p:cNvSpPr txBox="1"/>
+          <p:nvPr/>
+        </p:nvSpPr>
+        <p:spPr>
+          <a:xfrm>
+            <a:off x="1188720" y="4978400"/>
+            <a:ext cx="9611360" cy="923330"/>
+          </a:xfrm>
+          <a:prstGeom prst="rect">
+            <a:avLst/>
+          </a:prstGeom>
+          <a:noFill/>
+        </p:spPr>
+        <p:txBody>
+          <a:bodyPr wrap="square" rtlCol="0">
+            <a:spAutoFit/>
+          </a:bodyPr>
+          <a:lstStyle/>
+          <a:p>
+            <a:r>
+              <a:rPr lang="en-GB" b="1" dirty="0">
+                <a:latin typeface="Arial" panose="020B0604020202020204" pitchFamily="34" charset="0"/>
+                <a:cs typeface="Arial" panose="020B0604020202020204" pitchFamily="34" charset="0"/>
+              </a:rPr>
+              <a:t>Figure 8. </a:t>
+            </a:r>
+            <a:r>
+              <a:rPr lang="en-GB" sz="1800" kern="100" dirty="0">
+                <a:effectLst/>
+                <a:latin typeface="Arial" panose="020B0604020202020204" pitchFamily="34" charset="0"/>
+                <a:ea typeface="Aptos" panose="020B0004020202020204" pitchFamily="34" charset="0"/>
+                <a:cs typeface="Arial" panose="020B0604020202020204" pitchFamily="34" charset="0"/>
+              </a:rPr>
+              <a:t>Cluster evolution over time, scatter plot clusters over time, will show the evolution of the clusters, what clusters share the same root</a:t>
+            </a:r>
+            <a:endParaRPr lang="en-GB" sz="1800" kern="100" dirty="0">
+              <a:effectLst/>
+              <a:latin typeface="Aptos" panose="020B0004020202020204" pitchFamily="34" charset="0"/>
+              <a:ea typeface="Aptos" panose="020B0004020202020204" pitchFamily="34" charset="0"/>
+              <a:cs typeface="Arial" panose="020B0604020202020204" pitchFamily="34" charset="0"/>
+            </a:endParaRPr>
+          </a:p>
+          <a:p>
+            <a:endParaRPr lang="en-GB" b="1" dirty="0">
+              <a:latin typeface="Arial" panose="020B0604020202020204" pitchFamily="34" charset="0"/>
+              <a:cs typeface="Arial" panose="020B0604020202020204" pitchFamily="34" charset="0"/>
+            </a:endParaRPr>
+          </a:p>
+        </p:txBody>
+      </p:sp>
+    </p:spTree>
+    <p:extLst>
+      <p:ext uri="{BB962C8B-B14F-4D97-AF65-F5344CB8AC3E}">
+        <p14:creationId xmlns:p14="http://schemas.microsoft.com/office/powerpoint/2010/main" val="2480000070"/>
+      </p:ext>
+    </p:extLst>
+  </p:cSld>
+  <p:clrMapOvr>
+    <a:masterClrMapping/>
+  </p:clrMapOvr>
+</p:sld>
+</file>
+
+<file path=ppt/slides/slide9.xml><?xml version="1.0" encoding="utf-8"?>
+<p:sld xmlns:a="http://schemas.openxmlformats.org/drawingml/2006/main" xmlns:r="http://schemas.openxmlformats.org/officeDocument/2006/relationships" xmlns:p="http://schemas.openxmlformats.org/presentationml/2006/main">
+  <p:cSld>
+    <p:spTree>
+      <p:nvGrpSpPr>
+        <p:cNvPr id="1" name=""/>
+        <p:cNvGrpSpPr/>
+        <p:nvPr/>
+      </p:nvGrpSpPr>
+      <p:grpSpPr>
+        <a:xfrm>
+          <a:off x="0" y="0"/>
+          <a:ext cx="0" cy="0"/>
+          <a:chOff x="0" y="0"/>
+          <a:chExt cx="0" cy="0"/>
+        </a:xfrm>
+      </p:grpSpPr>
+      <p:sp>
+        <p:nvSpPr>
+          <p:cNvPr id="2" name="TextBox 1">
+            <a:extLst>
+              <a:ext uri="{FF2B5EF4-FFF2-40B4-BE49-F238E27FC236}">
+                <a16:creationId xmlns:a16="http://schemas.microsoft.com/office/drawing/2014/main" id="{C35AEC6F-DF4C-E153-C994-06805D4263D7}"/>
+              </a:ext>
+            </a:extLst>
+          </p:cNvPr>
+          <p:cNvSpPr txBox="1"/>
+          <p:nvPr/>
+        </p:nvSpPr>
+        <p:spPr>
+          <a:xfrm>
+            <a:off x="1198880" y="5039360"/>
+            <a:ext cx="9692640" cy="369332"/>
+          </a:xfrm>
+          <a:prstGeom prst="rect">
+            <a:avLst/>
+          </a:prstGeom>
+          <a:noFill/>
+        </p:spPr>
+        <p:txBody>
+          <a:bodyPr wrap="square" rtlCol="0">
+            <a:spAutoFit/>
+          </a:bodyPr>
+          <a:lstStyle/>
+          <a:p>
+            <a:r>
+              <a:rPr lang="en-GB" b="1" dirty="0">
+                <a:latin typeface="Arial" panose="020B0604020202020204" pitchFamily="34" charset="0"/>
+                <a:cs typeface="Arial" panose="020B0604020202020204" pitchFamily="34" charset="0"/>
+              </a:rPr>
+              <a:t>Figure 9.</a:t>
+            </a:r>
+            <a:r>
+              <a:rPr lang="en-GB" dirty="0">
+                <a:latin typeface="Arial" panose="020B0604020202020204" pitchFamily="34" charset="0"/>
+                <a:cs typeface="Arial" panose="020B0604020202020204" pitchFamily="34" charset="0"/>
+              </a:rPr>
+              <a:t> Map of clusters across the UK</a:t>
+            </a:r>
+            <a:endParaRPr lang="en-GB" b="1" dirty="0">
+              <a:latin typeface="Arial" panose="020B0604020202020204" pitchFamily="34" charset="0"/>
+              <a:cs typeface="Arial" panose="020B0604020202020204" pitchFamily="34" charset="0"/>
+            </a:endParaRPr>
+          </a:p>
+        </p:txBody>
+      </p:sp>
+    </p:spTree>
+    <p:extLst>
+      <p:ext uri="{BB962C8B-B14F-4D97-AF65-F5344CB8AC3E}">
+        <p14:creationId xmlns:p14="http://schemas.microsoft.com/office/powerpoint/2010/main" val="1010243734"/>
+      </p:ext>
+    </p:extLst>
+  </p:cSld>
+  <p:clrMapOvr>
+    <a:masterClrMapping/>
+  </p:clrMapOvr>
+</p:sld>
+</file>
+
 <file path=ppt/theme/theme1.xml><?xml version="1.0" encoding="utf-8"?>
 <a:theme xmlns:a="http://schemas.openxmlformats.org/drawingml/2006/main" name="Office Theme">
   <a:themeElements>
-    <a:clrScheme name="Office">
+    <a:clrScheme name="Office Theme">
       <a:dk1>
         <a:sysClr val="windowText" lastClr="000000"/>
       </a:dk1>
@@ -4868,7 +5139,7 @@
         <a:srgbClr val="96607D"/>
       </a:folHlink>
     </a:clrScheme>
-    <a:fontScheme name="Office">
+    <a:fontScheme name="Office Theme">
       <a:majorFont>
         <a:latin typeface="Aptos Display" panose="02110004020202020204"/>
         <a:ea typeface=""/>
@@ -4974,7 +5245,7 @@
         <a:font script="Tfng" typeface="Ebrima"/>
       </a:minorFont>
     </a:fontScheme>
-    <a:fmtScheme name="Office">
+    <a:fmtScheme name="Office Theme">
       <a:fillStyleLst>
         <a:solidFill>
           <a:schemeClr val="phClr"/>

</xml_diff>

<commit_message>
Figure legends and outline for report
</commit_message>
<xml_diff>
--- a/Plots and Figures/Real plots and figures/Completed figures with captions.pptx
+++ b/Plots and Figures/Real plots and figures/Completed figures with captions.pptx
@@ -14,9 +14,9 @@
     <p:sldId id="260" r:id="rId5"/>
     <p:sldId id="259" r:id="rId6"/>
     <p:sldId id="261" r:id="rId7"/>
-    <p:sldId id="262" r:id="rId8"/>
-    <p:sldId id="263" r:id="rId9"/>
-    <p:sldId id="264" r:id="rId10"/>
+    <p:sldId id="263" r:id="rId8"/>
+    <p:sldId id="264" r:id="rId9"/>
+    <p:sldId id="265" r:id="rId10"/>
   </p:sldIdLst>
   <p:sldSz cx="12192000" cy="6858000"/>
   <p:notesSz cx="6858000" cy="9144000"/>
@@ -126,7 +126,7 @@
 <file path=ppt/revisionInfo.xml><?xml version="1.0" encoding="utf-8"?>
 <p1510:revInfo xmlns:a="http://schemas.openxmlformats.org/drawingml/2006/main" xmlns:r="http://schemas.openxmlformats.org/officeDocument/2006/relationships" xmlns:p1510="http://schemas.microsoft.com/office/powerpoint/2015/10/main">
   <p1510:revLst>
-    <p1510:client id="{7273B22C-C245-4F33-9671-B4FF89330F8E}" v="15" dt="2025-04-17T18:00:25.683"/>
+    <p1510:client id="{7273B22C-C245-4F33-9671-B4FF89330F8E}" v="17" dt="2025-04-19T17:51:40.182"/>
   </p1510:revLst>
 </p1510:revInfo>
 </file>
@@ -135,8 +135,8 @@
 <pc:chgInfo xmlns:a="http://schemas.openxmlformats.org/drawingml/2006/main" xmlns:r="http://schemas.openxmlformats.org/officeDocument/2006/relationships" xmlns:ac="http://schemas.microsoft.com/office/drawing/2013/main/command" xmlns:pc="http://schemas.microsoft.com/office/powerpoint/2013/main/command">
   <pc:docChgLst>
     <pc:chgData name="Samuel Aldous" userId="0ff3eb4db5f3e0fd" providerId="LiveId" clId="{7273B22C-C245-4F33-9671-B4FF89330F8E}"/>
-    <pc:docChg chg="undo custSel addSld modSld sldOrd modMainMaster modNotesMaster">
-      <pc:chgData name="Samuel Aldous" userId="0ff3eb4db5f3e0fd" providerId="LiveId" clId="{7273B22C-C245-4F33-9671-B4FF89330F8E}" dt="2025-04-17T18:02:01.609" v="4590" actId="20577"/>
+    <pc:docChg chg="undo custSel addSld delSld modSld sldOrd modMainMaster modNotesMaster">
+      <pc:chgData name="Samuel Aldous" userId="0ff3eb4db5f3e0fd" providerId="LiveId" clId="{7273B22C-C245-4F33-9671-B4FF89330F8E}" dt="2025-04-19T17:51:42.564" v="5125" actId="14100"/>
       <pc:docMkLst>
         <pc:docMk/>
       </pc:docMkLst>
@@ -248,13 +248,13 @@
         </pc:spChg>
       </pc:sldChg>
       <pc:sldChg chg="addSp modSp new mod">
-        <pc:chgData name="Samuel Aldous" userId="0ff3eb4db5f3e0fd" providerId="LiveId" clId="{7273B22C-C245-4F33-9671-B4FF89330F8E}" dt="2025-04-17T17:57:54.458" v="4362" actId="113"/>
+        <pc:chgData name="Samuel Aldous" userId="0ff3eb4db5f3e0fd" providerId="LiveId" clId="{7273B22C-C245-4F33-9671-B4FF89330F8E}" dt="2025-04-19T15:36:19.038" v="4883"/>
         <pc:sldMkLst>
           <pc:docMk/>
           <pc:sldMk cId="170184987" sldId="261"/>
         </pc:sldMkLst>
         <pc:spChg chg="add mod">
-          <ac:chgData name="Samuel Aldous" userId="0ff3eb4db5f3e0fd" providerId="LiveId" clId="{7273B22C-C245-4F33-9671-B4FF89330F8E}" dt="2025-04-17T17:57:54.458" v="4362" actId="113"/>
+          <ac:chgData name="Samuel Aldous" userId="0ff3eb4db5f3e0fd" providerId="LiveId" clId="{7273B22C-C245-4F33-9671-B4FF89330F8E}" dt="2025-04-19T15:36:19.038" v="4883"/>
           <ac:spMkLst>
             <pc:docMk/>
             <pc:sldMk cId="170184987" sldId="261"/>
@@ -262,14 +262,14 @@
           </ac:spMkLst>
         </pc:spChg>
       </pc:sldChg>
-      <pc:sldChg chg="addSp modSp new mod">
-        <pc:chgData name="Samuel Aldous" userId="0ff3eb4db5f3e0fd" providerId="LiveId" clId="{7273B22C-C245-4F33-9671-B4FF89330F8E}" dt="2025-04-17T17:58:26.021" v="4439" actId="20577"/>
+      <pc:sldChg chg="addSp modSp new del mod">
+        <pc:chgData name="Samuel Aldous" userId="0ff3eb4db5f3e0fd" providerId="LiveId" clId="{7273B22C-C245-4F33-9671-B4FF89330F8E}" dt="2025-04-19T15:36:28.534" v="4884" actId="47"/>
         <pc:sldMkLst>
           <pc:docMk/>
           <pc:sldMk cId="1233152676" sldId="262"/>
         </pc:sldMkLst>
         <pc:spChg chg="add mod">
-          <ac:chgData name="Samuel Aldous" userId="0ff3eb4db5f3e0fd" providerId="LiveId" clId="{7273B22C-C245-4F33-9671-B4FF89330F8E}" dt="2025-04-17T17:58:26.021" v="4439" actId="20577"/>
+          <ac:chgData name="Samuel Aldous" userId="0ff3eb4db5f3e0fd" providerId="LiveId" clId="{7273B22C-C245-4F33-9671-B4FF89330F8E}" dt="2025-04-19T15:26:48.959" v="4630" actId="1076"/>
           <ac:spMkLst>
             <pc:docMk/>
             <pc:sldMk cId="1233152676" sldId="262"/>
@@ -278,13 +278,13 @@
         </pc:spChg>
       </pc:sldChg>
       <pc:sldChg chg="addSp modSp new mod">
-        <pc:chgData name="Samuel Aldous" userId="0ff3eb4db5f3e0fd" providerId="LiveId" clId="{7273B22C-C245-4F33-9671-B4FF89330F8E}" dt="2025-04-17T18:00:10.815" v="4456" actId="1076"/>
+        <pc:chgData name="Samuel Aldous" userId="0ff3eb4db5f3e0fd" providerId="LiveId" clId="{7273B22C-C245-4F33-9671-B4FF89330F8E}" dt="2025-04-19T15:36:33.008" v="4886" actId="20577"/>
         <pc:sldMkLst>
           <pc:docMk/>
           <pc:sldMk cId="2480000070" sldId="263"/>
         </pc:sldMkLst>
         <pc:spChg chg="add mod">
-          <ac:chgData name="Samuel Aldous" userId="0ff3eb4db5f3e0fd" providerId="LiveId" clId="{7273B22C-C245-4F33-9671-B4FF89330F8E}" dt="2025-04-17T18:00:10.815" v="4456" actId="1076"/>
+          <ac:chgData name="Samuel Aldous" userId="0ff3eb4db5f3e0fd" providerId="LiveId" clId="{7273B22C-C245-4F33-9671-B4FF89330F8E}" dt="2025-04-19T15:36:33.008" v="4886" actId="20577"/>
           <ac:spMkLst>
             <pc:docMk/>
             <pc:sldMk cId="2480000070" sldId="263"/>
@@ -293,17 +293,40 @@
         </pc:spChg>
       </pc:sldChg>
       <pc:sldChg chg="addSp modSp new mod">
-        <pc:chgData name="Samuel Aldous" userId="0ff3eb4db5f3e0fd" providerId="LiveId" clId="{7273B22C-C245-4F33-9671-B4FF89330F8E}" dt="2025-04-17T18:02:01.609" v="4590" actId="20577"/>
+        <pc:chgData name="Samuel Aldous" userId="0ff3eb4db5f3e0fd" providerId="LiveId" clId="{7273B22C-C245-4F33-9671-B4FF89330F8E}" dt="2025-04-19T15:36:36.031" v="4888" actId="20577"/>
         <pc:sldMkLst>
           <pc:docMk/>
           <pc:sldMk cId="1010243734" sldId="264"/>
         </pc:sldMkLst>
         <pc:spChg chg="add mod">
-          <ac:chgData name="Samuel Aldous" userId="0ff3eb4db5f3e0fd" providerId="LiveId" clId="{7273B22C-C245-4F33-9671-B4FF89330F8E}" dt="2025-04-17T18:02:01.609" v="4590" actId="20577"/>
+          <ac:chgData name="Samuel Aldous" userId="0ff3eb4db5f3e0fd" providerId="LiveId" clId="{7273B22C-C245-4F33-9671-B4FF89330F8E}" dt="2025-04-19T15:36:36.031" v="4888" actId="20577"/>
           <ac:spMkLst>
             <pc:docMk/>
             <pc:sldMk cId="1010243734" sldId="264"/>
             <ac:spMk id="2" creationId="{C35AEC6F-DF4C-E153-C994-06805D4263D7}"/>
+          </ac:spMkLst>
+        </pc:spChg>
+      </pc:sldChg>
+      <pc:sldChg chg="addSp modSp new mod">
+        <pc:chgData name="Samuel Aldous" userId="0ff3eb4db5f3e0fd" providerId="LiveId" clId="{7273B22C-C245-4F33-9671-B4FF89330F8E}" dt="2025-04-19T17:51:42.564" v="5125" actId="14100"/>
+        <pc:sldMkLst>
+          <pc:docMk/>
+          <pc:sldMk cId="2984588856" sldId="265"/>
+        </pc:sldMkLst>
+        <pc:spChg chg="add mod">
+          <ac:chgData name="Samuel Aldous" userId="0ff3eb4db5f3e0fd" providerId="LiveId" clId="{7273B22C-C245-4F33-9671-B4FF89330F8E}" dt="2025-04-19T17:30:03.986" v="5122" actId="20577"/>
+          <ac:spMkLst>
+            <pc:docMk/>
+            <pc:sldMk cId="2984588856" sldId="265"/>
+            <ac:spMk id="2" creationId="{124A81C1-5794-6FCB-B678-5F86D3EBF6A7}"/>
+          </ac:spMkLst>
+        </pc:spChg>
+        <pc:spChg chg="add mod">
+          <ac:chgData name="Samuel Aldous" userId="0ff3eb4db5f3e0fd" providerId="LiveId" clId="{7273B22C-C245-4F33-9671-B4FF89330F8E}" dt="2025-04-19T17:51:42.564" v="5125" actId="14100"/>
+          <ac:spMkLst>
+            <pc:docMk/>
+            <pc:sldMk cId="2984588856" sldId="265"/>
+            <ac:spMk id="3" creationId="{A9109258-3398-4635-1FA2-130A2FF0F760}"/>
           </ac:spMkLst>
         </pc:spChg>
       </pc:sldChg>
@@ -313,46 +336,6 @@
           <pc:docMk/>
           <pc:sldMasterMk cId="1639791294" sldId="2147483660"/>
         </pc:sldMasterMkLst>
-        <pc:spChg chg="mod">
-          <ac:chgData name="Samuel Aldous" userId="0ff3eb4db5f3e0fd" providerId="LiveId" clId="{7273B22C-C245-4F33-9671-B4FF89330F8E}" dt="2025-04-17T17:57:06.280" v="4356"/>
-          <ac:spMkLst>
-            <pc:docMk/>
-            <pc:sldMasterMk cId="1639791294" sldId="2147483660"/>
-            <ac:spMk id="2" creationId="{00000000-0000-0000-0000-000000000000}"/>
-          </ac:spMkLst>
-        </pc:spChg>
-        <pc:spChg chg="mod">
-          <ac:chgData name="Samuel Aldous" userId="0ff3eb4db5f3e0fd" providerId="LiveId" clId="{7273B22C-C245-4F33-9671-B4FF89330F8E}" dt="2025-04-17T17:57:06.280" v="4356"/>
-          <ac:spMkLst>
-            <pc:docMk/>
-            <pc:sldMasterMk cId="1639791294" sldId="2147483660"/>
-            <ac:spMk id="3" creationId="{00000000-0000-0000-0000-000000000000}"/>
-          </ac:spMkLst>
-        </pc:spChg>
-        <pc:spChg chg="mod">
-          <ac:chgData name="Samuel Aldous" userId="0ff3eb4db5f3e0fd" providerId="LiveId" clId="{7273B22C-C245-4F33-9671-B4FF89330F8E}" dt="2025-04-17T17:57:06.280" v="4356"/>
-          <ac:spMkLst>
-            <pc:docMk/>
-            <pc:sldMasterMk cId="1639791294" sldId="2147483660"/>
-            <ac:spMk id="4" creationId="{00000000-0000-0000-0000-000000000000}"/>
-          </ac:spMkLst>
-        </pc:spChg>
-        <pc:spChg chg="mod">
-          <ac:chgData name="Samuel Aldous" userId="0ff3eb4db5f3e0fd" providerId="LiveId" clId="{7273B22C-C245-4F33-9671-B4FF89330F8E}" dt="2025-04-17T17:57:06.280" v="4356"/>
-          <ac:spMkLst>
-            <pc:docMk/>
-            <pc:sldMasterMk cId="1639791294" sldId="2147483660"/>
-            <ac:spMk id="5" creationId="{00000000-0000-0000-0000-000000000000}"/>
-          </ac:spMkLst>
-        </pc:spChg>
-        <pc:spChg chg="mod">
-          <ac:chgData name="Samuel Aldous" userId="0ff3eb4db5f3e0fd" providerId="LiveId" clId="{7273B22C-C245-4F33-9671-B4FF89330F8E}" dt="2025-04-17T17:57:06.280" v="4356"/>
-          <ac:spMkLst>
-            <pc:docMk/>
-            <pc:sldMasterMk cId="1639791294" sldId="2147483660"/>
-            <ac:spMk id="6" creationId="{00000000-0000-0000-0000-000000000000}"/>
-          </ac:spMkLst>
-        </pc:spChg>
         <pc:sldLayoutChg chg="modSp">
           <pc:chgData name="Samuel Aldous" userId="0ff3eb4db5f3e0fd" providerId="LiveId" clId="{7273B22C-C245-4F33-9671-B4FF89330F8E}" dt="2025-04-17T17:57:06.280" v="4356"/>
           <pc:sldLayoutMkLst>
@@ -360,24 +343,6 @@
             <pc:sldMasterMk cId="1639791294" sldId="2147483660"/>
             <pc:sldLayoutMk cId="880864121" sldId="2147483661"/>
           </pc:sldLayoutMkLst>
-          <pc:spChg chg="mod">
-            <ac:chgData name="Samuel Aldous" userId="0ff3eb4db5f3e0fd" providerId="LiveId" clId="{7273B22C-C245-4F33-9671-B4FF89330F8E}" dt="2025-04-17T17:57:06.280" v="4356"/>
-            <ac:spMkLst>
-              <pc:docMk/>
-              <pc:sldMasterMk cId="1639791294" sldId="2147483660"/>
-              <pc:sldLayoutMk cId="880864121" sldId="2147483661"/>
-              <ac:spMk id="2" creationId="{00000000-0000-0000-0000-000000000000}"/>
-            </ac:spMkLst>
-          </pc:spChg>
-          <pc:spChg chg="mod">
-            <ac:chgData name="Samuel Aldous" userId="0ff3eb4db5f3e0fd" providerId="LiveId" clId="{7273B22C-C245-4F33-9671-B4FF89330F8E}" dt="2025-04-17T17:57:06.280" v="4356"/>
-            <ac:spMkLst>
-              <pc:docMk/>
-              <pc:sldMasterMk cId="1639791294" sldId="2147483660"/>
-              <pc:sldLayoutMk cId="880864121" sldId="2147483661"/>
-              <ac:spMk id="3" creationId="{00000000-0000-0000-0000-000000000000}"/>
-            </ac:spMkLst>
-          </pc:spChg>
         </pc:sldLayoutChg>
         <pc:sldLayoutChg chg="modSp">
           <pc:chgData name="Samuel Aldous" userId="0ff3eb4db5f3e0fd" providerId="LiveId" clId="{7273B22C-C245-4F33-9671-B4FF89330F8E}" dt="2025-04-17T17:57:06.280" v="4356"/>
@@ -386,24 +351,6 @@
             <pc:sldMasterMk cId="1639791294" sldId="2147483660"/>
             <pc:sldLayoutMk cId="3519707564" sldId="2147483663"/>
           </pc:sldLayoutMkLst>
-          <pc:spChg chg="mod">
-            <ac:chgData name="Samuel Aldous" userId="0ff3eb4db5f3e0fd" providerId="LiveId" clId="{7273B22C-C245-4F33-9671-B4FF89330F8E}" dt="2025-04-17T17:57:06.280" v="4356"/>
-            <ac:spMkLst>
-              <pc:docMk/>
-              <pc:sldMasterMk cId="1639791294" sldId="2147483660"/>
-              <pc:sldLayoutMk cId="3519707564" sldId="2147483663"/>
-              <ac:spMk id="2" creationId="{00000000-0000-0000-0000-000000000000}"/>
-            </ac:spMkLst>
-          </pc:spChg>
-          <pc:spChg chg="mod">
-            <ac:chgData name="Samuel Aldous" userId="0ff3eb4db5f3e0fd" providerId="LiveId" clId="{7273B22C-C245-4F33-9671-B4FF89330F8E}" dt="2025-04-17T17:57:06.280" v="4356"/>
-            <ac:spMkLst>
-              <pc:docMk/>
-              <pc:sldMasterMk cId="1639791294" sldId="2147483660"/>
-              <pc:sldLayoutMk cId="3519707564" sldId="2147483663"/>
-              <ac:spMk id="3" creationId="{00000000-0000-0000-0000-000000000000}"/>
-            </ac:spMkLst>
-          </pc:spChg>
         </pc:sldLayoutChg>
         <pc:sldLayoutChg chg="modSp">
           <pc:chgData name="Samuel Aldous" userId="0ff3eb4db5f3e0fd" providerId="LiveId" clId="{7273B22C-C245-4F33-9671-B4FF89330F8E}" dt="2025-04-17T17:57:06.280" v="4356"/>
@@ -412,24 +359,6 @@
             <pc:sldMasterMk cId="1639791294" sldId="2147483660"/>
             <pc:sldLayoutMk cId="4106865199" sldId="2147483664"/>
           </pc:sldLayoutMkLst>
-          <pc:spChg chg="mod">
-            <ac:chgData name="Samuel Aldous" userId="0ff3eb4db5f3e0fd" providerId="LiveId" clId="{7273B22C-C245-4F33-9671-B4FF89330F8E}" dt="2025-04-17T17:57:06.280" v="4356"/>
-            <ac:spMkLst>
-              <pc:docMk/>
-              <pc:sldMasterMk cId="1639791294" sldId="2147483660"/>
-              <pc:sldLayoutMk cId="4106865199" sldId="2147483664"/>
-              <ac:spMk id="3" creationId="{00000000-0000-0000-0000-000000000000}"/>
-            </ac:spMkLst>
-          </pc:spChg>
-          <pc:spChg chg="mod">
-            <ac:chgData name="Samuel Aldous" userId="0ff3eb4db5f3e0fd" providerId="LiveId" clId="{7273B22C-C245-4F33-9671-B4FF89330F8E}" dt="2025-04-17T17:57:06.280" v="4356"/>
-            <ac:spMkLst>
-              <pc:docMk/>
-              <pc:sldMasterMk cId="1639791294" sldId="2147483660"/>
-              <pc:sldLayoutMk cId="4106865199" sldId="2147483664"/>
-              <ac:spMk id="4" creationId="{00000000-0000-0000-0000-000000000000}"/>
-            </ac:spMkLst>
-          </pc:spChg>
         </pc:sldLayoutChg>
         <pc:sldLayoutChg chg="modSp">
           <pc:chgData name="Samuel Aldous" userId="0ff3eb4db5f3e0fd" providerId="LiveId" clId="{7273B22C-C245-4F33-9671-B4FF89330F8E}" dt="2025-04-17T17:57:06.280" v="4356"/>
@@ -438,51 +367,6 @@
             <pc:sldMasterMk cId="1639791294" sldId="2147483660"/>
             <pc:sldLayoutMk cId="3811016800" sldId="2147483665"/>
           </pc:sldLayoutMkLst>
-          <pc:spChg chg="mod">
-            <ac:chgData name="Samuel Aldous" userId="0ff3eb4db5f3e0fd" providerId="LiveId" clId="{7273B22C-C245-4F33-9671-B4FF89330F8E}" dt="2025-04-17T17:57:06.280" v="4356"/>
-            <ac:spMkLst>
-              <pc:docMk/>
-              <pc:sldMasterMk cId="1639791294" sldId="2147483660"/>
-              <pc:sldLayoutMk cId="3811016800" sldId="2147483665"/>
-              <ac:spMk id="2" creationId="{00000000-0000-0000-0000-000000000000}"/>
-            </ac:spMkLst>
-          </pc:spChg>
-          <pc:spChg chg="mod">
-            <ac:chgData name="Samuel Aldous" userId="0ff3eb4db5f3e0fd" providerId="LiveId" clId="{7273B22C-C245-4F33-9671-B4FF89330F8E}" dt="2025-04-17T17:57:06.280" v="4356"/>
-            <ac:spMkLst>
-              <pc:docMk/>
-              <pc:sldMasterMk cId="1639791294" sldId="2147483660"/>
-              <pc:sldLayoutMk cId="3811016800" sldId="2147483665"/>
-              <ac:spMk id="3" creationId="{00000000-0000-0000-0000-000000000000}"/>
-            </ac:spMkLst>
-          </pc:spChg>
-          <pc:spChg chg="mod">
-            <ac:chgData name="Samuel Aldous" userId="0ff3eb4db5f3e0fd" providerId="LiveId" clId="{7273B22C-C245-4F33-9671-B4FF89330F8E}" dt="2025-04-17T17:57:06.280" v="4356"/>
-            <ac:spMkLst>
-              <pc:docMk/>
-              <pc:sldMasterMk cId="1639791294" sldId="2147483660"/>
-              <pc:sldLayoutMk cId="3811016800" sldId="2147483665"/>
-              <ac:spMk id="4" creationId="{00000000-0000-0000-0000-000000000000}"/>
-            </ac:spMkLst>
-          </pc:spChg>
-          <pc:spChg chg="mod">
-            <ac:chgData name="Samuel Aldous" userId="0ff3eb4db5f3e0fd" providerId="LiveId" clId="{7273B22C-C245-4F33-9671-B4FF89330F8E}" dt="2025-04-17T17:57:06.280" v="4356"/>
-            <ac:spMkLst>
-              <pc:docMk/>
-              <pc:sldMasterMk cId="1639791294" sldId="2147483660"/>
-              <pc:sldLayoutMk cId="3811016800" sldId="2147483665"/>
-              <ac:spMk id="5" creationId="{00000000-0000-0000-0000-000000000000}"/>
-            </ac:spMkLst>
-          </pc:spChg>
-          <pc:spChg chg="mod">
-            <ac:chgData name="Samuel Aldous" userId="0ff3eb4db5f3e0fd" providerId="LiveId" clId="{7273B22C-C245-4F33-9671-B4FF89330F8E}" dt="2025-04-17T17:57:06.280" v="4356"/>
-            <ac:spMkLst>
-              <pc:docMk/>
-              <pc:sldMasterMk cId="1639791294" sldId="2147483660"/>
-              <pc:sldLayoutMk cId="3811016800" sldId="2147483665"/>
-              <ac:spMk id="6" creationId="{00000000-0000-0000-0000-000000000000}"/>
-            </ac:spMkLst>
-          </pc:spChg>
         </pc:sldLayoutChg>
         <pc:sldLayoutChg chg="modSp">
           <pc:chgData name="Samuel Aldous" userId="0ff3eb4db5f3e0fd" providerId="LiveId" clId="{7273B22C-C245-4F33-9671-B4FF89330F8E}" dt="2025-04-17T17:57:06.280" v="4356"/>
@@ -491,33 +375,6 @@
             <pc:sldMasterMk cId="1639791294" sldId="2147483660"/>
             <pc:sldLayoutMk cId="1898176345" sldId="2147483668"/>
           </pc:sldLayoutMkLst>
-          <pc:spChg chg="mod">
-            <ac:chgData name="Samuel Aldous" userId="0ff3eb4db5f3e0fd" providerId="LiveId" clId="{7273B22C-C245-4F33-9671-B4FF89330F8E}" dt="2025-04-17T17:57:06.280" v="4356"/>
-            <ac:spMkLst>
-              <pc:docMk/>
-              <pc:sldMasterMk cId="1639791294" sldId="2147483660"/>
-              <pc:sldLayoutMk cId="1898176345" sldId="2147483668"/>
-              <ac:spMk id="2" creationId="{00000000-0000-0000-0000-000000000000}"/>
-            </ac:spMkLst>
-          </pc:spChg>
-          <pc:spChg chg="mod">
-            <ac:chgData name="Samuel Aldous" userId="0ff3eb4db5f3e0fd" providerId="LiveId" clId="{7273B22C-C245-4F33-9671-B4FF89330F8E}" dt="2025-04-17T17:57:06.280" v="4356"/>
-            <ac:spMkLst>
-              <pc:docMk/>
-              <pc:sldMasterMk cId="1639791294" sldId="2147483660"/>
-              <pc:sldLayoutMk cId="1898176345" sldId="2147483668"/>
-              <ac:spMk id="3" creationId="{00000000-0000-0000-0000-000000000000}"/>
-            </ac:spMkLst>
-          </pc:spChg>
-          <pc:spChg chg="mod">
-            <ac:chgData name="Samuel Aldous" userId="0ff3eb4db5f3e0fd" providerId="LiveId" clId="{7273B22C-C245-4F33-9671-B4FF89330F8E}" dt="2025-04-17T17:57:06.280" v="4356"/>
-            <ac:spMkLst>
-              <pc:docMk/>
-              <pc:sldMasterMk cId="1639791294" sldId="2147483660"/>
-              <pc:sldLayoutMk cId="1898176345" sldId="2147483668"/>
-              <ac:spMk id="4" creationId="{00000000-0000-0000-0000-000000000000}"/>
-            </ac:spMkLst>
-          </pc:spChg>
         </pc:sldLayoutChg>
         <pc:sldLayoutChg chg="modSp">
           <pc:chgData name="Samuel Aldous" userId="0ff3eb4db5f3e0fd" providerId="LiveId" clId="{7273B22C-C245-4F33-9671-B4FF89330F8E}" dt="2025-04-17T17:57:06.280" v="4356"/>
@@ -526,33 +383,6 @@
             <pc:sldMasterMk cId="1639791294" sldId="2147483660"/>
             <pc:sldLayoutMk cId="1339397477" sldId="2147483669"/>
           </pc:sldLayoutMkLst>
-          <pc:spChg chg="mod">
-            <ac:chgData name="Samuel Aldous" userId="0ff3eb4db5f3e0fd" providerId="LiveId" clId="{7273B22C-C245-4F33-9671-B4FF89330F8E}" dt="2025-04-17T17:57:06.280" v="4356"/>
-            <ac:spMkLst>
-              <pc:docMk/>
-              <pc:sldMasterMk cId="1639791294" sldId="2147483660"/>
-              <pc:sldLayoutMk cId="1339397477" sldId="2147483669"/>
-              <ac:spMk id="2" creationId="{00000000-0000-0000-0000-000000000000}"/>
-            </ac:spMkLst>
-          </pc:spChg>
-          <pc:spChg chg="mod">
-            <ac:chgData name="Samuel Aldous" userId="0ff3eb4db5f3e0fd" providerId="LiveId" clId="{7273B22C-C245-4F33-9671-B4FF89330F8E}" dt="2025-04-17T17:57:06.280" v="4356"/>
-            <ac:spMkLst>
-              <pc:docMk/>
-              <pc:sldMasterMk cId="1639791294" sldId="2147483660"/>
-              <pc:sldLayoutMk cId="1339397477" sldId="2147483669"/>
-              <ac:spMk id="3" creationId="{00000000-0000-0000-0000-000000000000}"/>
-            </ac:spMkLst>
-          </pc:spChg>
-          <pc:spChg chg="mod">
-            <ac:chgData name="Samuel Aldous" userId="0ff3eb4db5f3e0fd" providerId="LiveId" clId="{7273B22C-C245-4F33-9671-B4FF89330F8E}" dt="2025-04-17T17:57:06.280" v="4356"/>
-            <ac:spMkLst>
-              <pc:docMk/>
-              <pc:sldMasterMk cId="1639791294" sldId="2147483660"/>
-              <pc:sldLayoutMk cId="1339397477" sldId="2147483669"/>
-              <ac:spMk id="4" creationId="{00000000-0000-0000-0000-000000000000}"/>
-            </ac:spMkLst>
-          </pc:spChg>
         </pc:sldLayoutChg>
         <pc:sldLayoutChg chg="modSp">
           <pc:chgData name="Samuel Aldous" userId="0ff3eb4db5f3e0fd" providerId="LiveId" clId="{7273B22C-C245-4F33-9671-B4FF89330F8E}" dt="2025-04-17T17:57:06.280" v="4356"/>
@@ -561,24 +391,6 @@
             <pc:sldMasterMk cId="1639791294" sldId="2147483660"/>
             <pc:sldLayoutMk cId="440341984" sldId="2147483671"/>
           </pc:sldLayoutMkLst>
-          <pc:spChg chg="mod">
-            <ac:chgData name="Samuel Aldous" userId="0ff3eb4db5f3e0fd" providerId="LiveId" clId="{7273B22C-C245-4F33-9671-B4FF89330F8E}" dt="2025-04-17T17:57:06.280" v="4356"/>
-            <ac:spMkLst>
-              <pc:docMk/>
-              <pc:sldMasterMk cId="1639791294" sldId="2147483660"/>
-              <pc:sldLayoutMk cId="440341984" sldId="2147483671"/>
-              <ac:spMk id="2" creationId="{00000000-0000-0000-0000-000000000000}"/>
-            </ac:spMkLst>
-          </pc:spChg>
-          <pc:spChg chg="mod">
-            <ac:chgData name="Samuel Aldous" userId="0ff3eb4db5f3e0fd" providerId="LiveId" clId="{7273B22C-C245-4F33-9671-B4FF89330F8E}" dt="2025-04-17T17:57:06.280" v="4356"/>
-            <ac:spMkLst>
-              <pc:docMk/>
-              <pc:sldMasterMk cId="1639791294" sldId="2147483660"/>
-              <pc:sldLayoutMk cId="440341984" sldId="2147483671"/>
-              <ac:spMk id="3" creationId="{00000000-0000-0000-0000-000000000000}"/>
-            </ac:spMkLst>
-          </pc:spChg>
         </pc:sldLayoutChg>
       </pc:sldMasterChg>
     </pc:docChg>
@@ -668,7 +480,7 @@
           <a:p>
             <a:fld id="{B5F3BB3C-60B3-4EAD-B55D-4EAADA830A78}" type="datetimeFigureOut">
               <a:rPr lang="en-GB" smtClean="0"/>
-              <a:t>17/04/2025</a:t>
+              <a:t>19/04/2025</a:t>
             </a:fld>
             <a:endParaRPr lang="en-GB"/>
           </a:p>
@@ -1245,7 +1057,7 @@
           <a:p>
             <a:fld id="{7B17242C-12C5-4BCA-8614-627256A12318}" type="datetimeFigureOut">
               <a:rPr lang="en-GB" smtClean="0"/>
-              <a:t>17/04/2025</a:t>
+              <a:t>19/04/2025</a:t>
             </a:fld>
             <a:endParaRPr lang="en-GB"/>
           </a:p>
@@ -1415,7 +1227,7 @@
           <a:p>
             <a:fld id="{7B17242C-12C5-4BCA-8614-627256A12318}" type="datetimeFigureOut">
               <a:rPr lang="en-GB" smtClean="0"/>
-              <a:t>17/04/2025</a:t>
+              <a:t>19/04/2025</a:t>
             </a:fld>
             <a:endParaRPr lang="en-GB"/>
           </a:p>
@@ -1595,7 +1407,7 @@
           <a:p>
             <a:fld id="{7B17242C-12C5-4BCA-8614-627256A12318}" type="datetimeFigureOut">
               <a:rPr lang="en-GB" smtClean="0"/>
-              <a:t>17/04/2025</a:t>
+              <a:t>19/04/2025</a:t>
             </a:fld>
             <a:endParaRPr lang="en-GB"/>
           </a:p>
@@ -1765,7 +1577,7 @@
           <a:p>
             <a:fld id="{7B17242C-12C5-4BCA-8614-627256A12318}" type="datetimeFigureOut">
               <a:rPr lang="en-GB" smtClean="0"/>
-              <a:t>17/04/2025</a:t>
+              <a:t>19/04/2025</a:t>
             </a:fld>
             <a:endParaRPr lang="en-GB"/>
           </a:p>
@@ -2011,7 +1823,7 @@
           <a:p>
             <a:fld id="{7B17242C-12C5-4BCA-8614-627256A12318}" type="datetimeFigureOut">
               <a:rPr lang="en-GB" smtClean="0"/>
-              <a:t>17/04/2025</a:t>
+              <a:t>19/04/2025</a:t>
             </a:fld>
             <a:endParaRPr lang="en-GB"/>
           </a:p>
@@ -2243,7 +2055,7 @@
           <a:p>
             <a:fld id="{7B17242C-12C5-4BCA-8614-627256A12318}" type="datetimeFigureOut">
               <a:rPr lang="en-GB" smtClean="0"/>
-              <a:t>17/04/2025</a:t>
+              <a:t>19/04/2025</a:t>
             </a:fld>
             <a:endParaRPr lang="en-GB"/>
           </a:p>
@@ -2610,7 +2422,7 @@
           <a:p>
             <a:fld id="{7B17242C-12C5-4BCA-8614-627256A12318}" type="datetimeFigureOut">
               <a:rPr lang="en-GB" smtClean="0"/>
-              <a:t>17/04/2025</a:t>
+              <a:t>19/04/2025</a:t>
             </a:fld>
             <a:endParaRPr lang="en-GB"/>
           </a:p>
@@ -2728,7 +2540,7 @@
           <a:p>
             <a:fld id="{7B17242C-12C5-4BCA-8614-627256A12318}" type="datetimeFigureOut">
               <a:rPr lang="en-GB" smtClean="0"/>
-              <a:t>17/04/2025</a:t>
+              <a:t>19/04/2025</a:t>
             </a:fld>
             <a:endParaRPr lang="en-GB"/>
           </a:p>
@@ -2823,7 +2635,7 @@
           <a:p>
             <a:fld id="{7B17242C-12C5-4BCA-8614-627256A12318}" type="datetimeFigureOut">
               <a:rPr lang="en-GB" smtClean="0"/>
-              <a:t>17/04/2025</a:t>
+              <a:t>19/04/2025</a:t>
             </a:fld>
             <a:endParaRPr lang="en-GB"/>
           </a:p>
@@ -3100,7 +2912,7 @@
           <a:p>
             <a:fld id="{7B17242C-12C5-4BCA-8614-627256A12318}" type="datetimeFigureOut">
               <a:rPr lang="en-GB" smtClean="0"/>
-              <a:t>17/04/2025</a:t>
+              <a:t>19/04/2025</a:t>
             </a:fld>
             <a:endParaRPr lang="en-GB"/>
           </a:p>
@@ -3357,7 +3169,7 @@
           <a:p>
             <a:fld id="{7B17242C-12C5-4BCA-8614-627256A12318}" type="datetimeFigureOut">
               <a:rPr lang="en-GB" smtClean="0"/>
-              <a:t>17/04/2025</a:t>
+              <a:t>19/04/2025</a:t>
             </a:fld>
             <a:endParaRPr lang="en-GB"/>
           </a:p>
@@ -3570,7 +3382,7 @@
           <a:p>
             <a:fld id="{7B17242C-12C5-4BCA-8614-627256A12318}" type="datetimeFigureOut">
               <a:rPr lang="en-GB" smtClean="0"/>
-              <a:t>17/04/2025</a:t>
+              <a:t>19/04/2025</a:t>
             </a:fld>
             <a:endParaRPr lang="en-GB"/>
           </a:p>
@@ -4776,7 +4588,7 @@
         <p:spPr>
           <a:xfrm>
             <a:off x="1143000" y="5344162"/>
-            <a:ext cx="9906000" cy="646331"/>
+            <a:ext cx="9906000" cy="923330"/>
           </a:xfrm>
           <a:prstGeom prst="rect">
             <a:avLst/>
@@ -4804,6 +4616,13 @@
               <a:t>. </a:t>
             </a:r>
             <a:r>
+              <a:rPr lang="en-GB" b="1" dirty="0">
+                <a:latin typeface="Arial" panose="020B0604020202020204" pitchFamily="34" charset="0"/>
+                <a:cs typeface="Arial" panose="020B0604020202020204" pitchFamily="34" charset="0"/>
+              </a:rPr>
+              <a:t>A </a:t>
+            </a:r>
+            <a:r>
               <a:rPr lang="en-GB" dirty="0">
                 <a:latin typeface="Arial" panose="020B0604020202020204" pitchFamily="34" charset="0"/>
                 <a:ea typeface="Aptos" panose="020B0004020202020204" pitchFamily="34" charset="0"/>
@@ -4831,10 +4650,27 @@
               </a:rPr>
               <a:t>X dimensionality reduction method paired with K-means</a:t>
             </a:r>
-            <a:endParaRPr lang="en-GB" dirty="0">
-              <a:latin typeface="Arial" panose="020B0604020202020204" pitchFamily="34" charset="0"/>
-              <a:cs typeface="Arial" panose="020B0604020202020204" pitchFamily="34" charset="0"/>
-            </a:endParaRPr>
+            <a:r>
+              <a:rPr lang="en-GB" dirty="0">
+                <a:latin typeface="Arial" panose="020B0604020202020204" pitchFamily="34" charset="0"/>
+                <a:ea typeface="Aptos" panose="020B0004020202020204" pitchFamily="34" charset="0"/>
+              </a:rPr>
+              <a:t>. </a:t>
+            </a:r>
+            <a:r>
+              <a:rPr lang="en-GB" b="1" dirty="0">
+                <a:latin typeface="Arial" panose="020B0604020202020204" pitchFamily="34" charset="0"/>
+                <a:ea typeface="Aptos" panose="020B0004020202020204" pitchFamily="34" charset="0"/>
+              </a:rPr>
+              <a:t>B </a:t>
+            </a:r>
+            <a:r>
+              <a:rPr lang="en-GB" dirty="0">
+                <a:latin typeface="Arial" panose="020B0604020202020204" pitchFamily="34" charset="0"/>
+                <a:cs typeface="Arial" panose="020B0604020202020204" pitchFamily="34" charset="0"/>
+              </a:rPr>
+              <a:t>Box plot comparing the number sequences per centroid</a:t>
+            </a:r>
           </a:p>
         </p:txBody>
       </p:sp>
@@ -4873,7 +4709,7 @@
           <p:cNvPr id="2" name="TextBox 1">
             <a:extLst>
               <a:ext uri="{FF2B5EF4-FFF2-40B4-BE49-F238E27FC236}">
-                <a16:creationId xmlns:a16="http://schemas.microsoft.com/office/drawing/2014/main" id="{A2883001-A74A-9EC1-EAFB-163BE374828F}"/>
+                <a16:creationId xmlns:a16="http://schemas.microsoft.com/office/drawing/2014/main" id="{A8389FEB-A693-BCAD-76FA-27FB4DFEF374}"/>
               </a:ext>
             </a:extLst>
           </p:cNvPr>
@@ -4882,8 +4718,8 @@
         </p:nvSpPr>
         <p:spPr>
           <a:xfrm>
-            <a:off x="924560" y="5344160"/>
-            <a:ext cx="10891520" cy="369332"/>
+            <a:off x="1188720" y="4978400"/>
+            <a:ext cx="9611360" cy="923330"/>
           </a:xfrm>
           <a:prstGeom prst="rect">
             <a:avLst/>
@@ -4901,15 +4737,42 @@
                 <a:latin typeface="Arial" panose="020B0604020202020204" pitchFamily="34" charset="0"/>
                 <a:cs typeface="Arial" panose="020B0604020202020204" pitchFamily="34" charset="0"/>
               </a:rPr>
-              <a:t>Figure 7.</a:t>
-            </a:r>
-            <a:r>
-              <a:rPr lang="en-GB" dirty="0">
-                <a:latin typeface="Arial" panose="020B0604020202020204" pitchFamily="34" charset="0"/>
+              <a:t>Figure 7. </a:t>
+            </a:r>
+            <a:r>
+              <a:rPr lang="en-GB" sz="1800" kern="100" dirty="0">
+                <a:effectLst/>
+                <a:latin typeface="Arial" panose="020B0604020202020204" pitchFamily="34" charset="0"/>
+                <a:ea typeface="Aptos" panose="020B0004020202020204" pitchFamily="34" charset="0"/>
                 <a:cs typeface="Arial" panose="020B0604020202020204" pitchFamily="34" charset="0"/>
               </a:rPr>
-              <a:t> Box plots of the number sequences per centroid</a:t>
-            </a:r>
+              <a:t>Cluster evolution over time</a:t>
+            </a:r>
+            <a:r>
+              <a:rPr lang="en-GB" kern="100" dirty="0">
+                <a:latin typeface="Arial" panose="020B0604020202020204" pitchFamily="34" charset="0"/>
+                <a:ea typeface="Aptos" panose="020B0004020202020204" pitchFamily="34" charset="0"/>
+                <a:cs typeface="Arial" panose="020B0604020202020204" pitchFamily="34" charset="0"/>
+              </a:rPr>
+              <a:t>. A </a:t>
+            </a:r>
+            <a:r>
+              <a:rPr lang="en-GB" sz="1800" kern="100" dirty="0">
+                <a:effectLst/>
+                <a:latin typeface="Arial" panose="020B0604020202020204" pitchFamily="34" charset="0"/>
+                <a:ea typeface="Aptos" panose="020B0004020202020204" pitchFamily="34" charset="0"/>
+                <a:cs typeface="Arial" panose="020B0604020202020204" pitchFamily="34" charset="0"/>
+              </a:rPr>
+              <a:t>scatter plot clusters over time, will show the evolution of the clusters, what clusters share the same root</a:t>
+            </a:r>
+            <a:endParaRPr lang="en-GB" sz="1800" kern="100" dirty="0">
+              <a:effectLst/>
+              <a:latin typeface="Aptos" panose="020B0004020202020204" pitchFamily="34" charset="0"/>
+              <a:ea typeface="Aptos" panose="020B0004020202020204" pitchFamily="34" charset="0"/>
+              <a:cs typeface="Arial" panose="020B0604020202020204" pitchFamily="34" charset="0"/>
+            </a:endParaRPr>
+          </a:p>
+          <a:p>
             <a:endParaRPr lang="en-GB" b="1" dirty="0">
               <a:latin typeface="Arial" panose="020B0604020202020204" pitchFamily="34" charset="0"/>
               <a:cs typeface="Arial" panose="020B0604020202020204" pitchFamily="34" charset="0"/>
@@ -4920,7 +4783,7 @@
     </p:spTree>
     <p:extLst>
       <p:ext uri="{BB962C8B-B14F-4D97-AF65-F5344CB8AC3E}">
-        <p14:creationId xmlns:p14="http://schemas.microsoft.com/office/powerpoint/2010/main" val="1233152676"/>
+        <p14:creationId xmlns:p14="http://schemas.microsoft.com/office/powerpoint/2010/main" val="2480000070"/>
       </p:ext>
     </p:extLst>
   </p:cSld>
@@ -4952,7 +4815,7 @@
           <p:cNvPr id="2" name="TextBox 1">
             <a:extLst>
               <a:ext uri="{FF2B5EF4-FFF2-40B4-BE49-F238E27FC236}">
-                <a16:creationId xmlns:a16="http://schemas.microsoft.com/office/drawing/2014/main" id="{A8389FEB-A693-BCAD-76FA-27FB4DFEF374}"/>
+                <a16:creationId xmlns:a16="http://schemas.microsoft.com/office/drawing/2014/main" id="{C35AEC6F-DF4C-E153-C994-06805D4263D7}"/>
               </a:ext>
             </a:extLst>
           </p:cNvPr>
@@ -4961,8 +4824,8 @@
         </p:nvSpPr>
         <p:spPr>
           <a:xfrm>
-            <a:off x="1188720" y="4978400"/>
-            <a:ext cx="9611360" cy="923330"/>
+            <a:off x="1198880" y="5039360"/>
+            <a:ext cx="9692640" cy="923330"/>
           </a:xfrm>
           <a:prstGeom prst="rect">
             <a:avLst/>
@@ -4980,25 +4843,15 @@
                 <a:latin typeface="Arial" panose="020B0604020202020204" pitchFamily="34" charset="0"/>
                 <a:cs typeface="Arial" panose="020B0604020202020204" pitchFamily="34" charset="0"/>
               </a:rPr>
-              <a:t>Figure 8. </a:t>
-            </a:r>
-            <a:r>
-              <a:rPr lang="en-GB" sz="1800" kern="100" dirty="0">
-                <a:effectLst/>
-                <a:latin typeface="Arial" panose="020B0604020202020204" pitchFamily="34" charset="0"/>
-                <a:ea typeface="Aptos" panose="020B0004020202020204" pitchFamily="34" charset="0"/>
+              <a:t>Figure 8.</a:t>
+            </a:r>
+            <a:r>
+              <a:rPr lang="en-GB" dirty="0">
+                <a:latin typeface="Arial" panose="020B0604020202020204" pitchFamily="34" charset="0"/>
                 <a:cs typeface="Arial" panose="020B0604020202020204" pitchFamily="34" charset="0"/>
               </a:rPr>
-              <a:t>Cluster evolution over time, scatter plot clusters over time, will show the evolution of the clusters, what clusters share the same root</a:t>
-            </a:r>
-            <a:endParaRPr lang="en-GB" sz="1800" kern="100" dirty="0">
-              <a:effectLst/>
-              <a:latin typeface="Aptos" panose="020B0004020202020204" pitchFamily="34" charset="0"/>
-              <a:ea typeface="Aptos" panose="020B0004020202020204" pitchFamily="34" charset="0"/>
-              <a:cs typeface="Arial" panose="020B0604020202020204" pitchFamily="34" charset="0"/>
-            </a:endParaRPr>
-          </a:p>
-          <a:p>
+              <a:t> Map of clusters across the regions of UK. Map was generated using R. Each country is coloured according to the dominant cluster. No data was available for Northern Ireland, which has been coloured white.</a:t>
+            </a:r>
             <a:endParaRPr lang="en-GB" b="1" dirty="0">
               <a:latin typeface="Arial" panose="020B0604020202020204" pitchFamily="34" charset="0"/>
               <a:cs typeface="Arial" panose="020B0604020202020204" pitchFamily="34" charset="0"/>
@@ -5009,7 +4862,7 @@
     </p:spTree>
     <p:extLst>
       <p:ext uri="{BB962C8B-B14F-4D97-AF65-F5344CB8AC3E}">
-        <p14:creationId xmlns:p14="http://schemas.microsoft.com/office/powerpoint/2010/main" val="2480000070"/>
+        <p14:creationId xmlns:p14="http://schemas.microsoft.com/office/powerpoint/2010/main" val="1010243734"/>
       </p:ext>
     </p:extLst>
   </p:cSld>
@@ -5041,7 +4894,7 @@
           <p:cNvPr id="2" name="TextBox 1">
             <a:extLst>
               <a:ext uri="{FF2B5EF4-FFF2-40B4-BE49-F238E27FC236}">
-                <a16:creationId xmlns:a16="http://schemas.microsoft.com/office/drawing/2014/main" id="{C35AEC6F-DF4C-E153-C994-06805D4263D7}"/>
+                <a16:creationId xmlns:a16="http://schemas.microsoft.com/office/drawing/2014/main" id="{124A81C1-5794-6FCB-B678-5F86D3EBF6A7}"/>
               </a:ext>
             </a:extLst>
           </p:cNvPr>
@@ -5050,8 +4903,8 @@
         </p:nvSpPr>
         <p:spPr>
           <a:xfrm>
-            <a:off x="1198880" y="5039360"/>
-            <a:ext cx="9692640" cy="369332"/>
+            <a:off x="1036321" y="4937529"/>
+            <a:ext cx="10109200" cy="646331"/>
           </a:xfrm>
           <a:prstGeom prst="rect">
             <a:avLst/>
@@ -5076,7 +4929,7 @@
                 <a:latin typeface="Arial" panose="020B0604020202020204" pitchFamily="34" charset="0"/>
                 <a:cs typeface="Arial" panose="020B0604020202020204" pitchFamily="34" charset="0"/>
               </a:rPr>
-              <a:t> Map of clusters across the UK</a:t>
+              <a:t> 3D visualisation of spike glycoprotein binding to human ACE2 receptor. RBD residues have been coloured X and RBM residues have been coloured Y.</a:t>
             </a:r>
             <a:endParaRPr lang="en-GB" b="1" dirty="0">
               <a:latin typeface="Arial" panose="020B0604020202020204" pitchFamily="34" charset="0"/>
@@ -5085,10 +4938,48 @@
           </a:p>
         </p:txBody>
       </p:sp>
+      <p:sp>
+        <p:nvSpPr>
+          <p:cNvPr id="3" name="TextBox 2">
+            <a:extLst>
+              <a:ext uri="{FF2B5EF4-FFF2-40B4-BE49-F238E27FC236}">
+                <a16:creationId xmlns:a16="http://schemas.microsoft.com/office/drawing/2014/main" id="{A9109258-3398-4635-1FA2-130A2FF0F760}"/>
+              </a:ext>
+            </a:extLst>
+          </p:cNvPr>
+          <p:cNvSpPr txBox="1"/>
+          <p:nvPr/>
+        </p:nvSpPr>
+        <p:spPr>
+          <a:xfrm>
+            <a:off x="2867891" y="987136"/>
+            <a:ext cx="6400800" cy="646331"/>
+          </a:xfrm>
+          <a:prstGeom prst="rect">
+            <a:avLst/>
+          </a:prstGeom>
+          <a:noFill/>
+        </p:spPr>
+        <p:txBody>
+          <a:bodyPr wrap="square" rtlCol="0">
+            <a:spAutoFit/>
+          </a:bodyPr>
+          <a:lstStyle/>
+          <a:p>
+            <a:r>
+              <a:rPr lang="en-GB">
+                <a:hlinkClick r:id="rId2"/>
+              </a:rPr>
+              <a:t>RCSB PDB - 6M0J: Crystal structure of SARS-CoV-2 spike receptor-binding domain bound with ACE2</a:t>
+            </a:r>
+            <a:endParaRPr lang="en-GB" dirty="0"/>
+          </a:p>
+        </p:txBody>
+      </p:sp>
     </p:spTree>
     <p:extLst>
       <p:ext uri="{BB962C8B-B14F-4D97-AF65-F5344CB8AC3E}">
-        <p14:creationId xmlns:p14="http://schemas.microsoft.com/office/powerpoint/2010/main" val="1010243734"/>
+        <p14:creationId xmlns:p14="http://schemas.microsoft.com/office/powerpoint/2010/main" val="2984588856"/>
       </p:ext>
     </p:extLst>
   </p:cSld>

</xml_diff>

<commit_message>
UMAP and report outline work
</commit_message>
<xml_diff>
--- a/Plots and Figures/Real plots and figures/Completed figures with captions.pptx
+++ b/Plots and Figures/Real plots and figures/Completed figures with captions.pptx
@@ -480,7 +480,7 @@
           <a:p>
             <a:fld id="{B5F3BB3C-60B3-4EAD-B55D-4EAADA830A78}" type="datetimeFigureOut">
               <a:rPr lang="en-GB" smtClean="0"/>
-              <a:t>19/04/2025</a:t>
+              <a:t>22/04/2025</a:t>
             </a:fld>
             <a:endParaRPr lang="en-GB"/>
           </a:p>
@@ -1057,7 +1057,7 @@
           <a:p>
             <a:fld id="{7B17242C-12C5-4BCA-8614-627256A12318}" type="datetimeFigureOut">
               <a:rPr lang="en-GB" smtClean="0"/>
-              <a:t>19/04/2025</a:t>
+              <a:t>22/04/2025</a:t>
             </a:fld>
             <a:endParaRPr lang="en-GB"/>
           </a:p>
@@ -1227,7 +1227,7 @@
           <a:p>
             <a:fld id="{7B17242C-12C5-4BCA-8614-627256A12318}" type="datetimeFigureOut">
               <a:rPr lang="en-GB" smtClean="0"/>
-              <a:t>19/04/2025</a:t>
+              <a:t>22/04/2025</a:t>
             </a:fld>
             <a:endParaRPr lang="en-GB"/>
           </a:p>
@@ -1407,7 +1407,7 @@
           <a:p>
             <a:fld id="{7B17242C-12C5-4BCA-8614-627256A12318}" type="datetimeFigureOut">
               <a:rPr lang="en-GB" smtClean="0"/>
-              <a:t>19/04/2025</a:t>
+              <a:t>22/04/2025</a:t>
             </a:fld>
             <a:endParaRPr lang="en-GB"/>
           </a:p>
@@ -1577,7 +1577,7 @@
           <a:p>
             <a:fld id="{7B17242C-12C5-4BCA-8614-627256A12318}" type="datetimeFigureOut">
               <a:rPr lang="en-GB" smtClean="0"/>
-              <a:t>19/04/2025</a:t>
+              <a:t>22/04/2025</a:t>
             </a:fld>
             <a:endParaRPr lang="en-GB"/>
           </a:p>
@@ -1823,7 +1823,7 @@
           <a:p>
             <a:fld id="{7B17242C-12C5-4BCA-8614-627256A12318}" type="datetimeFigureOut">
               <a:rPr lang="en-GB" smtClean="0"/>
-              <a:t>19/04/2025</a:t>
+              <a:t>22/04/2025</a:t>
             </a:fld>
             <a:endParaRPr lang="en-GB"/>
           </a:p>
@@ -2055,7 +2055,7 @@
           <a:p>
             <a:fld id="{7B17242C-12C5-4BCA-8614-627256A12318}" type="datetimeFigureOut">
               <a:rPr lang="en-GB" smtClean="0"/>
-              <a:t>19/04/2025</a:t>
+              <a:t>22/04/2025</a:t>
             </a:fld>
             <a:endParaRPr lang="en-GB"/>
           </a:p>
@@ -2422,7 +2422,7 @@
           <a:p>
             <a:fld id="{7B17242C-12C5-4BCA-8614-627256A12318}" type="datetimeFigureOut">
               <a:rPr lang="en-GB" smtClean="0"/>
-              <a:t>19/04/2025</a:t>
+              <a:t>22/04/2025</a:t>
             </a:fld>
             <a:endParaRPr lang="en-GB"/>
           </a:p>
@@ -2540,7 +2540,7 @@
           <a:p>
             <a:fld id="{7B17242C-12C5-4BCA-8614-627256A12318}" type="datetimeFigureOut">
               <a:rPr lang="en-GB" smtClean="0"/>
-              <a:t>19/04/2025</a:t>
+              <a:t>22/04/2025</a:t>
             </a:fld>
             <a:endParaRPr lang="en-GB"/>
           </a:p>
@@ -2635,7 +2635,7 @@
           <a:p>
             <a:fld id="{7B17242C-12C5-4BCA-8614-627256A12318}" type="datetimeFigureOut">
               <a:rPr lang="en-GB" smtClean="0"/>
-              <a:t>19/04/2025</a:t>
+              <a:t>22/04/2025</a:t>
             </a:fld>
             <a:endParaRPr lang="en-GB"/>
           </a:p>
@@ -2912,7 +2912,7 @@
           <a:p>
             <a:fld id="{7B17242C-12C5-4BCA-8614-627256A12318}" type="datetimeFigureOut">
               <a:rPr lang="en-GB" smtClean="0"/>
-              <a:t>19/04/2025</a:t>
+              <a:t>22/04/2025</a:t>
             </a:fld>
             <a:endParaRPr lang="en-GB"/>
           </a:p>
@@ -3169,7 +3169,7 @@
           <a:p>
             <a:fld id="{7B17242C-12C5-4BCA-8614-627256A12318}" type="datetimeFigureOut">
               <a:rPr lang="en-GB" smtClean="0"/>
-              <a:t>19/04/2025</a:t>
+              <a:t>22/04/2025</a:t>
             </a:fld>
             <a:endParaRPr lang="en-GB"/>
           </a:p>
@@ -3382,7 +3382,7 @@
           <a:p>
             <a:fld id="{7B17242C-12C5-4BCA-8614-627256A12318}" type="datetimeFigureOut">
               <a:rPr lang="en-GB" smtClean="0"/>
-              <a:t>19/04/2025</a:t>
+              <a:t>22/04/2025</a:t>
             </a:fld>
             <a:endParaRPr lang="en-GB"/>
           </a:p>
@@ -4306,8 +4306,8 @@
         </p:nvSpPr>
         <p:spPr>
           <a:xfrm>
-            <a:off x="1143000" y="5601812"/>
-            <a:ext cx="9906000" cy="954107"/>
+            <a:off x="1622394" y="5814505"/>
+            <a:ext cx="9906000" cy="600164"/>
           </a:xfrm>
           <a:prstGeom prst="rect">
             <a:avLst/>
@@ -4321,75 +4321,104 @@
           <a:lstStyle/>
           <a:p>
             <a:r>
-              <a:rPr lang="en-GB" sz="1400" b="1" dirty="0">
+              <a:rPr lang="en-GB" sz="1100" b="1" dirty="0">
                 <a:latin typeface="Arial" panose="020B0604020202020204" pitchFamily="34" charset="0"/>
                 <a:cs typeface="Arial" panose="020B0604020202020204" pitchFamily="34" charset="0"/>
               </a:rPr>
               <a:t>Figure 4.</a:t>
             </a:r>
             <a:r>
-              <a:rPr lang="en-GB" sz="1400" dirty="0">
+              <a:rPr lang="en-GB" sz="1100" dirty="0">
                 <a:latin typeface="Arial" panose="020B0604020202020204" pitchFamily="34" charset="0"/>
                 <a:cs typeface="Arial" panose="020B0604020202020204" pitchFamily="34" charset="0"/>
               </a:rPr>
               <a:t> Elbow plots.</a:t>
             </a:r>
             <a:r>
-              <a:rPr lang="en-US" sz="1400" dirty="0">
+              <a:rPr lang="en-US" sz="1100" dirty="0">
                 <a:latin typeface="Arial" panose="020B0604020202020204" pitchFamily="34" charset="0"/>
                 <a:cs typeface="Arial" panose="020B0604020202020204" pitchFamily="34" charset="0"/>
               </a:rPr>
               <a:t> The optimal number of clusters is shown as the turning point in the in the elbow plots.</a:t>
             </a:r>
             <a:r>
-              <a:rPr lang="en-GB" sz="1400" dirty="0">
+              <a:rPr lang="en-GB" sz="1100" dirty="0">
                 <a:latin typeface="Arial" panose="020B0604020202020204" pitchFamily="34" charset="0"/>
                 <a:cs typeface="Arial" panose="020B0604020202020204" pitchFamily="34" charset="0"/>
               </a:rPr>
               <a:t> Within cluster sum of squares of the PCA assisted K-means clustering. </a:t>
             </a:r>
             <a:r>
-              <a:rPr lang="en-GB" sz="1400" b="1" dirty="0">
+              <a:rPr lang="en-GB" sz="1100" b="1" dirty="0">
                 <a:latin typeface="Arial" panose="020B0604020202020204" pitchFamily="34" charset="0"/>
                 <a:cs typeface="Arial" panose="020B0604020202020204" pitchFamily="34" charset="0"/>
               </a:rPr>
               <a:t>A</a:t>
             </a:r>
             <a:r>
-              <a:rPr lang="en-GB" sz="1400" dirty="0">
+              <a:rPr lang="en-GB" sz="1100" dirty="0">
                 <a:latin typeface="Arial" panose="020B0604020202020204" pitchFamily="34" charset="0"/>
                 <a:cs typeface="Arial" panose="020B0604020202020204" pitchFamily="34" charset="0"/>
               </a:rPr>
               <a:t> PC1 and PC2, </a:t>
             </a:r>
             <a:r>
-              <a:rPr lang="en-US" sz="1400" dirty="0">
+              <a:rPr lang="en-US" sz="1100" dirty="0">
                 <a:latin typeface="Arial" panose="020B0604020202020204" pitchFamily="34" charset="0"/>
                 <a:cs typeface="Arial" panose="020B0604020202020204" pitchFamily="34" charset="0"/>
               </a:rPr>
               <a:t>then K-means for 1000 most common mutations on a log10 scale. </a:t>
             </a:r>
             <a:r>
-              <a:rPr lang="en-US" sz="1400" b="1" dirty="0">
+              <a:rPr lang="en-US" sz="1100" b="1" dirty="0">
                 <a:latin typeface="Arial" panose="020B0604020202020204" pitchFamily="34" charset="0"/>
                 <a:cs typeface="Arial" panose="020B0604020202020204" pitchFamily="34" charset="0"/>
               </a:rPr>
               <a:t>B</a:t>
             </a:r>
             <a:r>
-              <a:rPr lang="en-US" sz="1400" dirty="0">
+              <a:rPr lang="en-US" sz="1100" dirty="0">
                 <a:latin typeface="Arial" panose="020B0604020202020204" pitchFamily="34" charset="0"/>
                 <a:cs typeface="Arial" panose="020B0604020202020204" pitchFamily="34" charset="0"/>
               </a:rPr>
               <a:t> PC1:PC9, followed by K-means for the 1000 most common mutations on a log10 scale. From the elbow method, the optimal number of clusters ranges </a:t>
             </a:r>
-            <a:endParaRPr lang="en-GB" sz="1400" b="1" dirty="0">
+            <a:endParaRPr lang="en-GB" sz="1100" b="1" dirty="0">
               <a:latin typeface="Arial" panose="020B0604020202020204" pitchFamily="34" charset="0"/>
               <a:cs typeface="Arial" panose="020B0604020202020204" pitchFamily="34" charset="0"/>
             </a:endParaRPr>
           </a:p>
         </p:txBody>
       </p:sp>
+      <p:pic>
+        <p:nvPicPr>
+          <p:cNvPr id="3" name="Picture 2">
+            <a:extLst>
+              <a:ext uri="{FF2B5EF4-FFF2-40B4-BE49-F238E27FC236}">
+                <a16:creationId xmlns:a16="http://schemas.microsoft.com/office/drawing/2014/main" id="{05B7775C-8D23-4687-8927-519614192944}"/>
+              </a:ext>
+            </a:extLst>
+          </p:cNvPr>
+          <p:cNvPicPr>
+            <a:picLocks noChangeAspect="1"/>
+          </p:cNvPicPr>
+          <p:nvPr/>
+        </p:nvPicPr>
+        <p:blipFill rotWithShape="1">
+          <a:blip r:embed="rId2"/>
+          <a:srcRect r="3024" b="3339"/>
+          <a:stretch/>
+        </p:blipFill>
+        <p:spPr>
+          <a:xfrm>
+            <a:off x="0" y="0"/>
+            <a:ext cx="12119190" cy="5548544"/>
+          </a:xfrm>
+          <a:prstGeom prst="rect">
+            <a:avLst/>
+          </a:prstGeom>
+        </p:spPr>
+      </p:pic>
     </p:spTree>
     <p:extLst>
       <p:ext uri="{BB962C8B-B14F-4D97-AF65-F5344CB8AC3E}">

</xml_diff>

<commit_message>
UMAP visualisation and report outline
</commit_message>
<xml_diff>
--- a/Plots and Figures/Real plots and figures/Completed figures with captions.pptx
+++ b/Plots and Figures/Real plots and figures/Completed figures with captions.pptx
@@ -480,7 +480,7 @@
           <a:p>
             <a:fld id="{B5F3BB3C-60B3-4EAD-B55D-4EAADA830A78}" type="datetimeFigureOut">
               <a:rPr lang="en-GB" smtClean="0"/>
-              <a:t>22/04/2025</a:t>
+              <a:t>23/04/2025</a:t>
             </a:fld>
             <a:endParaRPr lang="en-GB"/>
           </a:p>
@@ -1057,7 +1057,7 @@
           <a:p>
             <a:fld id="{7B17242C-12C5-4BCA-8614-627256A12318}" type="datetimeFigureOut">
               <a:rPr lang="en-GB" smtClean="0"/>
-              <a:t>22/04/2025</a:t>
+              <a:t>23/04/2025</a:t>
             </a:fld>
             <a:endParaRPr lang="en-GB"/>
           </a:p>
@@ -1227,7 +1227,7 @@
           <a:p>
             <a:fld id="{7B17242C-12C5-4BCA-8614-627256A12318}" type="datetimeFigureOut">
               <a:rPr lang="en-GB" smtClean="0"/>
-              <a:t>22/04/2025</a:t>
+              <a:t>23/04/2025</a:t>
             </a:fld>
             <a:endParaRPr lang="en-GB"/>
           </a:p>
@@ -1407,7 +1407,7 @@
           <a:p>
             <a:fld id="{7B17242C-12C5-4BCA-8614-627256A12318}" type="datetimeFigureOut">
               <a:rPr lang="en-GB" smtClean="0"/>
-              <a:t>22/04/2025</a:t>
+              <a:t>23/04/2025</a:t>
             </a:fld>
             <a:endParaRPr lang="en-GB"/>
           </a:p>
@@ -1577,7 +1577,7 @@
           <a:p>
             <a:fld id="{7B17242C-12C5-4BCA-8614-627256A12318}" type="datetimeFigureOut">
               <a:rPr lang="en-GB" smtClean="0"/>
-              <a:t>22/04/2025</a:t>
+              <a:t>23/04/2025</a:t>
             </a:fld>
             <a:endParaRPr lang="en-GB"/>
           </a:p>
@@ -1823,7 +1823,7 @@
           <a:p>
             <a:fld id="{7B17242C-12C5-4BCA-8614-627256A12318}" type="datetimeFigureOut">
               <a:rPr lang="en-GB" smtClean="0"/>
-              <a:t>22/04/2025</a:t>
+              <a:t>23/04/2025</a:t>
             </a:fld>
             <a:endParaRPr lang="en-GB"/>
           </a:p>
@@ -2055,7 +2055,7 @@
           <a:p>
             <a:fld id="{7B17242C-12C5-4BCA-8614-627256A12318}" type="datetimeFigureOut">
               <a:rPr lang="en-GB" smtClean="0"/>
-              <a:t>22/04/2025</a:t>
+              <a:t>23/04/2025</a:t>
             </a:fld>
             <a:endParaRPr lang="en-GB"/>
           </a:p>
@@ -2422,7 +2422,7 @@
           <a:p>
             <a:fld id="{7B17242C-12C5-4BCA-8614-627256A12318}" type="datetimeFigureOut">
               <a:rPr lang="en-GB" smtClean="0"/>
-              <a:t>22/04/2025</a:t>
+              <a:t>23/04/2025</a:t>
             </a:fld>
             <a:endParaRPr lang="en-GB"/>
           </a:p>
@@ -2540,7 +2540,7 @@
           <a:p>
             <a:fld id="{7B17242C-12C5-4BCA-8614-627256A12318}" type="datetimeFigureOut">
               <a:rPr lang="en-GB" smtClean="0"/>
-              <a:t>22/04/2025</a:t>
+              <a:t>23/04/2025</a:t>
             </a:fld>
             <a:endParaRPr lang="en-GB"/>
           </a:p>
@@ -2635,7 +2635,7 @@
           <a:p>
             <a:fld id="{7B17242C-12C5-4BCA-8614-627256A12318}" type="datetimeFigureOut">
               <a:rPr lang="en-GB" smtClean="0"/>
-              <a:t>22/04/2025</a:t>
+              <a:t>23/04/2025</a:t>
             </a:fld>
             <a:endParaRPr lang="en-GB"/>
           </a:p>
@@ -2912,7 +2912,7 @@
           <a:p>
             <a:fld id="{7B17242C-12C5-4BCA-8614-627256A12318}" type="datetimeFigureOut">
               <a:rPr lang="en-GB" smtClean="0"/>
-              <a:t>22/04/2025</a:t>
+              <a:t>23/04/2025</a:t>
             </a:fld>
             <a:endParaRPr lang="en-GB"/>
           </a:p>
@@ -3169,7 +3169,7 @@
           <a:p>
             <a:fld id="{7B17242C-12C5-4BCA-8614-627256A12318}" type="datetimeFigureOut">
               <a:rPr lang="en-GB" smtClean="0"/>
-              <a:t>22/04/2025</a:t>
+              <a:t>23/04/2025</a:t>
             </a:fld>
             <a:endParaRPr lang="en-GB"/>
           </a:p>
@@ -3382,7 +3382,7 @@
           <a:p>
             <a:fld id="{7B17242C-12C5-4BCA-8614-627256A12318}" type="datetimeFigureOut">
               <a:rPr lang="en-GB" smtClean="0"/>
-              <a:t>22/04/2025</a:t>
+              <a:t>23/04/2025</a:t>
             </a:fld>
             <a:endParaRPr lang="en-GB"/>
           </a:p>

</xml_diff>

<commit_message>
Trying to sort out git
</commit_message>
<xml_diff>
--- a/Plots and Figures/Real plots and figures/Completed figures with captions.pptx
+++ b/Plots and Figures/Real plots and figures/Completed figures with captions.pptx
@@ -480,7 +480,7 @@
           <a:p>
             <a:fld id="{B5F3BB3C-60B3-4EAD-B55D-4EAADA830A78}" type="datetimeFigureOut">
               <a:rPr lang="en-GB" smtClean="0"/>
-              <a:t>23/04/2025</a:t>
+              <a:t>24/04/2025</a:t>
             </a:fld>
             <a:endParaRPr lang="en-GB"/>
           </a:p>
@@ -1057,7 +1057,7 @@
           <a:p>
             <a:fld id="{7B17242C-12C5-4BCA-8614-627256A12318}" type="datetimeFigureOut">
               <a:rPr lang="en-GB" smtClean="0"/>
-              <a:t>23/04/2025</a:t>
+              <a:t>24/04/2025</a:t>
             </a:fld>
             <a:endParaRPr lang="en-GB"/>
           </a:p>
@@ -1227,7 +1227,7 @@
           <a:p>
             <a:fld id="{7B17242C-12C5-4BCA-8614-627256A12318}" type="datetimeFigureOut">
               <a:rPr lang="en-GB" smtClean="0"/>
-              <a:t>23/04/2025</a:t>
+              <a:t>24/04/2025</a:t>
             </a:fld>
             <a:endParaRPr lang="en-GB"/>
           </a:p>
@@ -1407,7 +1407,7 @@
           <a:p>
             <a:fld id="{7B17242C-12C5-4BCA-8614-627256A12318}" type="datetimeFigureOut">
               <a:rPr lang="en-GB" smtClean="0"/>
-              <a:t>23/04/2025</a:t>
+              <a:t>24/04/2025</a:t>
             </a:fld>
             <a:endParaRPr lang="en-GB"/>
           </a:p>
@@ -1577,7 +1577,7 @@
           <a:p>
             <a:fld id="{7B17242C-12C5-4BCA-8614-627256A12318}" type="datetimeFigureOut">
               <a:rPr lang="en-GB" smtClean="0"/>
-              <a:t>23/04/2025</a:t>
+              <a:t>24/04/2025</a:t>
             </a:fld>
             <a:endParaRPr lang="en-GB"/>
           </a:p>
@@ -1823,7 +1823,7 @@
           <a:p>
             <a:fld id="{7B17242C-12C5-4BCA-8614-627256A12318}" type="datetimeFigureOut">
               <a:rPr lang="en-GB" smtClean="0"/>
-              <a:t>23/04/2025</a:t>
+              <a:t>24/04/2025</a:t>
             </a:fld>
             <a:endParaRPr lang="en-GB"/>
           </a:p>
@@ -2055,7 +2055,7 @@
           <a:p>
             <a:fld id="{7B17242C-12C5-4BCA-8614-627256A12318}" type="datetimeFigureOut">
               <a:rPr lang="en-GB" smtClean="0"/>
-              <a:t>23/04/2025</a:t>
+              <a:t>24/04/2025</a:t>
             </a:fld>
             <a:endParaRPr lang="en-GB"/>
           </a:p>
@@ -2422,7 +2422,7 @@
           <a:p>
             <a:fld id="{7B17242C-12C5-4BCA-8614-627256A12318}" type="datetimeFigureOut">
               <a:rPr lang="en-GB" smtClean="0"/>
-              <a:t>23/04/2025</a:t>
+              <a:t>24/04/2025</a:t>
             </a:fld>
             <a:endParaRPr lang="en-GB"/>
           </a:p>
@@ -2540,7 +2540,7 @@
           <a:p>
             <a:fld id="{7B17242C-12C5-4BCA-8614-627256A12318}" type="datetimeFigureOut">
               <a:rPr lang="en-GB" smtClean="0"/>
-              <a:t>23/04/2025</a:t>
+              <a:t>24/04/2025</a:t>
             </a:fld>
             <a:endParaRPr lang="en-GB"/>
           </a:p>
@@ -2635,7 +2635,7 @@
           <a:p>
             <a:fld id="{7B17242C-12C5-4BCA-8614-627256A12318}" type="datetimeFigureOut">
               <a:rPr lang="en-GB" smtClean="0"/>
-              <a:t>23/04/2025</a:t>
+              <a:t>24/04/2025</a:t>
             </a:fld>
             <a:endParaRPr lang="en-GB"/>
           </a:p>
@@ -2912,7 +2912,7 @@
           <a:p>
             <a:fld id="{7B17242C-12C5-4BCA-8614-627256A12318}" type="datetimeFigureOut">
               <a:rPr lang="en-GB" smtClean="0"/>
-              <a:t>23/04/2025</a:t>
+              <a:t>24/04/2025</a:t>
             </a:fld>
             <a:endParaRPr lang="en-GB"/>
           </a:p>
@@ -3169,7 +3169,7 @@
           <a:p>
             <a:fld id="{7B17242C-12C5-4BCA-8614-627256A12318}" type="datetimeFigureOut">
               <a:rPr lang="en-GB" smtClean="0"/>
-              <a:t>23/04/2025</a:t>
+              <a:t>24/04/2025</a:t>
             </a:fld>
             <a:endParaRPr lang="en-GB"/>
           </a:p>
@@ -3382,7 +3382,7 @@
           <a:p>
             <a:fld id="{7B17242C-12C5-4BCA-8614-627256A12318}" type="datetimeFigureOut">
               <a:rPr lang="en-GB" smtClean="0"/>
-              <a:t>23/04/2025</a:t>
+              <a:t>24/04/2025</a:t>
             </a:fld>
             <a:endParaRPr lang="en-GB"/>
           </a:p>
@@ -4670,21 +4670,21 @@
                 <a:latin typeface="Arial" panose="020B0604020202020204" pitchFamily="34" charset="0"/>
                 <a:ea typeface="Aptos" panose="020B0004020202020204" pitchFamily="34" charset="0"/>
               </a:rPr>
-              <a:t>clusters using </a:t>
+              <a:t>clusters using t-SNE</a:t>
             </a:r>
             <a:r>
               <a:rPr lang="en-GB" b="1" dirty="0">
                 <a:latin typeface="Arial" panose="020B0604020202020204" pitchFamily="34" charset="0"/>
                 <a:ea typeface="Aptos" panose="020B0004020202020204" pitchFamily="34" charset="0"/>
               </a:rPr>
-              <a:t>X dimensionality reduction method paired with K-means</a:t>
+              <a:t> </a:t>
             </a:r>
             <a:r>
               <a:rPr lang="en-GB" dirty="0">
                 <a:latin typeface="Arial" panose="020B0604020202020204" pitchFamily="34" charset="0"/>
                 <a:ea typeface="Aptos" panose="020B0004020202020204" pitchFamily="34" charset="0"/>
               </a:rPr>
-              <a:t>. </a:t>
+              <a:t>dimensionality reduction method paired with K-means. </a:t>
             </a:r>
             <a:r>
               <a:rPr lang="en-GB" b="1" dirty="0">

</xml_diff>